<commit_message>
dev: mask_rcnn/notebook/RunPretrainedModel.ipynb: understand model
</commit_message>
<xml_diff>
--- a/mask_rcnn/doc/networks.pptx
+++ b/mask_rcnn/doc/networks.pptx
@@ -6,6 +6,8 @@
   </p:sldMasterIdLst>
   <p:sldIdLst>
     <p:sldId id="256" r:id="rId2"/>
+    <p:sldId id="257" r:id="rId3"/>
+    <p:sldId id="258" r:id="rId4"/>
   </p:sldIdLst>
   <p:sldSz cx="12192000" cy="6858000"/>
   <p:notesSz cx="6858000" cy="9144000"/>
@@ -104,6 +106,11 @@
       </a:defRPr>
     </a:lvl9pPr>
   </p:defaultTextStyle>
+  <p:extLst>
+    <p:ext uri="{EFAFB233-063F-42B5-8137-9DF3F51BA10A}">
+      <p15:sldGuideLst xmlns:p15="http://schemas.microsoft.com/office/powerpoint/2012/main"/>
+    </p:ext>
+  </p:extLst>
 </p:presentation>
 </file>
 
@@ -254,7 +261,7 @@
           <a:p>
             <a:fld id="{118988BA-6DA2-47E2-A1CD-CED21CFF5A8E}" type="datetimeFigureOut">
               <a:rPr lang="en-US" smtClean="0"/>
-              <a:t>8/7/2025</a:t>
+              <a:t>8/8/2025</a:t>
             </a:fld>
             <a:endParaRPr lang="en-US"/>
           </a:p>
@@ -452,7 +459,7 @@
           <a:p>
             <a:fld id="{118988BA-6DA2-47E2-A1CD-CED21CFF5A8E}" type="datetimeFigureOut">
               <a:rPr lang="en-US" smtClean="0"/>
-              <a:t>8/7/2025</a:t>
+              <a:t>8/8/2025</a:t>
             </a:fld>
             <a:endParaRPr lang="en-US"/>
           </a:p>
@@ -660,7 +667,7 @@
           <a:p>
             <a:fld id="{118988BA-6DA2-47E2-A1CD-CED21CFF5A8E}" type="datetimeFigureOut">
               <a:rPr lang="en-US" smtClean="0"/>
-              <a:t>8/7/2025</a:t>
+              <a:t>8/8/2025</a:t>
             </a:fld>
             <a:endParaRPr lang="en-US"/>
           </a:p>
@@ -858,7 +865,7 @@
           <a:p>
             <a:fld id="{118988BA-6DA2-47E2-A1CD-CED21CFF5A8E}" type="datetimeFigureOut">
               <a:rPr lang="en-US" smtClean="0"/>
-              <a:t>8/7/2025</a:t>
+              <a:t>8/8/2025</a:t>
             </a:fld>
             <a:endParaRPr lang="en-US"/>
           </a:p>
@@ -1133,7 +1140,7 @@
           <a:p>
             <a:fld id="{118988BA-6DA2-47E2-A1CD-CED21CFF5A8E}" type="datetimeFigureOut">
               <a:rPr lang="en-US" smtClean="0"/>
-              <a:t>8/7/2025</a:t>
+              <a:t>8/8/2025</a:t>
             </a:fld>
             <a:endParaRPr lang="en-US"/>
           </a:p>
@@ -1398,7 +1405,7 @@
           <a:p>
             <a:fld id="{118988BA-6DA2-47E2-A1CD-CED21CFF5A8E}" type="datetimeFigureOut">
               <a:rPr lang="en-US" smtClean="0"/>
-              <a:t>8/7/2025</a:t>
+              <a:t>8/8/2025</a:t>
             </a:fld>
             <a:endParaRPr lang="en-US"/>
           </a:p>
@@ -1810,7 +1817,7 @@
           <a:p>
             <a:fld id="{118988BA-6DA2-47E2-A1CD-CED21CFF5A8E}" type="datetimeFigureOut">
               <a:rPr lang="en-US" smtClean="0"/>
-              <a:t>8/7/2025</a:t>
+              <a:t>8/8/2025</a:t>
             </a:fld>
             <a:endParaRPr lang="en-US"/>
           </a:p>
@@ -1951,7 +1958,7 @@
           <a:p>
             <a:fld id="{118988BA-6DA2-47E2-A1CD-CED21CFF5A8E}" type="datetimeFigureOut">
               <a:rPr lang="en-US" smtClean="0"/>
-              <a:t>8/7/2025</a:t>
+              <a:t>8/8/2025</a:t>
             </a:fld>
             <a:endParaRPr lang="en-US"/>
           </a:p>
@@ -2064,7 +2071,7 @@
           <a:p>
             <a:fld id="{118988BA-6DA2-47E2-A1CD-CED21CFF5A8E}" type="datetimeFigureOut">
               <a:rPr lang="en-US" smtClean="0"/>
-              <a:t>8/7/2025</a:t>
+              <a:t>8/8/2025</a:t>
             </a:fld>
             <a:endParaRPr lang="en-US"/>
           </a:p>
@@ -2375,7 +2382,7 @@
           <a:p>
             <a:fld id="{118988BA-6DA2-47E2-A1CD-CED21CFF5A8E}" type="datetimeFigureOut">
               <a:rPr lang="en-US" smtClean="0"/>
-              <a:t>8/7/2025</a:t>
+              <a:t>8/8/2025</a:t>
             </a:fld>
             <a:endParaRPr lang="en-US"/>
           </a:p>
@@ -2663,7 +2670,7 @@
           <a:p>
             <a:fld id="{118988BA-6DA2-47E2-A1CD-CED21CFF5A8E}" type="datetimeFigureOut">
               <a:rPr lang="en-US" smtClean="0"/>
-              <a:t>8/7/2025</a:t>
+              <a:t>8/8/2025</a:t>
             </a:fld>
             <a:endParaRPr lang="en-US"/>
           </a:p>
@@ -2904,7 +2911,7 @@
           <a:p>
             <a:fld id="{118988BA-6DA2-47E2-A1CD-CED21CFF5A8E}" type="datetimeFigureOut">
               <a:rPr lang="en-US" smtClean="0"/>
-              <a:t>8/7/2025</a:t>
+              <a:t>8/8/2025</a:t>
             </a:fld>
             <a:endParaRPr lang="en-US"/>
           </a:p>
@@ -5411,6 +5418,2147 @@
     <p:extLst>
       <p:ext uri="{BB962C8B-B14F-4D97-AF65-F5344CB8AC3E}">
         <p14:creationId xmlns:p14="http://schemas.microsoft.com/office/powerpoint/2010/main" val="3630922648"/>
+      </p:ext>
+    </p:extLst>
+  </p:cSld>
+  <p:clrMapOvr>
+    <a:masterClrMapping/>
+  </p:clrMapOvr>
+</p:sld>
+</file>
+
+<file path=ppt/slides/slide2.xml><?xml version="1.0" encoding="utf-8"?>
+<p:sld xmlns:a="http://schemas.openxmlformats.org/drawingml/2006/main" xmlns:r="http://schemas.openxmlformats.org/officeDocument/2006/relationships" xmlns:p="http://schemas.openxmlformats.org/presentationml/2006/main">
+  <p:cSld>
+    <p:spTree>
+      <p:nvGrpSpPr>
+        <p:cNvPr id="1" name=""/>
+        <p:cNvGrpSpPr/>
+        <p:nvPr/>
+      </p:nvGrpSpPr>
+      <p:grpSpPr>
+        <a:xfrm>
+          <a:off x="0" y="0"/>
+          <a:ext cx="0" cy="0"/>
+          <a:chOff x="0" y="0"/>
+          <a:chExt cx="0" cy="0"/>
+        </a:xfrm>
+      </p:grpSpPr>
+      <mc:AlternateContent xmlns:mc="http://schemas.openxmlformats.org/markup-compatibility/2006" xmlns:a14="http://schemas.microsoft.com/office/drawing/2010/main">
+        <mc:Choice Requires="a14">
+          <p:sp>
+            <p:nvSpPr>
+              <p:cNvPr id="5" name="TextBox 4">
+                <a:extLst>
+                  <a:ext uri="{FF2B5EF4-FFF2-40B4-BE49-F238E27FC236}">
+                    <a16:creationId xmlns:a16="http://schemas.microsoft.com/office/drawing/2014/main" id="{D617FF8D-E2C5-75EA-0E1B-5FFC25DE50F4}"/>
+                  </a:ext>
+                </a:extLst>
+              </p:cNvPr>
+              <p:cNvSpPr txBox="1"/>
+              <p:nvPr/>
+            </p:nvSpPr>
+            <p:spPr>
+              <a:xfrm>
+                <a:off x="761999" y="1133194"/>
+                <a:ext cx="10417629" cy="4291496"/>
+              </a:xfrm>
+              <a:prstGeom prst="rect">
+                <a:avLst/>
+              </a:prstGeom>
+              <a:noFill/>
+            </p:spPr>
+            <p:txBody>
+              <a:bodyPr wrap="square">
+                <a:spAutoFit/>
+              </a:bodyPr>
+              <a:lstStyle/>
+              <a:p>
+                <a:pPr>
+                  <a:lnSpc>
+                    <a:spcPct val="115000"/>
+                  </a:lnSpc>
+                  <a:spcAft>
+                    <a:spcPts val="800"/>
+                  </a:spcAft>
+                </a:pPr>
+                <a:r>
+                  <a:rPr lang="en-US" kern="100" dirty="0">
+                    <a:ea typeface="Calibri" panose="020F0502020204030204" pitchFamily="34" charset="0"/>
+                    <a:cs typeface="Cordia New" panose="020B0304020202020204" pitchFamily="34" charset="-34"/>
+                  </a:rPr>
+                  <a:t>In Fast R-CNN and Mask R-CNN, why computing anchor locations involving squared root of aspect ratios?</a:t>
+                </a:r>
+              </a:p>
+              <a:p>
+                <a:pPr marL="0" marR="0">
+                  <a:lnSpc>
+                    <a:spcPct val="115000"/>
+                  </a:lnSpc>
+                  <a:spcAft>
+                    <a:spcPts val="800"/>
+                  </a:spcAft>
+                  <a:buNone/>
+                </a:pPr>
+                <a:r>
+                  <a:rPr lang="en-US" sz="1800" kern="100" dirty="0">
+                    <a:effectLst/>
+                    <a:ea typeface="Calibri" panose="020F0502020204030204" pitchFamily="34" charset="0"/>
+                    <a:cs typeface="Cordia New" panose="020B0304020202020204" pitchFamily="34" charset="-34"/>
+                  </a:rPr>
+                  <a:t>Let </a:t>
+                </a:r>
+                <a14:m>
+                  <m:oMath xmlns:m="http://schemas.openxmlformats.org/officeDocument/2006/math">
+                    <m:r>
+                      <a:rPr lang="en-US" sz="1800" i="1" kern="100">
+                        <a:effectLst/>
+                        <a:latin typeface="Cambria Math" panose="02040503050406030204" pitchFamily="18" charset="0"/>
+                        <a:ea typeface="Calibri" panose="020F0502020204030204" pitchFamily="34" charset="0"/>
+                        <a:cs typeface="Cordia New" panose="020B0304020202020204" pitchFamily="34" charset="-34"/>
+                      </a:rPr>
+                      <m:t>𝑠</m:t>
+                    </m:r>
+                    <m:r>
+                      <a:rPr lang="en-US" sz="1800" i="1" kern="100">
+                        <a:effectLst/>
+                        <a:latin typeface="Cambria Math" panose="02040503050406030204" pitchFamily="18" charset="0"/>
+                        <a:ea typeface="Calibri" panose="020F0502020204030204" pitchFamily="34" charset="0"/>
+                        <a:cs typeface="Cordia New" panose="020B0304020202020204" pitchFamily="34" charset="-34"/>
+                      </a:rPr>
+                      <m:t>=</m:t>
+                    </m:r>
+                    <m:r>
+                      <a:rPr lang="en-US" sz="1800" i="1" kern="100">
+                        <a:effectLst/>
+                        <a:latin typeface="Cambria Math" panose="02040503050406030204" pitchFamily="18" charset="0"/>
+                        <a:ea typeface="Calibri" panose="020F0502020204030204" pitchFamily="34" charset="0"/>
+                        <a:cs typeface="Cordia New" panose="020B0304020202020204" pitchFamily="34" charset="-34"/>
+                      </a:rPr>
+                      <m:t>𝑤h</m:t>
+                    </m:r>
+                  </m:oMath>
+                </a14:m>
+                <a:r>
+                  <a:rPr lang="en-US" sz="1800" kern="100" dirty="0">
+                    <a:effectLst/>
+                    <a:ea typeface="Times New Roman" panose="02020603050405020304" pitchFamily="18" charset="0"/>
+                    <a:cs typeface="Cordia New" panose="020B0304020202020204" pitchFamily="34" charset="-34"/>
+                  </a:rPr>
+                  <a:t> and an </a:t>
+                </a:r>
+                <a:r>
+                  <a:rPr lang="en-US" sz="1800" kern="100" dirty="0">
+                    <a:effectLst/>
+                    <a:ea typeface="Calibri" panose="020F0502020204030204" pitchFamily="34" charset="0"/>
+                    <a:cs typeface="Cordia New" panose="020B0304020202020204" pitchFamily="34" charset="-34"/>
+                  </a:rPr>
+                  <a:t>anchor box having area of size </a:t>
+                </a:r>
+                <a14:m>
+                  <m:oMath xmlns:m="http://schemas.openxmlformats.org/officeDocument/2006/math">
+                    <m:sSup>
+                      <m:sSupPr>
+                        <m:ctrlPr>
+                          <a:rPr lang="en-US" sz="1800" i="1" kern="100">
+                            <a:effectLst/>
+                            <a:latin typeface="Cambria Math" panose="02040503050406030204" pitchFamily="18" charset="0"/>
+                            <a:ea typeface="Calibri" panose="020F0502020204030204" pitchFamily="34" charset="0"/>
+                            <a:cs typeface="Cordia New" panose="020B0304020202020204" pitchFamily="34" charset="-34"/>
+                          </a:rPr>
+                        </m:ctrlPr>
+                      </m:sSupPr>
+                      <m:e>
+                        <m:r>
+                          <a:rPr lang="en-US" sz="1800" i="1" kern="100">
+                            <a:effectLst/>
+                            <a:latin typeface="Cambria Math" panose="02040503050406030204" pitchFamily="18" charset="0"/>
+                            <a:ea typeface="Calibri" panose="020F0502020204030204" pitchFamily="34" charset="0"/>
+                            <a:cs typeface="Cordia New" panose="020B0304020202020204" pitchFamily="34" charset="-34"/>
+                          </a:rPr>
+                          <m:t>𝑠</m:t>
+                        </m:r>
+                      </m:e>
+                      <m:sup>
+                        <m:r>
+                          <a:rPr lang="en-US" sz="1800" i="1" kern="100">
+                            <a:effectLst/>
+                            <a:latin typeface="Cambria Math" panose="02040503050406030204" pitchFamily="18" charset="0"/>
+                            <a:ea typeface="Calibri" panose="020F0502020204030204" pitchFamily="34" charset="0"/>
+                            <a:cs typeface="Cordia New" panose="020B0304020202020204" pitchFamily="34" charset="-34"/>
+                          </a:rPr>
+                          <m:t>2</m:t>
+                        </m:r>
+                      </m:sup>
+                    </m:sSup>
+                  </m:oMath>
+                </a14:m>
+                <a:r>
+                  <a:rPr lang="en-US" sz="1800" kern="100" dirty="0">
+                    <a:effectLst/>
+                    <a:ea typeface="Times New Roman" panose="02020603050405020304" pitchFamily="18" charset="0"/>
+                    <a:cs typeface="Cordia New" panose="020B0304020202020204" pitchFamily="34" charset="-34"/>
+                  </a:rPr>
+                  <a:t> with aspect ratio of </a:t>
+                </a:r>
+                <a14:m>
+                  <m:oMath xmlns:m="http://schemas.openxmlformats.org/officeDocument/2006/math">
+                    <m:r>
+                      <a:rPr lang="en-US" sz="1800" i="1" kern="100">
+                        <a:effectLst/>
+                        <a:latin typeface="Cambria Math" panose="02040503050406030204" pitchFamily="18" charset="0"/>
+                        <a:ea typeface="Times New Roman" panose="02020603050405020304" pitchFamily="18" charset="0"/>
+                        <a:cs typeface="Cordia New" panose="020B0304020202020204" pitchFamily="34" charset="-34"/>
+                      </a:rPr>
+                      <m:t>𝑟</m:t>
+                    </m:r>
+                    <m:r>
+                      <a:rPr lang="en-US" sz="1800" i="1" kern="100">
+                        <a:effectLst/>
+                        <a:latin typeface="Cambria Math" panose="02040503050406030204" pitchFamily="18" charset="0"/>
+                        <a:ea typeface="Times New Roman" panose="02020603050405020304" pitchFamily="18" charset="0"/>
+                        <a:cs typeface="Cordia New" panose="020B0304020202020204" pitchFamily="34" charset="-34"/>
+                      </a:rPr>
+                      <m:t>=</m:t>
+                    </m:r>
+                    <m:r>
+                      <a:rPr lang="en-US" sz="1800" i="1" kern="100">
+                        <a:effectLst/>
+                        <a:latin typeface="Cambria Math" panose="02040503050406030204" pitchFamily="18" charset="0"/>
+                        <a:ea typeface="Times New Roman" panose="02020603050405020304" pitchFamily="18" charset="0"/>
+                        <a:cs typeface="Cordia New" panose="020B0304020202020204" pitchFamily="34" charset="-34"/>
+                      </a:rPr>
+                      <m:t>h</m:t>
+                    </m:r>
+                    <m:r>
+                      <a:rPr lang="en-US" sz="1800" i="1" kern="100">
+                        <a:effectLst/>
+                        <a:latin typeface="Cambria Math" panose="02040503050406030204" pitchFamily="18" charset="0"/>
+                        <a:ea typeface="Times New Roman" panose="02020603050405020304" pitchFamily="18" charset="0"/>
+                        <a:cs typeface="Cordia New" panose="020B0304020202020204" pitchFamily="34" charset="-34"/>
+                      </a:rPr>
+                      <m:t>/</m:t>
+                    </m:r>
+                    <m:r>
+                      <a:rPr lang="en-US" sz="1800" i="1" kern="100">
+                        <a:effectLst/>
+                        <a:latin typeface="Cambria Math" panose="02040503050406030204" pitchFamily="18" charset="0"/>
+                        <a:ea typeface="Times New Roman" panose="02020603050405020304" pitchFamily="18" charset="0"/>
+                        <a:cs typeface="Cordia New" panose="020B0304020202020204" pitchFamily="34" charset="-34"/>
+                      </a:rPr>
+                      <m:t>𝑤</m:t>
+                    </m:r>
+                  </m:oMath>
+                </a14:m>
+                <a:r>
+                  <a:rPr lang="en-US" sz="1800" kern="100" dirty="0">
+                    <a:effectLst/>
+                    <a:ea typeface="Times New Roman" panose="02020603050405020304" pitchFamily="18" charset="0"/>
+                    <a:cs typeface="Cordia New" panose="020B0304020202020204" pitchFamily="34" charset="-34"/>
+                  </a:rPr>
+                  <a:t>. </a:t>
+                </a:r>
+                <a:endParaRPr lang="en-US" sz="1800" kern="100" dirty="0">
+                  <a:effectLst/>
+                  <a:ea typeface="Calibri" panose="020F0502020204030204" pitchFamily="34" charset="0"/>
+                  <a:cs typeface="Cordia New" panose="020B0304020202020204" pitchFamily="34" charset="-34"/>
+                </a:endParaRPr>
+              </a:p>
+              <a:p>
+                <a:pPr marL="0" marR="0">
+                  <a:lnSpc>
+                    <a:spcPct val="115000"/>
+                  </a:lnSpc>
+                  <a:spcAft>
+                    <a:spcPts val="800"/>
+                  </a:spcAft>
+                  <a:buNone/>
+                </a:pPr>
+                <a14:m>
+                  <m:oMathPara xmlns:m="http://schemas.openxmlformats.org/officeDocument/2006/math">
+                    <m:oMathParaPr>
+                      <m:jc m:val="left"/>
+                    </m:oMathParaPr>
+                    <m:oMath xmlns:m="http://schemas.openxmlformats.org/officeDocument/2006/math">
+                      <m:r>
+                        <a:rPr lang="en-US" sz="1800" i="1" kern="100">
+                          <a:effectLst/>
+                          <a:latin typeface="Cambria Math" panose="02040503050406030204" pitchFamily="18" charset="0"/>
+                          <a:ea typeface="Calibri" panose="020F0502020204030204" pitchFamily="34" charset="0"/>
+                          <a:cs typeface="Cordia New" panose="020B0304020202020204" pitchFamily="34" charset="-34"/>
+                        </a:rPr>
+                        <m:t>𝑤𝑖𝑑𝑡h</m:t>
+                      </m:r>
+                      <m:r>
+                        <a:rPr lang="en-US" sz="1800" i="1" kern="100">
+                          <a:effectLst/>
+                          <a:latin typeface="Cambria Math" panose="02040503050406030204" pitchFamily="18" charset="0"/>
+                          <a:ea typeface="Calibri" panose="020F0502020204030204" pitchFamily="34" charset="0"/>
+                          <a:cs typeface="Cordia New" panose="020B0304020202020204" pitchFamily="34" charset="-34"/>
+                        </a:rPr>
+                        <m:t>=</m:t>
+                      </m:r>
+                      <m:r>
+                        <a:rPr lang="en-US" sz="1800" i="1" kern="100">
+                          <a:effectLst/>
+                          <a:latin typeface="Cambria Math" panose="02040503050406030204" pitchFamily="18" charset="0"/>
+                          <a:ea typeface="Calibri" panose="020F0502020204030204" pitchFamily="34" charset="0"/>
+                          <a:cs typeface="Cordia New" panose="020B0304020202020204" pitchFamily="34" charset="-34"/>
+                        </a:rPr>
+                        <m:t>𝑠</m:t>
+                      </m:r>
+                      <m:rad>
+                        <m:radPr>
+                          <m:degHide m:val="on"/>
+                          <m:ctrlPr>
+                            <a:rPr lang="en-US" sz="1800" i="1" kern="100">
+                              <a:effectLst/>
+                              <a:latin typeface="Cambria Math" panose="02040503050406030204" pitchFamily="18" charset="0"/>
+                              <a:ea typeface="Calibri" panose="020F0502020204030204" pitchFamily="34" charset="0"/>
+                              <a:cs typeface="Cordia New" panose="020B0304020202020204" pitchFamily="34" charset="-34"/>
+                            </a:rPr>
+                          </m:ctrlPr>
+                        </m:radPr>
+                        <m:deg/>
+                        <m:e>
+                          <m:r>
+                            <a:rPr lang="en-US" sz="1800" i="1" kern="100">
+                              <a:effectLst/>
+                              <a:latin typeface="Cambria Math" panose="02040503050406030204" pitchFamily="18" charset="0"/>
+                              <a:ea typeface="Calibri" panose="020F0502020204030204" pitchFamily="34" charset="0"/>
+                              <a:cs typeface="Cordia New" panose="020B0304020202020204" pitchFamily="34" charset="-34"/>
+                            </a:rPr>
+                            <m:t>𝑤</m:t>
+                          </m:r>
+                          <m:r>
+                            <a:rPr lang="en-US" sz="1800" i="1" kern="100">
+                              <a:effectLst/>
+                              <a:latin typeface="Cambria Math" panose="02040503050406030204" pitchFamily="18" charset="0"/>
+                              <a:ea typeface="Calibri" panose="020F0502020204030204" pitchFamily="34" charset="0"/>
+                              <a:cs typeface="Cordia New" panose="020B0304020202020204" pitchFamily="34" charset="-34"/>
+                            </a:rPr>
+                            <m:t>/</m:t>
+                          </m:r>
+                          <m:r>
+                            <a:rPr lang="en-US" sz="1800" i="1" kern="100">
+                              <a:effectLst/>
+                              <a:latin typeface="Cambria Math" panose="02040503050406030204" pitchFamily="18" charset="0"/>
+                              <a:ea typeface="Calibri" panose="020F0502020204030204" pitchFamily="34" charset="0"/>
+                              <a:cs typeface="Cordia New" panose="020B0304020202020204" pitchFamily="34" charset="-34"/>
+                            </a:rPr>
+                            <m:t>h</m:t>
+                          </m:r>
+                        </m:e>
+                      </m:rad>
+                      <m:r>
+                        <a:rPr lang="en-US" sz="1800" i="1" kern="100">
+                          <a:effectLst/>
+                          <a:latin typeface="Cambria Math" panose="02040503050406030204" pitchFamily="18" charset="0"/>
+                          <a:ea typeface="Calibri" panose="020F0502020204030204" pitchFamily="34" charset="0"/>
+                          <a:cs typeface="Cordia New" panose="020B0304020202020204" pitchFamily="34" charset="-34"/>
+                        </a:rPr>
+                        <m:t>=</m:t>
+                      </m:r>
+                      <m:f>
+                        <m:fPr>
+                          <m:ctrlPr>
+                            <a:rPr lang="en-US" sz="1800" i="1" kern="100">
+                              <a:effectLst/>
+                              <a:latin typeface="Cambria Math" panose="02040503050406030204" pitchFamily="18" charset="0"/>
+                              <a:ea typeface="Calibri" panose="020F0502020204030204" pitchFamily="34" charset="0"/>
+                              <a:cs typeface="Cordia New" panose="020B0304020202020204" pitchFamily="34" charset="-34"/>
+                            </a:rPr>
+                          </m:ctrlPr>
+                        </m:fPr>
+                        <m:num>
+                          <m:r>
+                            <a:rPr lang="en-US" sz="1800" i="1" kern="100">
+                              <a:effectLst/>
+                              <a:latin typeface="Cambria Math" panose="02040503050406030204" pitchFamily="18" charset="0"/>
+                              <a:ea typeface="Calibri" panose="020F0502020204030204" pitchFamily="34" charset="0"/>
+                              <a:cs typeface="Cordia New" panose="020B0304020202020204" pitchFamily="34" charset="-34"/>
+                            </a:rPr>
+                            <m:t>𝑤h</m:t>
+                          </m:r>
+                        </m:num>
+                        <m:den>
+                          <m:rad>
+                            <m:radPr>
+                              <m:degHide m:val="on"/>
+                              <m:ctrlPr>
+                                <a:rPr lang="en-US" sz="1800" i="1" kern="100">
+                                  <a:effectLst/>
+                                  <a:latin typeface="Cambria Math" panose="02040503050406030204" pitchFamily="18" charset="0"/>
+                                  <a:ea typeface="Calibri" panose="020F0502020204030204" pitchFamily="34" charset="0"/>
+                                  <a:cs typeface="Cordia New" panose="020B0304020202020204" pitchFamily="34" charset="-34"/>
+                                </a:rPr>
+                              </m:ctrlPr>
+                            </m:radPr>
+                            <m:deg/>
+                            <m:e>
+                              <m:f>
+                                <m:fPr>
+                                  <m:ctrlPr>
+                                    <a:rPr lang="en-US" sz="1800" i="1" kern="100">
+                                      <a:effectLst/>
+                                      <a:latin typeface="Cambria Math" panose="02040503050406030204" pitchFamily="18" charset="0"/>
+                                      <a:ea typeface="Calibri" panose="020F0502020204030204" pitchFamily="34" charset="0"/>
+                                      <a:cs typeface="Cordia New" panose="020B0304020202020204" pitchFamily="34" charset="-34"/>
+                                    </a:rPr>
+                                  </m:ctrlPr>
+                                </m:fPr>
+                                <m:num>
+                                  <m:r>
+                                    <a:rPr lang="en-US" sz="1800" i="1" kern="100">
+                                      <a:effectLst/>
+                                      <a:latin typeface="Cambria Math" panose="02040503050406030204" pitchFamily="18" charset="0"/>
+                                      <a:ea typeface="Calibri" panose="020F0502020204030204" pitchFamily="34" charset="0"/>
+                                      <a:cs typeface="Cordia New" panose="020B0304020202020204" pitchFamily="34" charset="-34"/>
+                                    </a:rPr>
+                                    <m:t>𝑤</m:t>
+                                  </m:r>
+                                </m:num>
+                                <m:den>
+                                  <m:r>
+                                    <a:rPr lang="en-US" sz="1800" i="1" kern="100">
+                                      <a:effectLst/>
+                                      <a:latin typeface="Cambria Math" panose="02040503050406030204" pitchFamily="18" charset="0"/>
+                                      <a:ea typeface="Calibri" panose="020F0502020204030204" pitchFamily="34" charset="0"/>
+                                      <a:cs typeface="Cordia New" panose="020B0304020202020204" pitchFamily="34" charset="-34"/>
+                                    </a:rPr>
+                                    <m:t>h</m:t>
+                                  </m:r>
+                                </m:den>
+                              </m:f>
+                            </m:e>
+                          </m:rad>
+                        </m:den>
+                      </m:f>
+                      <m:r>
+                        <a:rPr lang="en-US" sz="1800" i="1" kern="100">
+                          <a:effectLst/>
+                          <a:latin typeface="Cambria Math" panose="02040503050406030204" pitchFamily="18" charset="0"/>
+                          <a:ea typeface="Calibri" panose="020F0502020204030204" pitchFamily="34" charset="0"/>
+                          <a:cs typeface="Cordia New" panose="020B0304020202020204" pitchFamily="34" charset="-34"/>
+                        </a:rPr>
+                        <m:t>=</m:t>
+                      </m:r>
+                      <m:r>
+                        <a:rPr lang="en-US" sz="1800" i="1" kern="100">
+                          <a:effectLst/>
+                          <a:latin typeface="Cambria Math" panose="02040503050406030204" pitchFamily="18" charset="0"/>
+                          <a:ea typeface="Calibri" panose="020F0502020204030204" pitchFamily="34" charset="0"/>
+                          <a:cs typeface="Cordia New" panose="020B0304020202020204" pitchFamily="34" charset="-34"/>
+                        </a:rPr>
+                        <m:t>h</m:t>
+                      </m:r>
+                      <m:rad>
+                        <m:radPr>
+                          <m:degHide m:val="on"/>
+                          <m:ctrlPr>
+                            <a:rPr lang="en-US" sz="1800" i="1" kern="100">
+                              <a:effectLst/>
+                              <a:latin typeface="Cambria Math" panose="02040503050406030204" pitchFamily="18" charset="0"/>
+                              <a:ea typeface="Calibri" panose="020F0502020204030204" pitchFamily="34" charset="0"/>
+                              <a:cs typeface="Cordia New" panose="020B0304020202020204" pitchFamily="34" charset="-34"/>
+                            </a:rPr>
+                          </m:ctrlPr>
+                        </m:radPr>
+                        <m:deg/>
+                        <m:e>
+                          <m:r>
+                            <a:rPr lang="en-US" sz="1800" i="1" kern="100">
+                              <a:effectLst/>
+                              <a:latin typeface="Cambria Math" panose="02040503050406030204" pitchFamily="18" charset="0"/>
+                              <a:ea typeface="Calibri" panose="020F0502020204030204" pitchFamily="34" charset="0"/>
+                              <a:cs typeface="Cordia New" panose="020B0304020202020204" pitchFamily="34" charset="-34"/>
+                            </a:rPr>
+                            <m:t>𝑤h</m:t>
+                          </m:r>
+                        </m:e>
+                      </m:rad>
+                      <m:r>
+                        <a:rPr lang="en-US" sz="1800" i="1" kern="100">
+                          <a:effectLst/>
+                          <a:latin typeface="Cambria Math" panose="02040503050406030204" pitchFamily="18" charset="0"/>
+                          <a:ea typeface="Calibri" panose="020F0502020204030204" pitchFamily="34" charset="0"/>
+                          <a:cs typeface="Cordia New" panose="020B0304020202020204" pitchFamily="34" charset="-34"/>
+                        </a:rPr>
+                        <m:t> </m:t>
+                      </m:r>
+                    </m:oMath>
+                  </m:oMathPara>
+                </a14:m>
+                <a:endParaRPr lang="en-US" sz="1800" kern="100" dirty="0">
+                  <a:effectLst/>
+                  <a:ea typeface="Calibri" panose="020F0502020204030204" pitchFamily="34" charset="0"/>
+                  <a:cs typeface="Cordia New" panose="020B0304020202020204" pitchFamily="34" charset="-34"/>
+                </a:endParaRPr>
+              </a:p>
+              <a:p>
+                <a:pPr marL="0" marR="0">
+                  <a:lnSpc>
+                    <a:spcPct val="115000"/>
+                  </a:lnSpc>
+                  <a:spcAft>
+                    <a:spcPts val="800"/>
+                  </a:spcAft>
+                  <a:buNone/>
+                </a:pPr>
+                <a14:m>
+                  <m:oMathPara xmlns:m="http://schemas.openxmlformats.org/officeDocument/2006/math">
+                    <m:oMathParaPr>
+                      <m:jc m:val="left"/>
+                    </m:oMathParaPr>
+                    <m:oMath xmlns:m="http://schemas.openxmlformats.org/officeDocument/2006/math">
+                      <m:r>
+                        <a:rPr lang="en-US" sz="1800" i="1" kern="100">
+                          <a:effectLst/>
+                          <a:latin typeface="Cambria Math" panose="02040503050406030204" pitchFamily="18" charset="0"/>
+                          <a:ea typeface="Times New Roman" panose="02020603050405020304" pitchFamily="18" charset="0"/>
+                          <a:cs typeface="Cordia New" panose="020B0304020202020204" pitchFamily="34" charset="-34"/>
+                        </a:rPr>
+                        <m:t>h𝑒𝑖𝑔h𝑡</m:t>
+                      </m:r>
+                      <m:r>
+                        <a:rPr lang="en-US" sz="1800" i="1" kern="100">
+                          <a:effectLst/>
+                          <a:latin typeface="Cambria Math" panose="02040503050406030204" pitchFamily="18" charset="0"/>
+                          <a:ea typeface="Times New Roman" panose="02020603050405020304" pitchFamily="18" charset="0"/>
+                          <a:cs typeface="Cordia New" panose="020B0304020202020204" pitchFamily="34" charset="-34"/>
+                        </a:rPr>
+                        <m:t>=</m:t>
+                      </m:r>
+                      <m:r>
+                        <a:rPr lang="en-US" sz="1800" i="1" kern="100">
+                          <a:effectLst/>
+                          <a:latin typeface="Cambria Math" panose="02040503050406030204" pitchFamily="18" charset="0"/>
+                          <a:ea typeface="Times New Roman" panose="02020603050405020304" pitchFamily="18" charset="0"/>
+                          <a:cs typeface="Cordia New" panose="020B0304020202020204" pitchFamily="34" charset="-34"/>
+                        </a:rPr>
+                        <m:t>𝑠</m:t>
+                      </m:r>
+                      <m:rad>
+                        <m:radPr>
+                          <m:degHide m:val="on"/>
+                          <m:ctrlPr>
+                            <a:rPr lang="en-US" sz="1800" i="1" kern="100">
+                              <a:effectLst/>
+                              <a:latin typeface="Cambria Math" panose="02040503050406030204" pitchFamily="18" charset="0"/>
+                              <a:ea typeface="Times New Roman" panose="02020603050405020304" pitchFamily="18" charset="0"/>
+                              <a:cs typeface="Cordia New" panose="020B0304020202020204" pitchFamily="34" charset="-34"/>
+                            </a:rPr>
+                          </m:ctrlPr>
+                        </m:radPr>
+                        <m:deg/>
+                        <m:e>
+                          <m:r>
+                            <a:rPr lang="en-US" sz="1800" i="1" kern="100">
+                              <a:effectLst/>
+                              <a:latin typeface="Cambria Math" panose="02040503050406030204" pitchFamily="18" charset="0"/>
+                              <a:ea typeface="Times New Roman" panose="02020603050405020304" pitchFamily="18" charset="0"/>
+                              <a:cs typeface="Cordia New" panose="020B0304020202020204" pitchFamily="34" charset="-34"/>
+                            </a:rPr>
+                            <m:t>h</m:t>
+                          </m:r>
+                          <m:r>
+                            <a:rPr lang="en-US" sz="1800" i="1" kern="100">
+                              <a:effectLst/>
+                              <a:latin typeface="Cambria Math" panose="02040503050406030204" pitchFamily="18" charset="0"/>
+                              <a:ea typeface="Times New Roman" panose="02020603050405020304" pitchFamily="18" charset="0"/>
+                              <a:cs typeface="Cordia New" panose="020B0304020202020204" pitchFamily="34" charset="-34"/>
+                            </a:rPr>
+                            <m:t>/</m:t>
+                          </m:r>
+                          <m:r>
+                            <a:rPr lang="en-US" sz="1800" i="1" kern="100">
+                              <a:effectLst/>
+                              <a:latin typeface="Cambria Math" panose="02040503050406030204" pitchFamily="18" charset="0"/>
+                              <a:ea typeface="Times New Roman" panose="02020603050405020304" pitchFamily="18" charset="0"/>
+                              <a:cs typeface="Cordia New" panose="020B0304020202020204" pitchFamily="34" charset="-34"/>
+                            </a:rPr>
+                            <m:t>𝑤</m:t>
+                          </m:r>
+                        </m:e>
+                      </m:rad>
+                      <m:r>
+                        <a:rPr lang="en-US" sz="1800" i="1" kern="100">
+                          <a:effectLst/>
+                          <a:latin typeface="Cambria Math" panose="02040503050406030204" pitchFamily="18" charset="0"/>
+                          <a:ea typeface="Times New Roman" panose="02020603050405020304" pitchFamily="18" charset="0"/>
+                          <a:cs typeface="Cordia New" panose="020B0304020202020204" pitchFamily="34" charset="-34"/>
+                        </a:rPr>
+                        <m:t>=</m:t>
+                      </m:r>
+                      <m:f>
+                        <m:fPr>
+                          <m:ctrlPr>
+                            <a:rPr lang="en-US" sz="1800" i="1" kern="100">
+                              <a:effectLst/>
+                              <a:latin typeface="Cambria Math" panose="02040503050406030204" pitchFamily="18" charset="0"/>
+                              <a:ea typeface="Times New Roman" panose="02020603050405020304" pitchFamily="18" charset="0"/>
+                              <a:cs typeface="Cordia New" panose="020B0304020202020204" pitchFamily="34" charset="-34"/>
+                            </a:rPr>
+                          </m:ctrlPr>
+                        </m:fPr>
+                        <m:num>
+                          <m:r>
+                            <a:rPr lang="en-US" sz="1800" i="1" kern="100">
+                              <a:effectLst/>
+                              <a:latin typeface="Cambria Math" panose="02040503050406030204" pitchFamily="18" charset="0"/>
+                              <a:ea typeface="Times New Roman" panose="02020603050405020304" pitchFamily="18" charset="0"/>
+                              <a:cs typeface="Cordia New" panose="020B0304020202020204" pitchFamily="34" charset="-34"/>
+                            </a:rPr>
+                            <m:t>𝑤h</m:t>
+                          </m:r>
+                        </m:num>
+                        <m:den>
+                          <m:rad>
+                            <m:radPr>
+                              <m:degHide m:val="on"/>
+                              <m:ctrlPr>
+                                <a:rPr lang="en-US" sz="1800" i="1" kern="100">
+                                  <a:effectLst/>
+                                  <a:latin typeface="Cambria Math" panose="02040503050406030204" pitchFamily="18" charset="0"/>
+                                  <a:ea typeface="Times New Roman" panose="02020603050405020304" pitchFamily="18" charset="0"/>
+                                  <a:cs typeface="Cordia New" panose="020B0304020202020204" pitchFamily="34" charset="-34"/>
+                                </a:rPr>
+                              </m:ctrlPr>
+                            </m:radPr>
+                            <m:deg/>
+                            <m:e>
+                              <m:r>
+                                <a:rPr lang="en-US" sz="1800" i="1" kern="100">
+                                  <a:effectLst/>
+                                  <a:latin typeface="Cambria Math" panose="02040503050406030204" pitchFamily="18" charset="0"/>
+                                  <a:ea typeface="Times New Roman" panose="02020603050405020304" pitchFamily="18" charset="0"/>
+                                  <a:cs typeface="Cordia New" panose="020B0304020202020204" pitchFamily="34" charset="-34"/>
+                                </a:rPr>
+                                <m:t>h</m:t>
+                              </m:r>
+                              <m:r>
+                                <a:rPr lang="en-US" sz="1800" i="1" kern="100">
+                                  <a:effectLst/>
+                                  <a:latin typeface="Cambria Math" panose="02040503050406030204" pitchFamily="18" charset="0"/>
+                                  <a:ea typeface="Times New Roman" panose="02020603050405020304" pitchFamily="18" charset="0"/>
+                                  <a:cs typeface="Cordia New" panose="020B0304020202020204" pitchFamily="34" charset="-34"/>
+                                </a:rPr>
+                                <m:t>/</m:t>
+                              </m:r>
+                              <m:r>
+                                <a:rPr lang="en-US" sz="1800" i="1" kern="100">
+                                  <a:effectLst/>
+                                  <a:latin typeface="Cambria Math" panose="02040503050406030204" pitchFamily="18" charset="0"/>
+                                  <a:ea typeface="Times New Roman" panose="02020603050405020304" pitchFamily="18" charset="0"/>
+                                  <a:cs typeface="Cordia New" panose="020B0304020202020204" pitchFamily="34" charset="-34"/>
+                                </a:rPr>
+                                <m:t>𝑤</m:t>
+                              </m:r>
+                            </m:e>
+                          </m:rad>
+                        </m:den>
+                      </m:f>
+                      <m:r>
+                        <a:rPr lang="en-US" sz="1800" i="1" kern="100">
+                          <a:effectLst/>
+                          <a:latin typeface="Cambria Math" panose="02040503050406030204" pitchFamily="18" charset="0"/>
+                          <a:ea typeface="Times New Roman" panose="02020603050405020304" pitchFamily="18" charset="0"/>
+                          <a:cs typeface="Cordia New" panose="020B0304020202020204" pitchFamily="34" charset="-34"/>
+                        </a:rPr>
+                        <m:t>=</m:t>
+                      </m:r>
+                      <m:r>
+                        <a:rPr lang="en-US" sz="1800" i="1" kern="100">
+                          <a:effectLst/>
+                          <a:latin typeface="Cambria Math" panose="02040503050406030204" pitchFamily="18" charset="0"/>
+                          <a:ea typeface="Times New Roman" panose="02020603050405020304" pitchFamily="18" charset="0"/>
+                          <a:cs typeface="Cordia New" panose="020B0304020202020204" pitchFamily="34" charset="-34"/>
+                        </a:rPr>
+                        <m:t>𝑤</m:t>
+                      </m:r>
+                      <m:rad>
+                        <m:radPr>
+                          <m:degHide m:val="on"/>
+                          <m:ctrlPr>
+                            <a:rPr lang="en-US" sz="1800" i="1" kern="100">
+                              <a:effectLst/>
+                              <a:latin typeface="Cambria Math" panose="02040503050406030204" pitchFamily="18" charset="0"/>
+                              <a:ea typeface="Calibri" panose="020F0502020204030204" pitchFamily="34" charset="0"/>
+                              <a:cs typeface="Cordia New" panose="020B0304020202020204" pitchFamily="34" charset="-34"/>
+                            </a:rPr>
+                          </m:ctrlPr>
+                        </m:radPr>
+                        <m:deg/>
+                        <m:e>
+                          <m:r>
+                            <a:rPr lang="en-US" sz="1800" i="1" kern="100">
+                              <a:effectLst/>
+                              <a:latin typeface="Cambria Math" panose="02040503050406030204" pitchFamily="18" charset="0"/>
+                              <a:ea typeface="Calibri" panose="020F0502020204030204" pitchFamily="34" charset="0"/>
+                              <a:cs typeface="Cordia New" panose="020B0304020202020204" pitchFamily="34" charset="-34"/>
+                            </a:rPr>
+                            <m:t>𝑤h</m:t>
+                          </m:r>
+                        </m:e>
+                      </m:rad>
+                    </m:oMath>
+                  </m:oMathPara>
+                </a14:m>
+                <a:endParaRPr lang="en-US" sz="1800" kern="100" dirty="0">
+                  <a:effectLst/>
+                  <a:ea typeface="Calibri" panose="020F0502020204030204" pitchFamily="34" charset="0"/>
+                  <a:cs typeface="Cordia New" panose="020B0304020202020204" pitchFamily="34" charset="-34"/>
+                </a:endParaRPr>
+              </a:p>
+              <a:p>
+                <a:pPr marL="0" marR="0">
+                  <a:lnSpc>
+                    <a:spcPct val="115000"/>
+                  </a:lnSpc>
+                  <a:spcAft>
+                    <a:spcPts val="800"/>
+                  </a:spcAft>
+                  <a:buNone/>
+                </a:pPr>
+                <a14:m>
+                  <m:oMathPara xmlns:m="http://schemas.openxmlformats.org/officeDocument/2006/math">
+                    <m:oMathParaPr>
+                      <m:jc m:val="left"/>
+                    </m:oMathParaPr>
+                    <m:oMath xmlns:m="http://schemas.openxmlformats.org/officeDocument/2006/math">
+                      <m:r>
+                        <a:rPr lang="en-US" sz="1800" i="1" kern="100">
+                          <a:effectLst/>
+                          <a:latin typeface="Cambria Math" panose="02040503050406030204" pitchFamily="18" charset="0"/>
+                          <a:ea typeface="Times New Roman" panose="02020603050405020304" pitchFamily="18" charset="0"/>
+                          <a:cs typeface="Cordia New" panose="020B0304020202020204" pitchFamily="34" charset="-34"/>
+                        </a:rPr>
+                        <m:t>𝑎𝑟𝑒𝑎</m:t>
+                      </m:r>
+                      <m:r>
+                        <a:rPr lang="en-US" sz="1800" i="1" kern="100">
+                          <a:effectLst/>
+                          <a:latin typeface="Cambria Math" panose="02040503050406030204" pitchFamily="18" charset="0"/>
+                          <a:ea typeface="Times New Roman" panose="02020603050405020304" pitchFamily="18" charset="0"/>
+                          <a:cs typeface="Cordia New" panose="020B0304020202020204" pitchFamily="34" charset="-34"/>
+                        </a:rPr>
+                        <m:t>=</m:t>
+                      </m:r>
+                      <m:r>
+                        <a:rPr lang="en-US" sz="1800" i="1" kern="100">
+                          <a:effectLst/>
+                          <a:latin typeface="Cambria Math" panose="02040503050406030204" pitchFamily="18" charset="0"/>
+                          <a:ea typeface="Times New Roman" panose="02020603050405020304" pitchFamily="18" charset="0"/>
+                          <a:cs typeface="Cordia New" panose="020B0304020202020204" pitchFamily="34" charset="-34"/>
+                        </a:rPr>
+                        <m:t>𝑤𝑖𝑑𝑡h</m:t>
+                      </m:r>
+                      <m:r>
+                        <a:rPr lang="en-US" sz="1800" i="1" kern="100">
+                          <a:effectLst/>
+                          <a:latin typeface="Cambria Math" panose="02040503050406030204" pitchFamily="18" charset="0"/>
+                          <a:ea typeface="Times New Roman" panose="02020603050405020304" pitchFamily="18" charset="0"/>
+                          <a:cs typeface="Cordia New" panose="020B0304020202020204" pitchFamily="34" charset="-34"/>
+                        </a:rPr>
+                        <m:t>∙</m:t>
+                      </m:r>
+                      <m:r>
+                        <a:rPr lang="en-US" sz="1800" i="1" kern="100">
+                          <a:effectLst/>
+                          <a:latin typeface="Cambria Math" panose="02040503050406030204" pitchFamily="18" charset="0"/>
+                          <a:ea typeface="Times New Roman" panose="02020603050405020304" pitchFamily="18" charset="0"/>
+                          <a:cs typeface="Cordia New" panose="020B0304020202020204" pitchFamily="34" charset="-34"/>
+                        </a:rPr>
+                        <m:t>h𝑒𝑖𝑔h𝑡</m:t>
+                      </m:r>
+                      <m:r>
+                        <a:rPr lang="en-US" sz="1800" i="1" kern="100">
+                          <a:effectLst/>
+                          <a:latin typeface="Cambria Math" panose="02040503050406030204" pitchFamily="18" charset="0"/>
+                          <a:ea typeface="Times New Roman" panose="02020603050405020304" pitchFamily="18" charset="0"/>
+                          <a:cs typeface="Cordia New" panose="020B0304020202020204" pitchFamily="34" charset="-34"/>
+                        </a:rPr>
+                        <m:t>=</m:t>
+                      </m:r>
+                      <m:r>
+                        <a:rPr lang="en-US" sz="1800" i="1" kern="100">
+                          <a:effectLst/>
+                          <a:latin typeface="Cambria Math" panose="02040503050406030204" pitchFamily="18" charset="0"/>
+                          <a:ea typeface="Times New Roman" panose="02020603050405020304" pitchFamily="18" charset="0"/>
+                          <a:cs typeface="Cordia New" panose="020B0304020202020204" pitchFamily="34" charset="-34"/>
+                        </a:rPr>
+                        <m:t>h</m:t>
+                      </m:r>
+                      <m:rad>
+                        <m:radPr>
+                          <m:degHide m:val="on"/>
+                          <m:ctrlPr>
+                            <a:rPr lang="en-US" sz="1800" i="1" kern="100">
+                              <a:effectLst/>
+                              <a:latin typeface="Cambria Math" panose="02040503050406030204" pitchFamily="18" charset="0"/>
+                              <a:ea typeface="Calibri" panose="020F0502020204030204" pitchFamily="34" charset="0"/>
+                              <a:cs typeface="Cordia New" panose="020B0304020202020204" pitchFamily="34" charset="-34"/>
+                            </a:rPr>
+                          </m:ctrlPr>
+                        </m:radPr>
+                        <m:deg/>
+                        <m:e>
+                          <m:r>
+                            <a:rPr lang="en-US" sz="1800" i="1" kern="100">
+                              <a:effectLst/>
+                              <a:latin typeface="Cambria Math" panose="02040503050406030204" pitchFamily="18" charset="0"/>
+                              <a:ea typeface="Calibri" panose="020F0502020204030204" pitchFamily="34" charset="0"/>
+                              <a:cs typeface="Cordia New" panose="020B0304020202020204" pitchFamily="34" charset="-34"/>
+                            </a:rPr>
+                            <m:t>𝑤h</m:t>
+                          </m:r>
+                        </m:e>
+                      </m:rad>
+                      <m:r>
+                        <a:rPr lang="en-US" sz="1800" i="1" kern="100">
+                          <a:effectLst/>
+                          <a:latin typeface="Cambria Math" panose="02040503050406030204" pitchFamily="18" charset="0"/>
+                          <a:ea typeface="Calibri" panose="020F0502020204030204" pitchFamily="34" charset="0"/>
+                          <a:cs typeface="Cordia New" panose="020B0304020202020204" pitchFamily="34" charset="-34"/>
+                        </a:rPr>
+                        <m:t> ∙</m:t>
+                      </m:r>
+                      <m:r>
+                        <a:rPr lang="en-US" sz="1800" i="1" kern="100">
+                          <a:effectLst/>
+                          <a:latin typeface="Cambria Math" panose="02040503050406030204" pitchFamily="18" charset="0"/>
+                          <a:ea typeface="Calibri" panose="020F0502020204030204" pitchFamily="34" charset="0"/>
+                          <a:cs typeface="Cordia New" panose="020B0304020202020204" pitchFamily="34" charset="-34"/>
+                        </a:rPr>
+                        <m:t>𝑤</m:t>
+                      </m:r>
+                      <m:rad>
+                        <m:radPr>
+                          <m:degHide m:val="on"/>
+                          <m:ctrlPr>
+                            <a:rPr lang="en-US" sz="1800" i="1" kern="100">
+                              <a:effectLst/>
+                              <a:latin typeface="Cambria Math" panose="02040503050406030204" pitchFamily="18" charset="0"/>
+                              <a:ea typeface="Calibri" panose="020F0502020204030204" pitchFamily="34" charset="0"/>
+                              <a:cs typeface="Cordia New" panose="020B0304020202020204" pitchFamily="34" charset="-34"/>
+                            </a:rPr>
+                          </m:ctrlPr>
+                        </m:radPr>
+                        <m:deg/>
+                        <m:e>
+                          <m:r>
+                            <a:rPr lang="en-US" sz="1800" i="1" kern="100">
+                              <a:effectLst/>
+                              <a:latin typeface="Cambria Math" panose="02040503050406030204" pitchFamily="18" charset="0"/>
+                              <a:ea typeface="Calibri" panose="020F0502020204030204" pitchFamily="34" charset="0"/>
+                              <a:cs typeface="Cordia New" panose="020B0304020202020204" pitchFamily="34" charset="-34"/>
+                            </a:rPr>
+                            <m:t>𝑤h</m:t>
+                          </m:r>
+                        </m:e>
+                      </m:rad>
+                      <m:r>
+                        <a:rPr lang="en-US" sz="1800" i="1" kern="100">
+                          <a:effectLst/>
+                          <a:latin typeface="Cambria Math" panose="02040503050406030204" pitchFamily="18" charset="0"/>
+                          <a:ea typeface="Calibri" panose="020F0502020204030204" pitchFamily="34" charset="0"/>
+                          <a:cs typeface="Cordia New" panose="020B0304020202020204" pitchFamily="34" charset="-34"/>
+                        </a:rPr>
+                        <m:t>=</m:t>
+                      </m:r>
+                      <m:sSup>
+                        <m:sSupPr>
+                          <m:ctrlPr>
+                            <a:rPr lang="en-US" sz="1800" i="1" kern="100">
+                              <a:effectLst/>
+                              <a:latin typeface="Cambria Math" panose="02040503050406030204" pitchFamily="18" charset="0"/>
+                              <a:ea typeface="Calibri" panose="020F0502020204030204" pitchFamily="34" charset="0"/>
+                              <a:cs typeface="Cordia New" panose="020B0304020202020204" pitchFamily="34" charset="-34"/>
+                            </a:rPr>
+                          </m:ctrlPr>
+                        </m:sSupPr>
+                        <m:e>
+                          <m:d>
+                            <m:dPr>
+                              <m:ctrlPr>
+                                <a:rPr lang="en-US" sz="1800" i="1" kern="100">
+                                  <a:effectLst/>
+                                  <a:latin typeface="Cambria Math" panose="02040503050406030204" pitchFamily="18" charset="0"/>
+                                  <a:ea typeface="Calibri" panose="020F0502020204030204" pitchFamily="34" charset="0"/>
+                                  <a:cs typeface="Cordia New" panose="020B0304020202020204" pitchFamily="34" charset="-34"/>
+                                </a:rPr>
+                              </m:ctrlPr>
+                            </m:dPr>
+                            <m:e>
+                              <m:r>
+                                <a:rPr lang="en-US" sz="1800" i="1" kern="100">
+                                  <a:effectLst/>
+                                  <a:latin typeface="Cambria Math" panose="02040503050406030204" pitchFamily="18" charset="0"/>
+                                  <a:ea typeface="Calibri" panose="020F0502020204030204" pitchFamily="34" charset="0"/>
+                                  <a:cs typeface="Cordia New" panose="020B0304020202020204" pitchFamily="34" charset="-34"/>
+                                </a:rPr>
+                                <m:t>𝑤h</m:t>
+                              </m:r>
+                            </m:e>
+                          </m:d>
+                        </m:e>
+                        <m:sup>
+                          <m:r>
+                            <a:rPr lang="en-US" sz="1800" i="1" kern="100">
+                              <a:effectLst/>
+                              <a:latin typeface="Cambria Math" panose="02040503050406030204" pitchFamily="18" charset="0"/>
+                              <a:ea typeface="Calibri" panose="020F0502020204030204" pitchFamily="34" charset="0"/>
+                              <a:cs typeface="Cordia New" panose="020B0304020202020204" pitchFamily="34" charset="-34"/>
+                            </a:rPr>
+                            <m:t>2</m:t>
+                          </m:r>
+                        </m:sup>
+                      </m:sSup>
+                      <m:r>
+                        <a:rPr lang="en-US" sz="1800" i="1" kern="100">
+                          <a:effectLst/>
+                          <a:latin typeface="Cambria Math" panose="02040503050406030204" pitchFamily="18" charset="0"/>
+                          <a:ea typeface="Calibri" panose="020F0502020204030204" pitchFamily="34" charset="0"/>
+                          <a:cs typeface="Cordia New" panose="020B0304020202020204" pitchFamily="34" charset="-34"/>
+                        </a:rPr>
+                        <m:t>=</m:t>
+                      </m:r>
+                      <m:sSup>
+                        <m:sSupPr>
+                          <m:ctrlPr>
+                            <a:rPr lang="en-US" sz="1800" i="1" kern="100">
+                              <a:effectLst/>
+                              <a:latin typeface="Cambria Math" panose="02040503050406030204" pitchFamily="18" charset="0"/>
+                              <a:ea typeface="Calibri" panose="020F0502020204030204" pitchFamily="34" charset="0"/>
+                              <a:cs typeface="Cordia New" panose="020B0304020202020204" pitchFamily="34" charset="-34"/>
+                            </a:rPr>
+                          </m:ctrlPr>
+                        </m:sSupPr>
+                        <m:e>
+                          <m:r>
+                            <a:rPr lang="en-US" sz="1800" i="1" kern="100">
+                              <a:effectLst/>
+                              <a:latin typeface="Cambria Math" panose="02040503050406030204" pitchFamily="18" charset="0"/>
+                              <a:ea typeface="Calibri" panose="020F0502020204030204" pitchFamily="34" charset="0"/>
+                              <a:cs typeface="Cordia New" panose="020B0304020202020204" pitchFamily="34" charset="-34"/>
+                            </a:rPr>
+                            <m:t>𝑠</m:t>
+                          </m:r>
+                        </m:e>
+                        <m:sup>
+                          <m:r>
+                            <a:rPr lang="en-US" sz="1800" i="1" kern="100">
+                              <a:effectLst/>
+                              <a:latin typeface="Cambria Math" panose="02040503050406030204" pitchFamily="18" charset="0"/>
+                              <a:ea typeface="Calibri" panose="020F0502020204030204" pitchFamily="34" charset="0"/>
+                              <a:cs typeface="Cordia New" panose="020B0304020202020204" pitchFamily="34" charset="-34"/>
+                            </a:rPr>
+                            <m:t>2</m:t>
+                          </m:r>
+                        </m:sup>
+                      </m:sSup>
+                    </m:oMath>
+                  </m:oMathPara>
+                </a14:m>
+                <a:endParaRPr lang="en-US" kern="100" dirty="0">
+                  <a:ea typeface="Calibri" panose="020F0502020204030204" pitchFamily="34" charset="0"/>
+                  <a:cs typeface="Cordia New" panose="020B0304020202020204" pitchFamily="34" charset="-34"/>
+                </a:endParaRPr>
+              </a:p>
+              <a:p>
+                <a:pPr marL="0" marR="0">
+                  <a:lnSpc>
+                    <a:spcPct val="115000"/>
+                  </a:lnSpc>
+                  <a:spcAft>
+                    <a:spcPts val="800"/>
+                  </a:spcAft>
+                  <a:buNone/>
+                </a:pPr>
+                <a:r>
+                  <a:rPr lang="en-US" kern="100" dirty="0">
+                    <a:ea typeface="Calibri" panose="020F0502020204030204" pitchFamily="34" charset="0"/>
+                    <a:cs typeface="Cordia New" panose="020B0304020202020204" pitchFamily="34" charset="-34"/>
+                  </a:rPr>
+                  <a:t>Thus, squared root of aspect ratios was applied to make sure that anchor boxes having the same area of </a:t>
+                </a:r>
+                <a14:m>
+                  <m:oMath xmlns:m="http://schemas.openxmlformats.org/officeDocument/2006/math">
+                    <m:sSup>
+                      <m:sSupPr>
+                        <m:ctrlPr>
+                          <a:rPr lang="en-US" b="0" i="1" kern="100" smtClean="0">
+                            <a:latin typeface="Cambria Math" panose="02040503050406030204" pitchFamily="18" charset="0"/>
+                            <a:ea typeface="Calibri" panose="020F0502020204030204" pitchFamily="34" charset="0"/>
+                            <a:cs typeface="Cordia New" panose="020B0304020202020204" pitchFamily="34" charset="-34"/>
+                          </a:rPr>
+                        </m:ctrlPr>
+                      </m:sSupPr>
+                      <m:e>
+                        <m:r>
+                          <a:rPr lang="en-US" b="0" i="1" kern="100" smtClean="0">
+                            <a:latin typeface="Cambria Math" panose="02040503050406030204" pitchFamily="18" charset="0"/>
+                            <a:ea typeface="Calibri" panose="020F0502020204030204" pitchFamily="34" charset="0"/>
+                            <a:cs typeface="Cordia New" panose="020B0304020202020204" pitchFamily="34" charset="-34"/>
+                          </a:rPr>
+                          <m:t>𝑠</m:t>
+                        </m:r>
+                      </m:e>
+                      <m:sup>
+                        <m:r>
+                          <a:rPr lang="en-US" b="0" i="1" kern="100" smtClean="0">
+                            <a:latin typeface="Cambria Math" panose="02040503050406030204" pitchFamily="18" charset="0"/>
+                            <a:ea typeface="Calibri" panose="020F0502020204030204" pitchFamily="34" charset="0"/>
+                            <a:cs typeface="Cordia New" panose="020B0304020202020204" pitchFamily="34" charset="-34"/>
+                          </a:rPr>
+                          <m:t>2</m:t>
+                        </m:r>
+                      </m:sup>
+                    </m:sSup>
+                  </m:oMath>
+                </a14:m>
+                <a:r>
+                  <a:rPr lang="en-US" sz="1800" kern="100" dirty="0">
+                    <a:effectLst/>
+                    <a:ea typeface="Calibri" panose="020F0502020204030204" pitchFamily="34" charset="0"/>
+                    <a:cs typeface="Cordia New" panose="020B0304020202020204" pitchFamily="34" charset="-34"/>
+                  </a:rPr>
+                  <a:t> regardless of </a:t>
+                </a:r>
+                <a:r>
+                  <a:rPr lang="en-US" sz="1800" kern="100">
+                    <a:effectLst/>
+                    <a:ea typeface="Calibri" panose="020F0502020204030204" pitchFamily="34" charset="0"/>
+                    <a:cs typeface="Cordia New" panose="020B0304020202020204" pitchFamily="34" charset="-34"/>
+                  </a:rPr>
+                  <a:t>aspect ratios. </a:t>
+                </a:r>
+                <a:endParaRPr lang="en-US" sz="1800" kern="100" dirty="0">
+                  <a:effectLst/>
+                  <a:ea typeface="Calibri" panose="020F0502020204030204" pitchFamily="34" charset="0"/>
+                  <a:cs typeface="Cordia New" panose="020B0304020202020204" pitchFamily="34" charset="-34"/>
+                </a:endParaRPr>
+              </a:p>
+            </p:txBody>
+          </p:sp>
+        </mc:Choice>
+        <mc:Fallback xmlns="">
+          <p:sp>
+            <p:nvSpPr>
+              <p:cNvPr id="5" name="TextBox 4">
+                <a:extLst>
+                  <a:ext uri="{FF2B5EF4-FFF2-40B4-BE49-F238E27FC236}">
+                    <a16:creationId xmlns:a16="http://schemas.microsoft.com/office/drawing/2014/main" id="{D617FF8D-E2C5-75EA-0E1B-5FFC25DE50F4}"/>
+                  </a:ext>
+                </a:extLst>
+              </p:cNvPr>
+              <p:cNvSpPr txBox="1">
+                <a:spLocks noRot="1" noChangeAspect="1" noMove="1" noResize="1" noEditPoints="1" noAdjustHandles="1" noChangeArrowheads="1" noChangeShapeType="1" noTextEdit="1"/>
+              </p:cNvSpPr>
+              <p:nvPr/>
+            </p:nvSpPr>
+            <p:spPr>
+              <a:xfrm>
+                <a:off x="761999" y="1133194"/>
+                <a:ext cx="10417629" cy="4291496"/>
+              </a:xfrm>
+              <a:prstGeom prst="rect">
+                <a:avLst/>
+              </a:prstGeom>
+              <a:blipFill>
+                <a:blip r:embed="rId2"/>
+                <a:stretch>
+                  <a:fillRect l="-468" t="-142" b="-1420"/>
+                </a:stretch>
+              </a:blipFill>
+            </p:spPr>
+            <p:txBody>
+              <a:bodyPr/>
+              <a:lstStyle/>
+              <a:p>
+                <a:r>
+                  <a:rPr lang="en-US">
+                    <a:noFill/>
+                  </a:rPr>
+                  <a:t> </a:t>
+                </a:r>
+              </a:p>
+            </p:txBody>
+          </p:sp>
+        </mc:Fallback>
+      </mc:AlternateContent>
+      <p:sp>
+        <p:nvSpPr>
+          <p:cNvPr id="6" name="TextBox 5">
+            <a:extLst>
+              <a:ext uri="{FF2B5EF4-FFF2-40B4-BE49-F238E27FC236}">
+                <a16:creationId xmlns:a16="http://schemas.microsoft.com/office/drawing/2014/main" id="{3A59584D-53F1-6276-F5AE-108EA146B866}"/>
+              </a:ext>
+            </a:extLst>
+          </p:cNvPr>
+          <p:cNvSpPr txBox="1"/>
+          <p:nvPr/>
+        </p:nvSpPr>
+        <p:spPr>
+          <a:xfrm>
+            <a:off x="555170" y="381000"/>
+            <a:ext cx="5277123" cy="461665"/>
+          </a:xfrm>
+          <a:prstGeom prst="rect">
+            <a:avLst/>
+          </a:prstGeom>
+          <a:noFill/>
+        </p:spPr>
+        <p:txBody>
+          <a:bodyPr wrap="square" rtlCol="0">
+            <a:spAutoFit/>
+          </a:bodyPr>
+          <a:lstStyle/>
+          <a:p>
+            <a:r>
+              <a:rPr lang="en-US" sz="2400" b="1" dirty="0"/>
+              <a:t>Anchor Box Calculation</a:t>
+            </a:r>
+          </a:p>
+        </p:txBody>
+      </p:sp>
+    </p:spTree>
+    <p:extLst>
+      <p:ext uri="{BB962C8B-B14F-4D97-AF65-F5344CB8AC3E}">
+        <p14:creationId xmlns:p14="http://schemas.microsoft.com/office/powerpoint/2010/main" val="49399725"/>
+      </p:ext>
+    </p:extLst>
+  </p:cSld>
+  <p:clrMapOvr>
+    <a:masterClrMapping/>
+  </p:clrMapOvr>
+</p:sld>
+</file>
+
+<file path=ppt/slides/slide3.xml><?xml version="1.0" encoding="utf-8"?>
+<p:sld xmlns:a="http://schemas.openxmlformats.org/drawingml/2006/main" xmlns:r="http://schemas.openxmlformats.org/officeDocument/2006/relationships" xmlns:p="http://schemas.openxmlformats.org/presentationml/2006/main">
+  <p:cSld>
+    <p:spTree>
+      <p:nvGrpSpPr>
+        <p:cNvPr id="1" name=""/>
+        <p:cNvGrpSpPr/>
+        <p:nvPr/>
+      </p:nvGrpSpPr>
+      <p:grpSpPr>
+        <a:xfrm>
+          <a:off x="0" y="0"/>
+          <a:ext cx="0" cy="0"/>
+          <a:chOff x="0" y="0"/>
+          <a:chExt cx="0" cy="0"/>
+        </a:xfrm>
+      </p:grpSpPr>
+      <p:grpSp>
+        <p:nvGrpSpPr>
+          <p:cNvPr id="14" name="Group 13">
+            <a:extLst>
+              <a:ext uri="{FF2B5EF4-FFF2-40B4-BE49-F238E27FC236}">
+                <a16:creationId xmlns:a16="http://schemas.microsoft.com/office/drawing/2014/main" id="{A8AB0D7A-AA36-A942-A411-C8F0F2E2E913}"/>
+              </a:ext>
+            </a:extLst>
+          </p:cNvPr>
+          <p:cNvGrpSpPr>
+            <a:grpSpLocks noChangeAspect="1"/>
+          </p:cNvGrpSpPr>
+          <p:nvPr/>
+        </p:nvGrpSpPr>
+        <p:grpSpPr>
+          <a:xfrm>
+            <a:off x="368010" y="1911537"/>
+            <a:ext cx="4188687" cy="3034926"/>
+            <a:chOff x="265727" y="584337"/>
+            <a:chExt cx="6102415" cy="4421526"/>
+          </a:xfrm>
+        </p:grpSpPr>
+        <p:sp>
+          <p:nvSpPr>
+            <p:cNvPr id="4" name="Rectangle 3">
+              <a:extLst>
+                <a:ext uri="{FF2B5EF4-FFF2-40B4-BE49-F238E27FC236}">
+                  <a16:creationId xmlns:a16="http://schemas.microsoft.com/office/drawing/2014/main" id="{1E671AD3-B018-61E4-93EF-CD4686AC8FA8}"/>
+                </a:ext>
+              </a:extLst>
+            </p:cNvPr>
+            <p:cNvSpPr/>
+            <p:nvPr/>
+          </p:nvSpPr>
+          <p:spPr>
+            <a:xfrm>
+              <a:off x="914400" y="1217635"/>
+              <a:ext cx="5453742" cy="3788228"/>
+            </a:xfrm>
+            <a:prstGeom prst="rect">
+              <a:avLst/>
+            </a:prstGeom>
+            <a:solidFill>
+              <a:schemeClr val="accent6">
+                <a:lumMod val="20000"/>
+                <a:lumOff val="80000"/>
+              </a:schemeClr>
+            </a:solidFill>
+          </p:spPr>
+          <p:style>
+            <a:lnRef idx="2">
+              <a:schemeClr val="accent1">
+                <a:shade val="15000"/>
+              </a:schemeClr>
+            </a:lnRef>
+            <a:fillRef idx="1">
+              <a:schemeClr val="accent1"/>
+            </a:fillRef>
+            <a:effectRef idx="0">
+              <a:schemeClr val="accent1"/>
+            </a:effectRef>
+            <a:fontRef idx="minor">
+              <a:schemeClr val="lt1"/>
+            </a:fontRef>
+          </p:style>
+          <p:txBody>
+            <a:bodyPr rtlCol="0" anchor="ctr"/>
+            <a:lstStyle/>
+            <a:p>
+              <a:pPr algn="ctr"/>
+              <a:endParaRPr lang="en-US" sz="1500"/>
+            </a:p>
+          </p:txBody>
+        </p:sp>
+        <p:cxnSp>
+          <p:nvCxnSpPr>
+            <p:cNvPr id="9" name="Straight Arrow Connector 8">
+              <a:extLst>
+                <a:ext uri="{FF2B5EF4-FFF2-40B4-BE49-F238E27FC236}">
+                  <a16:creationId xmlns:a16="http://schemas.microsoft.com/office/drawing/2014/main" id="{218FE485-3692-3CBF-D28B-9B66DCCDBF16}"/>
+                </a:ext>
+              </a:extLst>
+            </p:cNvPr>
+            <p:cNvCxnSpPr/>
+            <p:nvPr/>
+          </p:nvCxnSpPr>
+          <p:spPr>
+            <a:xfrm>
+              <a:off x="914400" y="967263"/>
+              <a:ext cx="5453742" cy="0"/>
+            </a:xfrm>
+            <a:prstGeom prst="straightConnector1">
+              <a:avLst/>
+            </a:prstGeom>
+            <a:ln>
+              <a:headEnd type="diamond"/>
+              <a:tailEnd type="diamond"/>
+            </a:ln>
+          </p:spPr>
+          <p:style>
+            <a:lnRef idx="2">
+              <a:schemeClr val="accent1"/>
+            </a:lnRef>
+            <a:fillRef idx="0">
+              <a:schemeClr val="accent1"/>
+            </a:fillRef>
+            <a:effectRef idx="1">
+              <a:schemeClr val="accent1"/>
+            </a:effectRef>
+            <a:fontRef idx="minor">
+              <a:schemeClr val="tx1"/>
+            </a:fontRef>
+          </p:style>
+        </p:cxnSp>
+        <p:cxnSp>
+          <p:nvCxnSpPr>
+            <p:cNvPr id="10" name="Straight Arrow Connector 9">
+              <a:extLst>
+                <a:ext uri="{FF2B5EF4-FFF2-40B4-BE49-F238E27FC236}">
+                  <a16:creationId xmlns:a16="http://schemas.microsoft.com/office/drawing/2014/main" id="{767A5CAB-A429-F276-A230-455B4B43976F}"/>
+                </a:ext>
+              </a:extLst>
+            </p:cNvPr>
+            <p:cNvCxnSpPr>
+              <a:cxnSpLocks/>
+            </p:cNvCxnSpPr>
+            <p:nvPr/>
+          </p:nvCxnSpPr>
+          <p:spPr>
+            <a:xfrm>
+              <a:off x="685799" y="1239406"/>
+              <a:ext cx="0" cy="3766457"/>
+            </a:xfrm>
+            <a:prstGeom prst="straightConnector1">
+              <a:avLst/>
+            </a:prstGeom>
+            <a:ln>
+              <a:headEnd type="diamond"/>
+              <a:tailEnd type="diamond"/>
+            </a:ln>
+          </p:spPr>
+          <p:style>
+            <a:lnRef idx="2">
+              <a:schemeClr val="accent1"/>
+            </a:lnRef>
+            <a:fillRef idx="0">
+              <a:schemeClr val="accent1"/>
+            </a:fillRef>
+            <a:effectRef idx="1">
+              <a:schemeClr val="accent1"/>
+            </a:effectRef>
+            <a:fontRef idx="minor">
+              <a:schemeClr val="tx1"/>
+            </a:fontRef>
+          </p:style>
+        </p:cxnSp>
+        <p:sp>
+          <p:nvSpPr>
+            <p:cNvPr id="12" name="TextBox 11">
+              <a:extLst>
+                <a:ext uri="{FF2B5EF4-FFF2-40B4-BE49-F238E27FC236}">
+                  <a16:creationId xmlns:a16="http://schemas.microsoft.com/office/drawing/2014/main" id="{3946B49F-295C-D740-3D11-0874189B3279}"/>
+                </a:ext>
+              </a:extLst>
+            </p:cNvPr>
+            <p:cNvSpPr txBox="1"/>
+            <p:nvPr/>
+          </p:nvSpPr>
+          <p:spPr>
+            <a:xfrm rot="16200000">
+              <a:off x="-553472" y="2497822"/>
+              <a:ext cx="2109211" cy="470813"/>
+            </a:xfrm>
+            <a:prstGeom prst="rect">
+              <a:avLst/>
+            </a:prstGeom>
+            <a:noFill/>
+          </p:spPr>
+          <p:txBody>
+            <a:bodyPr wrap="square" rtlCol="0">
+              <a:spAutoFit/>
+            </a:bodyPr>
+            <a:lstStyle/>
+            <a:p>
+              <a:r>
+                <a:rPr lang="en-US" sz="1500" dirty="0"/>
+                <a:t>image-height</a:t>
+              </a:r>
+            </a:p>
+          </p:txBody>
+        </p:sp>
+        <p:sp>
+          <p:nvSpPr>
+            <p:cNvPr id="13" name="TextBox 12">
+              <a:extLst>
+                <a:ext uri="{FF2B5EF4-FFF2-40B4-BE49-F238E27FC236}">
+                  <a16:creationId xmlns:a16="http://schemas.microsoft.com/office/drawing/2014/main" id="{1CBF9509-78EE-48DE-7CEC-0A5AB5827D6C}"/>
+                </a:ext>
+              </a:extLst>
+            </p:cNvPr>
+            <p:cNvSpPr txBox="1"/>
+            <p:nvPr/>
+          </p:nvSpPr>
+          <p:spPr>
+            <a:xfrm>
+              <a:off x="2590515" y="584337"/>
+              <a:ext cx="2416629" cy="470813"/>
+            </a:xfrm>
+            <a:prstGeom prst="rect">
+              <a:avLst/>
+            </a:prstGeom>
+            <a:noFill/>
+          </p:spPr>
+          <p:txBody>
+            <a:bodyPr wrap="square" rtlCol="0">
+              <a:spAutoFit/>
+            </a:bodyPr>
+            <a:lstStyle/>
+            <a:p>
+              <a:r>
+                <a:rPr lang="en-US" sz="1500" dirty="0"/>
+                <a:t>image-width</a:t>
+              </a:r>
+            </a:p>
+          </p:txBody>
+        </p:sp>
+      </p:grpSp>
+      <p:grpSp>
+        <p:nvGrpSpPr>
+          <p:cNvPr id="15" name="Group 14">
+            <a:extLst>
+              <a:ext uri="{FF2B5EF4-FFF2-40B4-BE49-F238E27FC236}">
+                <a16:creationId xmlns:a16="http://schemas.microsoft.com/office/drawing/2014/main" id="{2B8C81C9-B8FE-1777-56C0-EAA38735DA09}"/>
+              </a:ext>
+            </a:extLst>
+          </p:cNvPr>
+          <p:cNvGrpSpPr>
+            <a:grpSpLocks noChangeAspect="1"/>
+          </p:cNvGrpSpPr>
+          <p:nvPr/>
+        </p:nvGrpSpPr>
+        <p:grpSpPr>
+          <a:xfrm>
+            <a:off x="4657485" y="2013011"/>
+            <a:ext cx="2398896" cy="1640808"/>
+            <a:chOff x="-289251" y="221330"/>
+            <a:chExt cx="7395717" cy="5058556"/>
+          </a:xfrm>
+        </p:grpSpPr>
+        <p:sp>
+          <p:nvSpPr>
+            <p:cNvPr id="16" name="Rectangle 15">
+              <a:extLst>
+                <a:ext uri="{FF2B5EF4-FFF2-40B4-BE49-F238E27FC236}">
+                  <a16:creationId xmlns:a16="http://schemas.microsoft.com/office/drawing/2014/main" id="{CBC655CB-1403-0A30-980D-A806650F2781}"/>
+                </a:ext>
+              </a:extLst>
+            </p:cNvPr>
+            <p:cNvSpPr/>
+            <p:nvPr/>
+          </p:nvSpPr>
+          <p:spPr>
+            <a:xfrm>
+              <a:off x="914400" y="1217635"/>
+              <a:ext cx="5453742" cy="3788228"/>
+            </a:xfrm>
+            <a:prstGeom prst="rect">
+              <a:avLst/>
+            </a:prstGeom>
+            <a:solidFill>
+              <a:schemeClr val="bg2"/>
+            </a:solidFill>
+          </p:spPr>
+          <p:style>
+            <a:lnRef idx="2">
+              <a:schemeClr val="accent1">
+                <a:shade val="15000"/>
+              </a:schemeClr>
+            </a:lnRef>
+            <a:fillRef idx="1">
+              <a:schemeClr val="accent1"/>
+            </a:fillRef>
+            <a:effectRef idx="0">
+              <a:schemeClr val="accent1"/>
+            </a:effectRef>
+            <a:fontRef idx="minor">
+              <a:schemeClr val="lt1"/>
+            </a:fontRef>
+          </p:style>
+          <p:txBody>
+            <a:bodyPr rtlCol="0" anchor="ctr"/>
+            <a:lstStyle/>
+            <a:p>
+              <a:pPr algn="ctr"/>
+              <a:endParaRPr lang="en-US" sz="1500"/>
+            </a:p>
+          </p:txBody>
+        </p:sp>
+        <p:cxnSp>
+          <p:nvCxnSpPr>
+            <p:cNvPr id="17" name="Straight Arrow Connector 16">
+              <a:extLst>
+                <a:ext uri="{FF2B5EF4-FFF2-40B4-BE49-F238E27FC236}">
+                  <a16:creationId xmlns:a16="http://schemas.microsoft.com/office/drawing/2014/main" id="{F1C26012-3981-417C-E397-630378EFB4CE}"/>
+                </a:ext>
+              </a:extLst>
+            </p:cNvPr>
+            <p:cNvCxnSpPr/>
+            <p:nvPr/>
+          </p:nvCxnSpPr>
+          <p:spPr>
+            <a:xfrm>
+              <a:off x="914400" y="967263"/>
+              <a:ext cx="5453742" cy="0"/>
+            </a:xfrm>
+            <a:prstGeom prst="straightConnector1">
+              <a:avLst/>
+            </a:prstGeom>
+            <a:ln>
+              <a:headEnd type="diamond"/>
+              <a:tailEnd type="diamond"/>
+            </a:ln>
+          </p:spPr>
+          <p:style>
+            <a:lnRef idx="2">
+              <a:schemeClr val="accent1"/>
+            </a:lnRef>
+            <a:fillRef idx="0">
+              <a:schemeClr val="accent1"/>
+            </a:fillRef>
+            <a:effectRef idx="1">
+              <a:schemeClr val="accent1"/>
+            </a:effectRef>
+            <a:fontRef idx="minor">
+              <a:schemeClr val="tx1"/>
+            </a:fontRef>
+          </p:style>
+        </p:cxnSp>
+        <p:cxnSp>
+          <p:nvCxnSpPr>
+            <p:cNvPr id="18" name="Straight Arrow Connector 17">
+              <a:extLst>
+                <a:ext uri="{FF2B5EF4-FFF2-40B4-BE49-F238E27FC236}">
+                  <a16:creationId xmlns:a16="http://schemas.microsoft.com/office/drawing/2014/main" id="{BC146E9F-5022-EBC1-FE96-433384AFC780}"/>
+                </a:ext>
+              </a:extLst>
+            </p:cNvPr>
+            <p:cNvCxnSpPr>
+              <a:cxnSpLocks/>
+            </p:cNvCxnSpPr>
+            <p:nvPr/>
+          </p:nvCxnSpPr>
+          <p:spPr>
+            <a:xfrm>
+              <a:off x="685799" y="1239406"/>
+              <a:ext cx="0" cy="3766457"/>
+            </a:xfrm>
+            <a:prstGeom prst="straightConnector1">
+              <a:avLst/>
+            </a:prstGeom>
+            <a:ln>
+              <a:headEnd type="diamond"/>
+              <a:tailEnd type="diamond"/>
+            </a:ln>
+          </p:spPr>
+          <p:style>
+            <a:lnRef idx="2">
+              <a:schemeClr val="accent1"/>
+            </a:lnRef>
+            <a:fillRef idx="0">
+              <a:schemeClr val="accent1"/>
+            </a:fillRef>
+            <a:effectRef idx="1">
+              <a:schemeClr val="accent1"/>
+            </a:effectRef>
+            <a:fontRef idx="minor">
+              <a:schemeClr val="tx1"/>
+            </a:fontRef>
+          </p:style>
+        </p:cxnSp>
+        <p:sp>
+          <p:nvSpPr>
+            <p:cNvPr id="19" name="TextBox 18">
+              <a:extLst>
+                <a:ext uri="{FF2B5EF4-FFF2-40B4-BE49-F238E27FC236}">
+                  <a16:creationId xmlns:a16="http://schemas.microsoft.com/office/drawing/2014/main" id="{3441A223-39A0-23AE-D0F5-82BEEC9D9BE5}"/>
+                </a:ext>
+              </a:extLst>
+            </p:cNvPr>
+            <p:cNvSpPr txBox="1"/>
+            <p:nvPr/>
+          </p:nvSpPr>
+          <p:spPr>
+            <a:xfrm rot="16200000">
+              <a:off x="-2209631" y="2363199"/>
+              <a:ext cx="4837067" cy="996307"/>
+            </a:xfrm>
+            <a:prstGeom prst="rect">
+              <a:avLst/>
+            </a:prstGeom>
+            <a:noFill/>
+          </p:spPr>
+          <p:txBody>
+            <a:bodyPr wrap="square" rtlCol="0">
+              <a:spAutoFit/>
+            </a:bodyPr>
+            <a:lstStyle/>
+            <a:p>
+              <a:r>
+                <a:rPr lang="en-US" sz="1500" dirty="0"/>
+                <a:t>feature-height</a:t>
+              </a:r>
+            </a:p>
+          </p:txBody>
+        </p:sp>
+        <p:sp>
+          <p:nvSpPr>
+            <p:cNvPr id="20" name="TextBox 19">
+              <a:extLst>
+                <a:ext uri="{FF2B5EF4-FFF2-40B4-BE49-F238E27FC236}">
+                  <a16:creationId xmlns:a16="http://schemas.microsoft.com/office/drawing/2014/main" id="{E816AF69-97A0-1E6B-6CD4-050DAFE191AA}"/>
+                </a:ext>
+              </a:extLst>
+            </p:cNvPr>
+            <p:cNvSpPr txBox="1"/>
+            <p:nvPr/>
+          </p:nvSpPr>
+          <p:spPr>
+            <a:xfrm>
+              <a:off x="1279048" y="221330"/>
+              <a:ext cx="5827418" cy="996307"/>
+            </a:xfrm>
+            <a:prstGeom prst="rect">
+              <a:avLst/>
+            </a:prstGeom>
+            <a:noFill/>
+          </p:spPr>
+          <p:txBody>
+            <a:bodyPr wrap="square" rtlCol="0">
+              <a:spAutoFit/>
+            </a:bodyPr>
+            <a:lstStyle/>
+            <a:p>
+              <a:r>
+                <a:rPr lang="en-US" sz="1500" dirty="0"/>
+                <a:t>feature-width</a:t>
+              </a:r>
+            </a:p>
+          </p:txBody>
+        </p:sp>
+      </p:grpSp>
+      <p:grpSp>
+        <p:nvGrpSpPr>
+          <p:cNvPr id="39" name="Group 38">
+            <a:extLst>
+              <a:ext uri="{FF2B5EF4-FFF2-40B4-BE49-F238E27FC236}">
+                <a16:creationId xmlns:a16="http://schemas.microsoft.com/office/drawing/2014/main" id="{E603E929-7CCC-F02E-F816-C834F1D24F09}"/>
+              </a:ext>
+            </a:extLst>
+          </p:cNvPr>
+          <p:cNvGrpSpPr/>
+          <p:nvPr/>
+        </p:nvGrpSpPr>
+        <p:grpSpPr>
+          <a:xfrm>
+            <a:off x="7360021" y="3176438"/>
+            <a:ext cx="4188687" cy="3034926"/>
+            <a:chOff x="354955" y="3314609"/>
+            <a:chExt cx="4188687" cy="3034926"/>
+          </a:xfrm>
+        </p:grpSpPr>
+        <p:grpSp>
+          <p:nvGrpSpPr>
+            <p:cNvPr id="27" name="Group 26">
+              <a:extLst>
+                <a:ext uri="{FF2B5EF4-FFF2-40B4-BE49-F238E27FC236}">
+                  <a16:creationId xmlns:a16="http://schemas.microsoft.com/office/drawing/2014/main" id="{309EF6C4-4266-43EB-DBF0-E79ADD8DC69A}"/>
+                </a:ext>
+              </a:extLst>
+            </p:cNvPr>
+            <p:cNvGrpSpPr>
+              <a:grpSpLocks noChangeAspect="1"/>
+            </p:cNvGrpSpPr>
+            <p:nvPr/>
+          </p:nvGrpSpPr>
+          <p:grpSpPr>
+            <a:xfrm>
+              <a:off x="354955" y="3314609"/>
+              <a:ext cx="4188687" cy="3034926"/>
+              <a:chOff x="265727" y="584337"/>
+              <a:chExt cx="6102415" cy="4421526"/>
+            </a:xfrm>
+          </p:grpSpPr>
+          <p:sp>
+            <p:nvSpPr>
+              <p:cNvPr id="28" name="Rectangle 27">
+                <a:extLst>
+                  <a:ext uri="{FF2B5EF4-FFF2-40B4-BE49-F238E27FC236}">
+                    <a16:creationId xmlns:a16="http://schemas.microsoft.com/office/drawing/2014/main" id="{D6470A87-F0C1-2C98-3B70-77BB1DB8332A}"/>
+                  </a:ext>
+                </a:extLst>
+              </p:cNvPr>
+              <p:cNvSpPr/>
+              <p:nvPr/>
+            </p:nvSpPr>
+            <p:spPr>
+              <a:xfrm>
+                <a:off x="914400" y="1217635"/>
+                <a:ext cx="5453742" cy="3788228"/>
+              </a:xfrm>
+              <a:prstGeom prst="rect">
+                <a:avLst/>
+              </a:prstGeom>
+              <a:solidFill>
+                <a:schemeClr val="accent6">
+                  <a:lumMod val="20000"/>
+                  <a:lumOff val="80000"/>
+                </a:schemeClr>
+              </a:solidFill>
+            </p:spPr>
+            <p:style>
+              <a:lnRef idx="2">
+                <a:schemeClr val="accent1">
+                  <a:shade val="15000"/>
+                </a:schemeClr>
+              </a:lnRef>
+              <a:fillRef idx="1">
+                <a:schemeClr val="accent1"/>
+              </a:fillRef>
+              <a:effectRef idx="0">
+                <a:schemeClr val="accent1"/>
+              </a:effectRef>
+              <a:fontRef idx="minor">
+                <a:schemeClr val="lt1"/>
+              </a:fontRef>
+            </p:style>
+            <p:txBody>
+              <a:bodyPr rtlCol="0" anchor="ctr"/>
+              <a:lstStyle/>
+              <a:p>
+                <a:pPr algn="ctr"/>
+                <a:endParaRPr lang="en-US" sz="1500"/>
+              </a:p>
+            </p:txBody>
+          </p:sp>
+          <p:cxnSp>
+            <p:nvCxnSpPr>
+              <p:cNvPr id="29" name="Straight Arrow Connector 28">
+                <a:extLst>
+                  <a:ext uri="{FF2B5EF4-FFF2-40B4-BE49-F238E27FC236}">
+                    <a16:creationId xmlns:a16="http://schemas.microsoft.com/office/drawing/2014/main" id="{D9BB4E62-C89C-EAEC-A8CB-7AD4AA3D74D6}"/>
+                  </a:ext>
+                </a:extLst>
+              </p:cNvPr>
+              <p:cNvCxnSpPr/>
+              <p:nvPr/>
+            </p:nvCxnSpPr>
+            <p:spPr>
+              <a:xfrm>
+                <a:off x="914400" y="967263"/>
+                <a:ext cx="5453742" cy="0"/>
+              </a:xfrm>
+              <a:prstGeom prst="straightConnector1">
+                <a:avLst/>
+              </a:prstGeom>
+              <a:ln>
+                <a:headEnd type="diamond"/>
+                <a:tailEnd type="diamond"/>
+              </a:ln>
+            </p:spPr>
+            <p:style>
+              <a:lnRef idx="2">
+                <a:schemeClr val="accent1"/>
+              </a:lnRef>
+              <a:fillRef idx="0">
+                <a:schemeClr val="accent1"/>
+              </a:fillRef>
+              <a:effectRef idx="1">
+                <a:schemeClr val="accent1"/>
+              </a:effectRef>
+              <a:fontRef idx="minor">
+                <a:schemeClr val="tx1"/>
+              </a:fontRef>
+            </p:style>
+          </p:cxnSp>
+          <p:cxnSp>
+            <p:nvCxnSpPr>
+              <p:cNvPr id="30" name="Straight Arrow Connector 29">
+                <a:extLst>
+                  <a:ext uri="{FF2B5EF4-FFF2-40B4-BE49-F238E27FC236}">
+                    <a16:creationId xmlns:a16="http://schemas.microsoft.com/office/drawing/2014/main" id="{5347C1DE-B098-461F-CB3F-7BC5D9B1A125}"/>
+                  </a:ext>
+                </a:extLst>
+              </p:cNvPr>
+              <p:cNvCxnSpPr>
+                <a:cxnSpLocks/>
+              </p:cNvCxnSpPr>
+              <p:nvPr/>
+            </p:nvCxnSpPr>
+            <p:spPr>
+              <a:xfrm>
+                <a:off x="685799" y="1239406"/>
+                <a:ext cx="0" cy="3766457"/>
+              </a:xfrm>
+              <a:prstGeom prst="straightConnector1">
+                <a:avLst/>
+              </a:prstGeom>
+              <a:ln>
+                <a:headEnd type="diamond"/>
+                <a:tailEnd type="diamond"/>
+              </a:ln>
+            </p:spPr>
+            <p:style>
+              <a:lnRef idx="2">
+                <a:schemeClr val="accent1"/>
+              </a:lnRef>
+              <a:fillRef idx="0">
+                <a:schemeClr val="accent1"/>
+              </a:fillRef>
+              <a:effectRef idx="1">
+                <a:schemeClr val="accent1"/>
+              </a:effectRef>
+              <a:fontRef idx="minor">
+                <a:schemeClr val="tx1"/>
+              </a:fontRef>
+            </p:style>
+          </p:cxnSp>
+          <p:sp>
+            <p:nvSpPr>
+              <p:cNvPr id="31" name="TextBox 30">
+                <a:extLst>
+                  <a:ext uri="{FF2B5EF4-FFF2-40B4-BE49-F238E27FC236}">
+                    <a16:creationId xmlns:a16="http://schemas.microsoft.com/office/drawing/2014/main" id="{85B3AA0D-730B-DEA7-566D-01AEFC4599FD}"/>
+                  </a:ext>
+                </a:extLst>
+              </p:cNvPr>
+              <p:cNvSpPr txBox="1"/>
+              <p:nvPr/>
+            </p:nvSpPr>
+            <p:spPr>
+              <a:xfrm rot="16200000">
+                <a:off x="-553472" y="2497822"/>
+                <a:ext cx="2109211" cy="470813"/>
+              </a:xfrm>
+              <a:prstGeom prst="rect">
+                <a:avLst/>
+              </a:prstGeom>
+              <a:noFill/>
+            </p:spPr>
+            <p:txBody>
+              <a:bodyPr wrap="square" rtlCol="0">
+                <a:spAutoFit/>
+              </a:bodyPr>
+              <a:lstStyle/>
+              <a:p>
+                <a:r>
+                  <a:rPr lang="en-US" sz="1500" dirty="0"/>
+                  <a:t>image-height</a:t>
+                </a:r>
+              </a:p>
+            </p:txBody>
+          </p:sp>
+          <p:sp>
+            <p:nvSpPr>
+              <p:cNvPr id="32" name="TextBox 31">
+                <a:extLst>
+                  <a:ext uri="{FF2B5EF4-FFF2-40B4-BE49-F238E27FC236}">
+                    <a16:creationId xmlns:a16="http://schemas.microsoft.com/office/drawing/2014/main" id="{1DDA8DC8-B9C9-4B70-551C-CC4A793D5F63}"/>
+                  </a:ext>
+                </a:extLst>
+              </p:cNvPr>
+              <p:cNvSpPr txBox="1"/>
+              <p:nvPr/>
+            </p:nvSpPr>
+            <p:spPr>
+              <a:xfrm>
+                <a:off x="2590515" y="584337"/>
+                <a:ext cx="2416629" cy="470813"/>
+              </a:xfrm>
+              <a:prstGeom prst="rect">
+                <a:avLst/>
+              </a:prstGeom>
+              <a:noFill/>
+            </p:spPr>
+            <p:txBody>
+              <a:bodyPr wrap="square" rtlCol="0">
+                <a:spAutoFit/>
+              </a:bodyPr>
+              <a:lstStyle/>
+              <a:p>
+                <a:r>
+                  <a:rPr lang="en-US" sz="1500" dirty="0"/>
+                  <a:t>image-width</a:t>
+                </a:r>
+              </a:p>
+            </p:txBody>
+          </p:sp>
+        </p:grpSp>
+        <p:sp>
+          <p:nvSpPr>
+            <p:cNvPr id="33" name="Rectangle 32">
+              <a:extLst>
+                <a:ext uri="{FF2B5EF4-FFF2-40B4-BE49-F238E27FC236}">
+                  <a16:creationId xmlns:a16="http://schemas.microsoft.com/office/drawing/2014/main" id="{DC256B08-0AA5-18DD-0916-15A7AD59B71E}"/>
+                </a:ext>
+              </a:extLst>
+            </p:cNvPr>
+            <p:cNvSpPr/>
+            <p:nvPr/>
+          </p:nvSpPr>
+          <p:spPr>
+            <a:xfrm>
+              <a:off x="813259" y="3759097"/>
+              <a:ext cx="1768991" cy="1228761"/>
+            </a:xfrm>
+            <a:prstGeom prst="rect">
+              <a:avLst/>
+            </a:prstGeom>
+            <a:solidFill>
+              <a:schemeClr val="bg2"/>
+            </a:solidFill>
+          </p:spPr>
+          <p:style>
+            <a:lnRef idx="2">
+              <a:schemeClr val="accent1">
+                <a:shade val="15000"/>
+              </a:schemeClr>
+            </a:lnRef>
+            <a:fillRef idx="1">
+              <a:schemeClr val="accent1"/>
+            </a:fillRef>
+            <a:effectRef idx="0">
+              <a:schemeClr val="accent1"/>
+            </a:effectRef>
+            <a:fontRef idx="minor">
+              <a:schemeClr val="lt1"/>
+            </a:fontRef>
+          </p:style>
+          <p:txBody>
+            <a:bodyPr rtlCol="0" anchor="ctr"/>
+            <a:lstStyle/>
+            <a:p>
+              <a:pPr algn="ctr"/>
+              <a:endParaRPr lang="en-US" sz="1500"/>
+            </a:p>
+          </p:txBody>
+        </p:sp>
+        <p:sp>
+          <p:nvSpPr>
+            <p:cNvPr id="34" name="Rectangle 33">
+              <a:extLst>
+                <a:ext uri="{FF2B5EF4-FFF2-40B4-BE49-F238E27FC236}">
+                  <a16:creationId xmlns:a16="http://schemas.microsoft.com/office/drawing/2014/main" id="{C17C1D5F-1CC2-C74F-0342-BAF295DE0419}"/>
+                </a:ext>
+              </a:extLst>
+            </p:cNvPr>
+            <p:cNvSpPr/>
+            <p:nvPr/>
+          </p:nvSpPr>
+          <p:spPr>
+            <a:xfrm>
+              <a:off x="2595720" y="3759095"/>
+              <a:ext cx="1768991" cy="1228761"/>
+            </a:xfrm>
+            <a:prstGeom prst="rect">
+              <a:avLst/>
+            </a:prstGeom>
+            <a:solidFill>
+              <a:schemeClr val="bg2"/>
+            </a:solidFill>
+          </p:spPr>
+          <p:style>
+            <a:lnRef idx="2">
+              <a:schemeClr val="accent1">
+                <a:shade val="15000"/>
+              </a:schemeClr>
+            </a:lnRef>
+            <a:fillRef idx="1">
+              <a:schemeClr val="accent1"/>
+            </a:fillRef>
+            <a:effectRef idx="0">
+              <a:schemeClr val="accent1"/>
+            </a:effectRef>
+            <a:fontRef idx="minor">
+              <a:schemeClr val="lt1"/>
+            </a:fontRef>
+          </p:style>
+          <p:txBody>
+            <a:bodyPr rtlCol="0" anchor="ctr"/>
+            <a:lstStyle/>
+            <a:p>
+              <a:pPr algn="ctr"/>
+              <a:endParaRPr lang="en-US" sz="1500"/>
+            </a:p>
+          </p:txBody>
+        </p:sp>
+        <p:sp>
+          <p:nvSpPr>
+            <p:cNvPr id="35" name="Oval 34">
+              <a:extLst>
+                <a:ext uri="{FF2B5EF4-FFF2-40B4-BE49-F238E27FC236}">
+                  <a16:creationId xmlns:a16="http://schemas.microsoft.com/office/drawing/2014/main" id="{AC73B194-A208-3E21-5E38-F720F67D74EC}"/>
+                </a:ext>
+              </a:extLst>
+            </p:cNvPr>
+            <p:cNvSpPr/>
+            <p:nvPr/>
+          </p:nvSpPr>
+          <p:spPr>
+            <a:xfrm>
+              <a:off x="1611086" y="4327757"/>
+              <a:ext cx="86668" cy="91440"/>
+            </a:xfrm>
+            <a:prstGeom prst="ellipse">
+              <a:avLst/>
+            </a:prstGeom>
+          </p:spPr>
+          <p:style>
+            <a:lnRef idx="2">
+              <a:schemeClr val="accent1">
+                <a:shade val="15000"/>
+              </a:schemeClr>
+            </a:lnRef>
+            <a:fillRef idx="1">
+              <a:schemeClr val="accent1"/>
+            </a:fillRef>
+            <a:effectRef idx="0">
+              <a:schemeClr val="accent1"/>
+            </a:effectRef>
+            <a:fontRef idx="minor">
+              <a:schemeClr val="lt1"/>
+            </a:fontRef>
+          </p:style>
+          <p:txBody>
+            <a:bodyPr rtlCol="0" anchor="ctr"/>
+            <a:lstStyle/>
+            <a:p>
+              <a:pPr algn="ctr"/>
+              <a:endParaRPr lang="en-US"/>
+            </a:p>
+          </p:txBody>
+        </p:sp>
+        <p:sp>
+          <p:nvSpPr>
+            <p:cNvPr id="36" name="Oval 35">
+              <a:extLst>
+                <a:ext uri="{FF2B5EF4-FFF2-40B4-BE49-F238E27FC236}">
+                  <a16:creationId xmlns:a16="http://schemas.microsoft.com/office/drawing/2014/main" id="{BAEB4E0E-0308-BCD9-7BCD-B6DF4C66DFB4}"/>
+                </a:ext>
+              </a:extLst>
+            </p:cNvPr>
+            <p:cNvSpPr/>
+            <p:nvPr/>
+          </p:nvSpPr>
+          <p:spPr>
+            <a:xfrm>
+              <a:off x="3436881" y="4327757"/>
+              <a:ext cx="86668" cy="91440"/>
+            </a:xfrm>
+            <a:prstGeom prst="ellipse">
+              <a:avLst/>
+            </a:prstGeom>
+          </p:spPr>
+          <p:style>
+            <a:lnRef idx="2">
+              <a:schemeClr val="accent1">
+                <a:shade val="15000"/>
+              </a:schemeClr>
+            </a:lnRef>
+            <a:fillRef idx="1">
+              <a:schemeClr val="accent1"/>
+            </a:fillRef>
+            <a:effectRef idx="0">
+              <a:schemeClr val="accent1"/>
+            </a:effectRef>
+            <a:fontRef idx="minor">
+              <a:schemeClr val="lt1"/>
+            </a:fontRef>
+          </p:style>
+          <p:txBody>
+            <a:bodyPr rtlCol="0" anchor="ctr"/>
+            <a:lstStyle/>
+            <a:p>
+              <a:pPr algn="ctr"/>
+              <a:endParaRPr lang="en-US"/>
+            </a:p>
+          </p:txBody>
+        </p:sp>
+        <p:sp>
+          <p:nvSpPr>
+            <p:cNvPr id="37" name="Right Brace 36">
+              <a:extLst>
+                <a:ext uri="{FF2B5EF4-FFF2-40B4-BE49-F238E27FC236}">
+                  <a16:creationId xmlns:a16="http://schemas.microsoft.com/office/drawing/2014/main" id="{2055626C-B29D-772F-0CAB-C66D76074637}"/>
+                </a:ext>
+              </a:extLst>
+            </p:cNvPr>
+            <p:cNvSpPr/>
+            <p:nvPr/>
+          </p:nvSpPr>
+          <p:spPr>
+            <a:xfrm rot="5400000">
+              <a:off x="2427767" y="3754902"/>
+              <a:ext cx="278869" cy="1768991"/>
+            </a:xfrm>
+            <a:prstGeom prst="rightBrace">
+              <a:avLst/>
+            </a:prstGeom>
+          </p:spPr>
+          <p:style>
+            <a:lnRef idx="2">
+              <a:schemeClr val="accent1"/>
+            </a:lnRef>
+            <a:fillRef idx="0">
+              <a:schemeClr val="accent1"/>
+            </a:fillRef>
+            <a:effectRef idx="1">
+              <a:schemeClr val="accent1"/>
+            </a:effectRef>
+            <a:fontRef idx="minor">
+              <a:schemeClr val="tx1"/>
+            </a:fontRef>
+          </p:style>
+          <p:txBody>
+            <a:bodyPr rtlCol="0" anchor="ctr"/>
+            <a:lstStyle/>
+            <a:p>
+              <a:pPr algn="ctr"/>
+              <a:endParaRPr lang="en-US"/>
+            </a:p>
+          </p:txBody>
+        </p:sp>
+        <p:sp>
+          <p:nvSpPr>
+            <p:cNvPr id="38" name="TextBox 37">
+              <a:extLst>
+                <a:ext uri="{FF2B5EF4-FFF2-40B4-BE49-F238E27FC236}">
+                  <a16:creationId xmlns:a16="http://schemas.microsoft.com/office/drawing/2014/main" id="{91E3B9BE-EDE9-7978-2EFB-B88D56C3C086}"/>
+                </a:ext>
+              </a:extLst>
+            </p:cNvPr>
+            <p:cNvSpPr txBox="1"/>
+            <p:nvPr/>
+          </p:nvSpPr>
+          <p:spPr>
+            <a:xfrm>
+              <a:off x="1854664" y="4310400"/>
+              <a:ext cx="1055914" cy="369332"/>
+            </a:xfrm>
+            <a:prstGeom prst="rect">
+              <a:avLst/>
+            </a:prstGeom>
+            <a:noFill/>
+          </p:spPr>
+          <p:txBody>
+            <a:bodyPr wrap="square" rtlCol="0">
+              <a:spAutoFit/>
+            </a:bodyPr>
+            <a:lstStyle/>
+            <a:p>
+              <a:r>
+                <a:rPr lang="en-US" dirty="0"/>
+                <a:t>stride</a:t>
+              </a:r>
+            </a:p>
+          </p:txBody>
+        </p:sp>
+      </p:grpSp>
+      <p:sp>
+        <p:nvSpPr>
+          <p:cNvPr id="40" name="TextBox 39">
+            <a:extLst>
+              <a:ext uri="{FF2B5EF4-FFF2-40B4-BE49-F238E27FC236}">
+                <a16:creationId xmlns:a16="http://schemas.microsoft.com/office/drawing/2014/main" id="{97E4E45E-C0B5-C879-7EFC-699ADFA492F7}"/>
+              </a:ext>
+            </a:extLst>
+          </p:cNvPr>
+          <p:cNvSpPr txBox="1"/>
+          <p:nvPr/>
+        </p:nvSpPr>
+        <p:spPr>
+          <a:xfrm>
+            <a:off x="555170" y="381000"/>
+            <a:ext cx="5277123" cy="461665"/>
+          </a:xfrm>
+          <a:prstGeom prst="rect">
+            <a:avLst/>
+          </a:prstGeom>
+          <a:noFill/>
+        </p:spPr>
+        <p:txBody>
+          <a:bodyPr wrap="square" rtlCol="0">
+            <a:spAutoFit/>
+          </a:bodyPr>
+          <a:lstStyle/>
+          <a:p>
+            <a:r>
+              <a:rPr lang="en-US" sz="2400" b="1" dirty="0"/>
+              <a:t>Anchor Box Calculation</a:t>
+            </a:r>
+          </a:p>
+        </p:txBody>
+      </p:sp>
+    </p:spTree>
+    <p:extLst>
+      <p:ext uri="{BB962C8B-B14F-4D97-AF65-F5344CB8AC3E}">
+        <p14:creationId xmlns:p14="http://schemas.microsoft.com/office/powerpoint/2010/main" val="2282245062"/>
       </p:ext>
     </p:extLst>
   </p:cSld>

</xml_diff>

<commit_message>
doc: mask_rcnn/doc/networks.pptx: aspect ratio and anchor calculation in 3D
</commit_message>
<xml_diff>
--- a/mask_rcnn/doc/networks.pptx
+++ b/mask_rcnn/doc/networks.pptx
@@ -7,7 +7,8 @@
   <p:sldIdLst>
     <p:sldId id="256" r:id="rId2"/>
     <p:sldId id="257" r:id="rId3"/>
-    <p:sldId id="258" r:id="rId4"/>
+    <p:sldId id="259" r:id="rId4"/>
+    <p:sldId id="258" r:id="rId5"/>
   </p:sldIdLst>
   <p:sldSz cx="12192000" cy="6858000"/>
   <p:notesSz cx="6858000" cy="9144000"/>
@@ -261,7 +262,7 @@
           <a:p>
             <a:fld id="{118988BA-6DA2-47E2-A1CD-CED21CFF5A8E}" type="datetimeFigureOut">
               <a:rPr lang="en-US" smtClean="0"/>
-              <a:t>8/8/2025</a:t>
+              <a:t>8/9/2025</a:t>
             </a:fld>
             <a:endParaRPr lang="en-US"/>
           </a:p>
@@ -459,7 +460,7 @@
           <a:p>
             <a:fld id="{118988BA-6DA2-47E2-A1CD-CED21CFF5A8E}" type="datetimeFigureOut">
               <a:rPr lang="en-US" smtClean="0"/>
-              <a:t>8/8/2025</a:t>
+              <a:t>8/9/2025</a:t>
             </a:fld>
             <a:endParaRPr lang="en-US"/>
           </a:p>
@@ -667,7 +668,7 @@
           <a:p>
             <a:fld id="{118988BA-6DA2-47E2-A1CD-CED21CFF5A8E}" type="datetimeFigureOut">
               <a:rPr lang="en-US" smtClean="0"/>
-              <a:t>8/8/2025</a:t>
+              <a:t>8/9/2025</a:t>
             </a:fld>
             <a:endParaRPr lang="en-US"/>
           </a:p>
@@ -865,7 +866,7 @@
           <a:p>
             <a:fld id="{118988BA-6DA2-47E2-A1CD-CED21CFF5A8E}" type="datetimeFigureOut">
               <a:rPr lang="en-US" smtClean="0"/>
-              <a:t>8/8/2025</a:t>
+              <a:t>8/9/2025</a:t>
             </a:fld>
             <a:endParaRPr lang="en-US"/>
           </a:p>
@@ -1140,7 +1141,7 @@
           <a:p>
             <a:fld id="{118988BA-6DA2-47E2-A1CD-CED21CFF5A8E}" type="datetimeFigureOut">
               <a:rPr lang="en-US" smtClean="0"/>
-              <a:t>8/8/2025</a:t>
+              <a:t>8/9/2025</a:t>
             </a:fld>
             <a:endParaRPr lang="en-US"/>
           </a:p>
@@ -1405,7 +1406,7 @@
           <a:p>
             <a:fld id="{118988BA-6DA2-47E2-A1CD-CED21CFF5A8E}" type="datetimeFigureOut">
               <a:rPr lang="en-US" smtClean="0"/>
-              <a:t>8/8/2025</a:t>
+              <a:t>8/9/2025</a:t>
             </a:fld>
             <a:endParaRPr lang="en-US"/>
           </a:p>
@@ -1817,7 +1818,7 @@
           <a:p>
             <a:fld id="{118988BA-6DA2-47E2-A1CD-CED21CFF5A8E}" type="datetimeFigureOut">
               <a:rPr lang="en-US" smtClean="0"/>
-              <a:t>8/8/2025</a:t>
+              <a:t>8/9/2025</a:t>
             </a:fld>
             <a:endParaRPr lang="en-US"/>
           </a:p>
@@ -1958,7 +1959,7 @@
           <a:p>
             <a:fld id="{118988BA-6DA2-47E2-A1CD-CED21CFF5A8E}" type="datetimeFigureOut">
               <a:rPr lang="en-US" smtClean="0"/>
-              <a:t>8/8/2025</a:t>
+              <a:t>8/9/2025</a:t>
             </a:fld>
             <a:endParaRPr lang="en-US"/>
           </a:p>
@@ -2071,7 +2072,7 @@
           <a:p>
             <a:fld id="{118988BA-6DA2-47E2-A1CD-CED21CFF5A8E}" type="datetimeFigureOut">
               <a:rPr lang="en-US" smtClean="0"/>
-              <a:t>8/8/2025</a:t>
+              <a:t>8/9/2025</a:t>
             </a:fld>
             <a:endParaRPr lang="en-US"/>
           </a:p>
@@ -2382,7 +2383,7 @@
           <a:p>
             <a:fld id="{118988BA-6DA2-47E2-A1CD-CED21CFF5A8E}" type="datetimeFigureOut">
               <a:rPr lang="en-US" smtClean="0"/>
-              <a:t>8/8/2025</a:t>
+              <a:t>8/9/2025</a:t>
             </a:fld>
             <a:endParaRPr lang="en-US"/>
           </a:p>
@@ -2670,7 +2671,7 @@
           <a:p>
             <a:fld id="{118988BA-6DA2-47E2-A1CD-CED21CFF5A8E}" type="datetimeFigureOut">
               <a:rPr lang="en-US" smtClean="0"/>
-              <a:t>8/8/2025</a:t>
+              <a:t>8/9/2025</a:t>
             </a:fld>
             <a:endParaRPr lang="en-US"/>
           </a:p>
@@ -2911,7 +2912,7 @@
           <a:p>
             <a:fld id="{118988BA-6DA2-47E2-A1CD-CED21CFF5A8E}" type="datetimeFigureOut">
               <a:rPr lang="en-US" smtClean="0"/>
-              <a:t>8/8/2025</a:t>
+              <a:t>8/9/2025</a:t>
             </a:fld>
             <a:endParaRPr lang="en-US"/>
           </a:p>
@@ -5444,8 +5445,8 @@
           <a:chExt cx="0" cy="0"/>
         </a:xfrm>
       </p:grpSpPr>
-      <mc:AlternateContent xmlns:mc="http://schemas.openxmlformats.org/markup-compatibility/2006" xmlns:a14="http://schemas.microsoft.com/office/drawing/2010/main">
-        <mc:Choice Requires="a14">
+      <mc:AlternateContent xmlns:mc="http://schemas.openxmlformats.org/markup-compatibility/2006">
+        <mc:Choice xmlns:a14="http://schemas.microsoft.com/office/drawing/2010/main" Requires="a14">
           <p:sp>
             <p:nvSpPr>
               <p:cNvPr id="5" name="TextBox 4">
@@ -5699,6 +5700,88 @@
                         <m:t>=</m:t>
                       </m:r>
                       <m:r>
+                        <a:rPr lang="en-US" sz="1800" b="0" i="1" kern="100" smtClean="0">
+                          <a:effectLst/>
+                          <a:latin typeface="Cambria Math" panose="02040503050406030204" pitchFamily="18" charset="0"/>
+                          <a:ea typeface="Calibri" panose="020F0502020204030204" pitchFamily="34" charset="0"/>
+                          <a:cs typeface="Cordia New" panose="020B0304020202020204" pitchFamily="34" charset="-34"/>
+                        </a:rPr>
+                        <m:t>𝑠</m:t>
+                      </m:r>
+                      <m:sSup>
+                        <m:sSupPr>
+                          <m:ctrlPr>
+                            <a:rPr lang="en-US" sz="1800" b="0" i="1" kern="100" smtClean="0">
+                              <a:effectLst/>
+                              <a:latin typeface="Cambria Math" panose="02040503050406030204" pitchFamily="18" charset="0"/>
+                              <a:ea typeface="Calibri" panose="020F0502020204030204" pitchFamily="34" charset="0"/>
+                              <a:cs typeface="Cordia New" panose="020B0304020202020204" pitchFamily="34" charset="-34"/>
+                            </a:rPr>
+                          </m:ctrlPr>
+                        </m:sSupPr>
+                        <m:e>
+                          <m:d>
+                            <m:dPr>
+                              <m:ctrlPr>
+                                <a:rPr lang="en-US" sz="1800" b="0" i="1" kern="100" smtClean="0">
+                                  <a:effectLst/>
+                                  <a:latin typeface="Cambria Math" panose="02040503050406030204" pitchFamily="18" charset="0"/>
+                                  <a:ea typeface="Calibri" panose="020F0502020204030204" pitchFamily="34" charset="0"/>
+                                  <a:cs typeface="Cordia New" panose="020B0304020202020204" pitchFamily="34" charset="-34"/>
+                                </a:rPr>
+                              </m:ctrlPr>
+                            </m:dPr>
+                            <m:e>
+                              <m:rad>
+                                <m:radPr>
+                                  <m:degHide m:val="on"/>
+                                  <m:ctrlPr>
+                                    <a:rPr lang="en-US" sz="1800" b="0" i="1" kern="100" smtClean="0">
+                                      <a:effectLst/>
+                                      <a:latin typeface="Cambria Math" panose="02040503050406030204" pitchFamily="18" charset="0"/>
+                                      <a:ea typeface="Calibri" panose="020F0502020204030204" pitchFamily="34" charset="0"/>
+                                      <a:cs typeface="Cordia New" panose="020B0304020202020204" pitchFamily="34" charset="-34"/>
+                                    </a:rPr>
+                                  </m:ctrlPr>
+                                </m:radPr>
+                                <m:deg/>
+                                <m:e>
+                                  <m:r>
+                                    <a:rPr lang="en-US" sz="1800" b="0" i="1" kern="100" smtClean="0">
+                                      <a:effectLst/>
+                                      <a:latin typeface="Cambria Math" panose="02040503050406030204" pitchFamily="18" charset="0"/>
+                                      <a:ea typeface="Calibri" panose="020F0502020204030204" pitchFamily="34" charset="0"/>
+                                      <a:cs typeface="Cordia New" panose="020B0304020202020204" pitchFamily="34" charset="-34"/>
+                                    </a:rPr>
+                                    <m:t>𝑟</m:t>
+                                  </m:r>
+                                </m:e>
+                              </m:rad>
+                            </m:e>
+                          </m:d>
+                        </m:e>
+                        <m:sup>
+                          <m:r>
+                            <a:rPr lang="en-US" sz="1800" b="0" i="1" kern="100" smtClean="0">
+                              <a:effectLst/>
+                              <a:latin typeface="Cambria Math" panose="02040503050406030204" pitchFamily="18" charset="0"/>
+                              <a:ea typeface="Calibri" panose="020F0502020204030204" pitchFamily="34" charset="0"/>
+                              <a:cs typeface="Cordia New" panose="020B0304020202020204" pitchFamily="34" charset="-34"/>
+                            </a:rPr>
+                            <m:t>−1</m:t>
+                          </m:r>
+                        </m:sup>
+                      </m:sSup>
+                      <m:r>
+                        <a:rPr lang="en-US" sz="1800" b="0" i="1" kern="100" smtClean="0">
+                          <a:effectLst/>
+                          <a:latin typeface="Cambria Math" panose="02040503050406030204" pitchFamily="18" charset="0"/>
+                          <a:ea typeface="Calibri" panose="020F0502020204030204" pitchFamily="34" charset="0"/>
+                          <a:cs typeface="Cordia New" panose="020B0304020202020204" pitchFamily="34" charset="-34"/>
+                        </a:rPr>
+                        <m:t>=</m:t>
+                      </m:r>
+                      <m:r>
                         <a:rPr lang="en-US" sz="1800" i="1" kern="100">
                           <a:effectLst/>
                           <a:latin typeface="Cambria Math" panose="02040503050406030204" pitchFamily="18" charset="0"/>
@@ -5922,6 +6005,61 @@
                       </m:r>
                       <m:r>
                         <a:rPr lang="en-US" sz="1800" i="1" kern="100">
+                          <a:effectLst/>
+                          <a:latin typeface="Cambria Math" panose="02040503050406030204" pitchFamily="18" charset="0"/>
+                          <a:ea typeface="Times New Roman" panose="02020603050405020304" pitchFamily="18" charset="0"/>
+                          <a:cs typeface="Cordia New" panose="020B0304020202020204" pitchFamily="34" charset="-34"/>
+                        </a:rPr>
+                        <m:t>=</m:t>
+                      </m:r>
+                      <m:r>
+                        <a:rPr lang="en-US" sz="1800" b="0" i="1" kern="100" smtClean="0">
+                          <a:effectLst/>
+                          <a:latin typeface="Cambria Math" panose="02040503050406030204" pitchFamily="18" charset="0"/>
+                          <a:ea typeface="Times New Roman" panose="02020603050405020304" pitchFamily="18" charset="0"/>
+                          <a:cs typeface="Cordia New" panose="020B0304020202020204" pitchFamily="34" charset="-34"/>
+                        </a:rPr>
+                        <m:t>𝑠</m:t>
+                      </m:r>
+                      <m:d>
+                        <m:dPr>
+                          <m:ctrlPr>
+                            <a:rPr lang="en-US" sz="1800" b="0" i="1" kern="100" smtClean="0">
+                              <a:effectLst/>
+                              <a:latin typeface="Cambria Math" panose="02040503050406030204" pitchFamily="18" charset="0"/>
+                              <a:ea typeface="Times New Roman" panose="02020603050405020304" pitchFamily="18" charset="0"/>
+                              <a:cs typeface="Cordia New" panose="020B0304020202020204" pitchFamily="34" charset="-34"/>
+                            </a:rPr>
+                          </m:ctrlPr>
+                        </m:dPr>
+                        <m:e>
+                          <m:rad>
+                            <m:radPr>
+                              <m:degHide m:val="on"/>
+                              <m:ctrlPr>
+                                <a:rPr lang="en-US" sz="1800" b="0" i="1" kern="100" smtClean="0">
+                                  <a:effectLst/>
+                                  <a:latin typeface="Cambria Math" panose="02040503050406030204" pitchFamily="18" charset="0"/>
+                                  <a:cs typeface="Cordia New" panose="020B0304020202020204" pitchFamily="34" charset="-34"/>
+                                </a:rPr>
+                              </m:ctrlPr>
+                            </m:radPr>
+                            <m:deg/>
+                            <m:e>
+                              <m:r>
+                                <a:rPr lang="en-US" sz="1800" b="0" i="1" kern="100" smtClean="0">
+                                  <a:effectLst/>
+                                  <a:latin typeface="Cambria Math" panose="02040503050406030204" pitchFamily="18" charset="0"/>
+                                  <a:cs typeface="Cordia New" panose="020B0304020202020204" pitchFamily="34" charset="-34"/>
+                                </a:rPr>
+                                <m:t>𝑟</m:t>
+                              </m:r>
+                            </m:e>
+                          </m:rad>
+                        </m:e>
+                      </m:d>
+                      <m:r>
+                        <a:rPr lang="en-US" sz="1800" b="0" i="1" kern="100" smtClean="0">
                           <a:effectLst/>
                           <a:latin typeface="Cambria Math" panose="02040503050406030204" pitchFamily="18" charset="0"/>
                           <a:ea typeface="Times New Roman" panose="02020603050405020304" pitchFamily="18" charset="0"/>
@@ -6423,26 +6561,13 @@
                     <a:ea typeface="Calibri" panose="020F0502020204030204" pitchFamily="34" charset="0"/>
                     <a:cs typeface="Cordia New" panose="020B0304020202020204" pitchFamily="34" charset="-34"/>
                   </a:rPr>
-                  <a:t> regardless of </a:t>
+                  <a:t> regardless of aspect ratios. </a:t>
                 </a:r>
-                <a:r>
-                  <a:rPr lang="en-US" sz="1800" kern="100">
-                    <a:effectLst/>
-                    <a:ea typeface="Calibri" panose="020F0502020204030204" pitchFamily="34" charset="0"/>
-                    <a:cs typeface="Cordia New" panose="020B0304020202020204" pitchFamily="34" charset="-34"/>
-                  </a:rPr>
-                  <a:t>aspect ratios. </a:t>
-                </a:r>
-                <a:endParaRPr lang="en-US" sz="1800" kern="100" dirty="0">
-                  <a:effectLst/>
-                  <a:ea typeface="Calibri" panose="020F0502020204030204" pitchFamily="34" charset="0"/>
-                  <a:cs typeface="Cordia New" panose="020B0304020202020204" pitchFamily="34" charset="-34"/>
-                </a:endParaRPr>
               </a:p>
             </p:txBody>
           </p:sp>
         </mc:Choice>
-        <mc:Fallback xmlns="">
+        <mc:Fallback>
           <p:sp>
             <p:nvSpPr>
               <p:cNvPr id="5" name="TextBox 4">
@@ -6468,7 +6593,7 @@
               <a:blipFill>
                 <a:blip r:embed="rId2"/>
                 <a:stretch>
-                  <a:fillRect l="-468" t="-142" b="-1420"/>
+                  <a:fillRect l="-468" t="-142" b="-1278"/>
                 </a:stretch>
               </a:blipFill>
             </p:spPr>
@@ -6536,6 +6661,1415 @@
 </file>
 
 <file path=ppt/slides/slide3.xml><?xml version="1.0" encoding="utf-8"?>
+<p:sld xmlns:a="http://schemas.openxmlformats.org/drawingml/2006/main" xmlns:r="http://schemas.openxmlformats.org/officeDocument/2006/relationships" xmlns:p="http://schemas.openxmlformats.org/presentationml/2006/main">
+  <p:cSld>
+    <p:spTree>
+      <p:nvGrpSpPr>
+        <p:cNvPr id="1" name=""/>
+        <p:cNvGrpSpPr/>
+        <p:nvPr/>
+      </p:nvGrpSpPr>
+      <p:grpSpPr>
+        <a:xfrm>
+          <a:off x="0" y="0"/>
+          <a:ext cx="0" cy="0"/>
+          <a:chOff x="0" y="0"/>
+          <a:chExt cx="0" cy="0"/>
+        </a:xfrm>
+      </p:grpSpPr>
+      <p:sp>
+        <p:nvSpPr>
+          <p:cNvPr id="4" name="TextBox 3">
+            <a:extLst>
+              <a:ext uri="{FF2B5EF4-FFF2-40B4-BE49-F238E27FC236}">
+                <a16:creationId xmlns:a16="http://schemas.microsoft.com/office/drawing/2014/main" id="{D9DC40B1-16FE-A43C-20A4-0B2D559BB36E}"/>
+              </a:ext>
+            </a:extLst>
+          </p:cNvPr>
+          <p:cNvSpPr txBox="1"/>
+          <p:nvPr/>
+        </p:nvSpPr>
+        <p:spPr>
+          <a:xfrm>
+            <a:off x="555170" y="381000"/>
+            <a:ext cx="5277123" cy="461665"/>
+          </a:xfrm>
+          <a:prstGeom prst="rect">
+            <a:avLst/>
+          </a:prstGeom>
+          <a:noFill/>
+        </p:spPr>
+        <p:txBody>
+          <a:bodyPr wrap="square" rtlCol="0">
+            <a:spAutoFit/>
+          </a:bodyPr>
+          <a:lstStyle/>
+          <a:p>
+            <a:r>
+              <a:rPr lang="en-US" sz="2400" b="1" dirty="0"/>
+              <a:t>Anchor Box Calculation for 3D</a:t>
+            </a:r>
+          </a:p>
+        </p:txBody>
+      </p:sp>
+      <mc:AlternateContent xmlns:mc="http://schemas.openxmlformats.org/markup-compatibility/2006">
+        <mc:Choice xmlns:a14="http://schemas.microsoft.com/office/drawing/2010/main" Requires="a14">
+          <p:sp>
+            <p:nvSpPr>
+              <p:cNvPr id="5" name="TextBox 4">
+                <a:extLst>
+                  <a:ext uri="{FF2B5EF4-FFF2-40B4-BE49-F238E27FC236}">
+                    <a16:creationId xmlns:a16="http://schemas.microsoft.com/office/drawing/2014/main" id="{E9259BDB-1724-BCCF-3CE3-B84E51A60337}"/>
+                  </a:ext>
+                </a:extLst>
+              </p:cNvPr>
+              <p:cNvSpPr txBox="1"/>
+              <p:nvPr/>
+            </p:nvSpPr>
+            <p:spPr>
+              <a:xfrm>
+                <a:off x="555170" y="1170215"/>
+                <a:ext cx="9391650" cy="4709238"/>
+              </a:xfrm>
+              <a:prstGeom prst="rect">
+                <a:avLst/>
+              </a:prstGeom>
+              <a:noFill/>
+            </p:spPr>
+            <p:txBody>
+              <a:bodyPr wrap="square" rtlCol="0">
+                <a:spAutoFit/>
+              </a:bodyPr>
+              <a:lstStyle/>
+              <a:p>
+                <a:r>
+                  <a:rPr lang="en-US" dirty="0"/>
+                  <a:t>Consider 3 aspect ratios</a:t>
+                </a:r>
+              </a:p>
+              <a:p>
+                <a:pPr/>
+                <a14:m>
+                  <m:oMathPara xmlns:m="http://schemas.openxmlformats.org/officeDocument/2006/math">
+                    <m:oMathParaPr>
+                      <m:jc m:val="left"/>
+                    </m:oMathParaPr>
+                    <m:oMath xmlns:m="http://schemas.openxmlformats.org/officeDocument/2006/math">
+                      <m:sSub>
+                        <m:sSubPr>
+                          <m:ctrlPr>
+                            <a:rPr lang="en-US" b="0" i="1" smtClean="0">
+                              <a:latin typeface="Cambria Math" panose="02040503050406030204" pitchFamily="18" charset="0"/>
+                            </a:rPr>
+                          </m:ctrlPr>
+                        </m:sSubPr>
+                        <m:e>
+                          <m:r>
+                            <a:rPr lang="en-US" b="0" i="1" smtClean="0">
+                              <a:latin typeface="Cambria Math" panose="02040503050406030204" pitchFamily="18" charset="0"/>
+                            </a:rPr>
+                            <m:t>𝑎</m:t>
+                          </m:r>
+                        </m:e>
+                        <m:sub>
+                          <m:r>
+                            <a:rPr lang="en-US" b="0" i="1" smtClean="0">
+                              <a:latin typeface="Cambria Math" panose="02040503050406030204" pitchFamily="18" charset="0"/>
+                            </a:rPr>
+                            <m:t>h𝑤</m:t>
+                          </m:r>
+                        </m:sub>
+                      </m:sSub>
+                      <m:r>
+                        <a:rPr lang="en-US" b="0" i="1" smtClean="0">
+                          <a:latin typeface="Cambria Math" panose="02040503050406030204" pitchFamily="18" charset="0"/>
+                        </a:rPr>
+                        <m:t>=</m:t>
+                      </m:r>
+                      <m:r>
+                        <a:rPr lang="en-US" b="0" i="1" smtClean="0">
+                          <a:latin typeface="Cambria Math" panose="02040503050406030204" pitchFamily="18" charset="0"/>
+                        </a:rPr>
+                        <m:t>h</m:t>
+                      </m:r>
+                      <m:r>
+                        <a:rPr lang="en-US" b="0" i="1" smtClean="0">
+                          <a:latin typeface="Cambria Math" panose="02040503050406030204" pitchFamily="18" charset="0"/>
+                        </a:rPr>
+                        <m:t>/</m:t>
+                      </m:r>
+                      <m:r>
+                        <a:rPr lang="en-US" b="0" i="1" smtClean="0">
+                          <a:latin typeface="Cambria Math" panose="02040503050406030204" pitchFamily="18" charset="0"/>
+                        </a:rPr>
+                        <m:t>𝑤</m:t>
+                      </m:r>
+                    </m:oMath>
+                  </m:oMathPara>
+                </a14:m>
+                <a:endParaRPr lang="en-US" b="0" dirty="0"/>
+              </a:p>
+              <a:p>
+                <a:pPr/>
+                <a14:m>
+                  <m:oMathPara xmlns:m="http://schemas.openxmlformats.org/officeDocument/2006/math">
+                    <m:oMathParaPr>
+                      <m:jc m:val="left"/>
+                    </m:oMathParaPr>
+                    <m:oMath xmlns:m="http://schemas.openxmlformats.org/officeDocument/2006/math">
+                      <m:sSub>
+                        <m:sSubPr>
+                          <m:ctrlPr>
+                            <a:rPr lang="en-US" b="0" i="1" smtClean="0">
+                              <a:latin typeface="Cambria Math" panose="02040503050406030204" pitchFamily="18" charset="0"/>
+                            </a:rPr>
+                          </m:ctrlPr>
+                        </m:sSubPr>
+                        <m:e>
+                          <m:r>
+                            <a:rPr lang="en-US" b="0" i="1" smtClean="0">
+                              <a:latin typeface="Cambria Math" panose="02040503050406030204" pitchFamily="18" charset="0"/>
+                            </a:rPr>
+                            <m:t>𝑎</m:t>
+                          </m:r>
+                        </m:e>
+                        <m:sub>
+                          <m:r>
+                            <a:rPr lang="en-US" b="0" i="1" smtClean="0">
+                              <a:latin typeface="Cambria Math" panose="02040503050406030204" pitchFamily="18" charset="0"/>
+                            </a:rPr>
+                            <m:t>𝑑𝑤</m:t>
+                          </m:r>
+                        </m:sub>
+                      </m:sSub>
+                      <m:r>
+                        <a:rPr lang="en-US" b="0" i="1" smtClean="0">
+                          <a:latin typeface="Cambria Math" panose="02040503050406030204" pitchFamily="18" charset="0"/>
+                        </a:rPr>
+                        <m:t>=</m:t>
+                      </m:r>
+                      <m:r>
+                        <a:rPr lang="en-US" b="0" i="1" smtClean="0">
+                          <a:latin typeface="Cambria Math" panose="02040503050406030204" pitchFamily="18" charset="0"/>
+                        </a:rPr>
+                        <m:t>𝑑</m:t>
+                      </m:r>
+                      <m:r>
+                        <a:rPr lang="en-US" b="0" i="1" smtClean="0">
+                          <a:latin typeface="Cambria Math" panose="02040503050406030204" pitchFamily="18" charset="0"/>
+                        </a:rPr>
+                        <m:t>/</m:t>
+                      </m:r>
+                      <m:r>
+                        <a:rPr lang="en-US" b="0" i="1" smtClean="0">
+                          <a:latin typeface="Cambria Math" panose="02040503050406030204" pitchFamily="18" charset="0"/>
+                        </a:rPr>
+                        <m:t>𝑤</m:t>
+                      </m:r>
+                    </m:oMath>
+                  </m:oMathPara>
+                </a14:m>
+                <a:endParaRPr lang="en-US" b="0" dirty="0"/>
+              </a:p>
+              <a:p>
+                <a:pPr/>
+                <a14:m>
+                  <m:oMathPara xmlns:m="http://schemas.openxmlformats.org/officeDocument/2006/math">
+                    <m:oMathParaPr>
+                      <m:jc m:val="left"/>
+                    </m:oMathParaPr>
+                    <m:oMath xmlns:m="http://schemas.openxmlformats.org/officeDocument/2006/math">
+                      <m:sSub>
+                        <m:sSubPr>
+                          <m:ctrlPr>
+                            <a:rPr lang="en-US" b="0" i="1" smtClean="0">
+                              <a:latin typeface="Cambria Math" panose="02040503050406030204" pitchFamily="18" charset="0"/>
+                            </a:rPr>
+                          </m:ctrlPr>
+                        </m:sSubPr>
+                        <m:e>
+                          <m:r>
+                            <a:rPr lang="en-US" b="0" i="1" smtClean="0">
+                              <a:latin typeface="Cambria Math" panose="02040503050406030204" pitchFamily="18" charset="0"/>
+                            </a:rPr>
+                            <m:t>𝑎</m:t>
+                          </m:r>
+                        </m:e>
+                        <m:sub>
+                          <m:r>
+                            <a:rPr lang="en-US" b="0" i="1" smtClean="0">
+                              <a:latin typeface="Cambria Math" panose="02040503050406030204" pitchFamily="18" charset="0"/>
+                            </a:rPr>
+                            <m:t>𝑑h</m:t>
+                          </m:r>
+                        </m:sub>
+                      </m:sSub>
+                      <m:r>
+                        <a:rPr lang="en-US" b="0" i="1" smtClean="0">
+                          <a:latin typeface="Cambria Math" panose="02040503050406030204" pitchFamily="18" charset="0"/>
+                        </a:rPr>
+                        <m:t>=</m:t>
+                      </m:r>
+                      <m:r>
+                        <a:rPr lang="en-US" b="0" i="1" smtClean="0">
+                          <a:latin typeface="Cambria Math" panose="02040503050406030204" pitchFamily="18" charset="0"/>
+                        </a:rPr>
+                        <m:t>𝑑</m:t>
+                      </m:r>
+                      <m:r>
+                        <a:rPr lang="en-US" b="0" i="1" smtClean="0">
+                          <a:latin typeface="Cambria Math" panose="02040503050406030204" pitchFamily="18" charset="0"/>
+                        </a:rPr>
+                        <m:t>/</m:t>
+                      </m:r>
+                      <m:r>
+                        <a:rPr lang="en-US" b="0" i="1" smtClean="0">
+                          <a:latin typeface="Cambria Math" panose="02040503050406030204" pitchFamily="18" charset="0"/>
+                        </a:rPr>
+                        <m:t>h</m:t>
+                      </m:r>
+                    </m:oMath>
+                  </m:oMathPara>
+                </a14:m>
+                <a:endParaRPr lang="en-US" b="0" dirty="0"/>
+              </a:p>
+              <a:p>
+                <a:pPr/>
+                <a:r>
+                  <a:rPr lang="en-US" dirty="0"/>
+                  <a:t>Let </a:t>
+                </a:r>
+                <a14:m>
+                  <m:oMath xmlns:m="http://schemas.openxmlformats.org/officeDocument/2006/math">
+                    <m:r>
+                      <a:rPr lang="en-US" b="0" i="1" smtClean="0">
+                        <a:latin typeface="Cambria Math" panose="02040503050406030204" pitchFamily="18" charset="0"/>
+                      </a:rPr>
+                      <m:t>𝑣</m:t>
+                    </m:r>
+                    <m:r>
+                      <a:rPr lang="en-US" b="0" i="1" smtClean="0">
+                        <a:latin typeface="Cambria Math" panose="02040503050406030204" pitchFamily="18" charset="0"/>
+                      </a:rPr>
+                      <m:t>=</m:t>
+                    </m:r>
+                    <m:r>
+                      <a:rPr lang="en-US" b="0" i="1" smtClean="0">
+                        <a:latin typeface="Cambria Math" panose="02040503050406030204" pitchFamily="18" charset="0"/>
+                      </a:rPr>
+                      <m:t>𝑑h𝑤</m:t>
+                    </m:r>
+                  </m:oMath>
+                </a14:m>
+                <a:r>
+                  <a:rPr lang="en-US" b="0" dirty="0"/>
+                  <a:t> and an anchor box having volume size of </a:t>
+                </a:r>
+                <a14:m>
+                  <m:oMath xmlns:m="http://schemas.openxmlformats.org/officeDocument/2006/math">
+                    <m:sSup>
+                      <m:sSupPr>
+                        <m:ctrlPr>
+                          <a:rPr lang="en-US" b="0" i="1" smtClean="0">
+                            <a:latin typeface="Cambria Math" panose="02040503050406030204" pitchFamily="18" charset="0"/>
+                          </a:rPr>
+                        </m:ctrlPr>
+                      </m:sSupPr>
+                      <m:e>
+                        <m:r>
+                          <a:rPr lang="en-US" b="0" i="1" smtClean="0">
+                            <a:latin typeface="Cambria Math" panose="02040503050406030204" pitchFamily="18" charset="0"/>
+                          </a:rPr>
+                          <m:t>𝑣</m:t>
+                        </m:r>
+                      </m:e>
+                      <m:sup>
+                        <m:r>
+                          <a:rPr lang="en-US" b="0" i="1" smtClean="0">
+                            <a:latin typeface="Cambria Math" panose="02040503050406030204" pitchFamily="18" charset="0"/>
+                          </a:rPr>
+                          <m:t>3</m:t>
+                        </m:r>
+                      </m:sup>
+                    </m:sSup>
+                  </m:oMath>
+                </a14:m>
+                <a:endParaRPr lang="en-US" b="0" dirty="0"/>
+              </a:p>
+              <a:p>
+                <a:pPr/>
+                <a14:m>
+                  <m:oMathPara xmlns:m="http://schemas.openxmlformats.org/officeDocument/2006/math">
+                    <m:oMathParaPr>
+                      <m:jc m:val="left"/>
+                    </m:oMathParaPr>
+                    <m:oMath xmlns:m="http://schemas.openxmlformats.org/officeDocument/2006/math">
+                      <m:r>
+                        <a:rPr lang="en-US" b="0" i="1" smtClean="0">
+                          <a:latin typeface="Cambria Math" panose="02040503050406030204" pitchFamily="18" charset="0"/>
+                        </a:rPr>
+                        <m:t>h𝑒𝑖𝑔h𝑡</m:t>
+                      </m:r>
+                      <m:r>
+                        <a:rPr lang="en-US" b="0" i="1" smtClean="0">
+                          <a:latin typeface="Cambria Math" panose="02040503050406030204" pitchFamily="18" charset="0"/>
+                        </a:rPr>
+                        <m:t>=</m:t>
+                      </m:r>
+                      <m:r>
+                        <a:rPr lang="en-US" b="0" i="1" smtClean="0">
+                          <a:latin typeface="Cambria Math" panose="02040503050406030204" pitchFamily="18" charset="0"/>
+                        </a:rPr>
+                        <m:t>h</m:t>
+                      </m:r>
+                      <m:r>
+                        <a:rPr lang="en-US" b="0" i="1" smtClean="0">
+                          <a:latin typeface="Cambria Math" panose="02040503050406030204" pitchFamily="18" charset="0"/>
+                          <a:ea typeface="Cambria Math" panose="02040503050406030204" pitchFamily="18" charset="0"/>
+                        </a:rPr>
+                        <m:t>∙</m:t>
+                      </m:r>
+                      <m:r>
+                        <a:rPr lang="en-US" b="0" i="1" smtClean="0">
+                          <a:latin typeface="Cambria Math" panose="02040503050406030204" pitchFamily="18" charset="0"/>
+                        </a:rPr>
+                        <m:t>𝑓</m:t>
+                      </m:r>
+                      <m:d>
+                        <m:dPr>
+                          <m:ctrlPr>
+                            <a:rPr lang="en-US" b="0" i="1" smtClean="0">
+                              <a:latin typeface="Cambria Math" panose="02040503050406030204" pitchFamily="18" charset="0"/>
+                            </a:rPr>
+                          </m:ctrlPr>
+                        </m:dPr>
+                        <m:e>
+                          <m:r>
+                            <a:rPr lang="en-US" b="0" i="1" smtClean="0">
+                              <a:latin typeface="Cambria Math" panose="02040503050406030204" pitchFamily="18" charset="0"/>
+                            </a:rPr>
+                            <m:t>𝑑h𝑤</m:t>
+                          </m:r>
+                        </m:e>
+                      </m:d>
+                      <m:r>
+                        <a:rPr lang="en-US" b="0" i="1" smtClean="0">
+                          <a:latin typeface="Cambria Math" panose="02040503050406030204" pitchFamily="18" charset="0"/>
+                        </a:rPr>
+                        <m:t>=</m:t>
+                      </m:r>
+                      <m:r>
+                        <a:rPr lang="en-US" b="0" i="1" smtClean="0">
+                          <a:latin typeface="Cambria Math" panose="02040503050406030204" pitchFamily="18" charset="0"/>
+                        </a:rPr>
+                        <m:t>h</m:t>
+                      </m:r>
+                      <m:r>
+                        <a:rPr lang="en-US" b="0" i="1" smtClean="0">
+                          <a:latin typeface="Cambria Math" panose="02040503050406030204" pitchFamily="18" charset="0"/>
+                          <a:ea typeface="Cambria Math" panose="02040503050406030204" pitchFamily="18" charset="0"/>
+                        </a:rPr>
+                        <m:t>∙</m:t>
+                      </m:r>
+                      <m:rad>
+                        <m:radPr>
+                          <m:ctrlPr>
+                            <a:rPr lang="en-US" b="0" i="1" smtClean="0">
+                              <a:latin typeface="Cambria Math" panose="02040503050406030204" pitchFamily="18" charset="0"/>
+                              <a:ea typeface="Cambria Math" panose="02040503050406030204" pitchFamily="18" charset="0"/>
+                            </a:rPr>
+                          </m:ctrlPr>
+                        </m:radPr>
+                        <m:deg>
+                          <m:r>
+                            <m:rPr>
+                              <m:brk m:alnAt="7"/>
+                            </m:rPr>
+                            <a:rPr lang="en-US" b="0" i="1" smtClean="0">
+                              <a:latin typeface="Cambria Math" panose="02040503050406030204" pitchFamily="18" charset="0"/>
+                              <a:ea typeface="Cambria Math" panose="02040503050406030204" pitchFamily="18" charset="0"/>
+                            </a:rPr>
+                            <m:t>3</m:t>
+                          </m:r>
+                        </m:deg>
+                        <m:e>
+                          <m:r>
+                            <a:rPr lang="en-US" b="0" i="1" smtClean="0">
+                              <a:latin typeface="Cambria Math" panose="02040503050406030204" pitchFamily="18" charset="0"/>
+                              <a:ea typeface="Cambria Math" panose="02040503050406030204" pitchFamily="18" charset="0"/>
+                            </a:rPr>
+                            <m:t>𝑑h𝑤</m:t>
+                          </m:r>
+                        </m:e>
+                      </m:rad>
+                      <m:r>
+                        <a:rPr lang="en-US" b="0" i="1" smtClean="0">
+                          <a:latin typeface="Cambria Math" panose="02040503050406030204" pitchFamily="18" charset="0"/>
+                          <a:ea typeface="Cambria Math" panose="02040503050406030204" pitchFamily="18" charset="0"/>
+                        </a:rPr>
+                        <m:t>=</m:t>
+                      </m:r>
+                      <m:r>
+                        <a:rPr lang="en-US" b="0" i="1" smtClean="0">
+                          <a:latin typeface="Cambria Math" panose="02040503050406030204" pitchFamily="18" charset="0"/>
+                          <a:ea typeface="Cambria Math" panose="02040503050406030204" pitchFamily="18" charset="0"/>
+                        </a:rPr>
+                        <m:t>𝑑h𝑤</m:t>
+                      </m:r>
+                      <m:r>
+                        <a:rPr lang="en-US" i="1">
+                          <a:latin typeface="Cambria Math" panose="02040503050406030204" pitchFamily="18" charset="0"/>
+                          <a:ea typeface="Cambria Math" panose="02040503050406030204" pitchFamily="18" charset="0"/>
+                        </a:rPr>
+                        <m:t>∙</m:t>
+                      </m:r>
+                      <m:f>
+                        <m:fPr>
+                          <m:ctrlPr>
+                            <a:rPr lang="en-US" b="0" i="1" smtClean="0">
+                              <a:latin typeface="Cambria Math" panose="02040503050406030204" pitchFamily="18" charset="0"/>
+                              <a:ea typeface="Cambria Math" panose="02040503050406030204" pitchFamily="18" charset="0"/>
+                            </a:rPr>
+                          </m:ctrlPr>
+                        </m:fPr>
+                        <m:num>
+                          <m:rad>
+                            <m:radPr>
+                              <m:ctrlPr>
+                                <a:rPr lang="en-US" i="1">
+                                  <a:latin typeface="Cambria Math" panose="02040503050406030204" pitchFamily="18" charset="0"/>
+                                  <a:ea typeface="Cambria Math" panose="02040503050406030204" pitchFamily="18" charset="0"/>
+                                </a:rPr>
+                              </m:ctrlPr>
+                            </m:radPr>
+                            <m:deg>
+                              <m:r>
+                                <m:rPr>
+                                  <m:brk m:alnAt="7"/>
+                                </m:rPr>
+                                <a:rPr lang="en-US" i="1">
+                                  <a:latin typeface="Cambria Math" panose="02040503050406030204" pitchFamily="18" charset="0"/>
+                                  <a:ea typeface="Cambria Math" panose="02040503050406030204" pitchFamily="18" charset="0"/>
+                                </a:rPr>
+                                <m:t>3</m:t>
+                              </m:r>
+                            </m:deg>
+                            <m:e>
+                              <m:r>
+                                <a:rPr lang="en-US" i="1">
+                                  <a:latin typeface="Cambria Math" panose="02040503050406030204" pitchFamily="18" charset="0"/>
+                                  <a:ea typeface="Cambria Math" panose="02040503050406030204" pitchFamily="18" charset="0"/>
+                                </a:rPr>
+                                <m:t>𝑑h𝑤</m:t>
+                              </m:r>
+                            </m:e>
+                          </m:rad>
+                        </m:num>
+                        <m:den>
+                          <m:r>
+                            <a:rPr lang="en-US" b="0" i="1" smtClean="0">
+                              <a:latin typeface="Cambria Math" panose="02040503050406030204" pitchFamily="18" charset="0"/>
+                              <a:ea typeface="Cambria Math" panose="02040503050406030204" pitchFamily="18" charset="0"/>
+                            </a:rPr>
+                            <m:t>𝑑𝑤</m:t>
+                          </m:r>
+                        </m:den>
+                      </m:f>
+                      <m:r>
+                        <a:rPr lang="en-US" b="0" i="1" smtClean="0">
+                          <a:latin typeface="Cambria Math" panose="02040503050406030204" pitchFamily="18" charset="0"/>
+                          <a:ea typeface="Cambria Math" panose="02040503050406030204" pitchFamily="18" charset="0"/>
+                        </a:rPr>
+                        <m:t>=</m:t>
+                      </m:r>
+                      <m:r>
+                        <a:rPr lang="en-US" b="0" i="1" smtClean="0">
+                          <a:latin typeface="Cambria Math" panose="02040503050406030204" pitchFamily="18" charset="0"/>
+                          <a:ea typeface="Cambria Math" panose="02040503050406030204" pitchFamily="18" charset="0"/>
+                        </a:rPr>
+                        <m:t>𝑣</m:t>
+                      </m:r>
+                      <m:r>
+                        <a:rPr lang="en-US" b="0" i="1" smtClean="0">
+                          <a:latin typeface="Cambria Math" panose="02040503050406030204" pitchFamily="18" charset="0"/>
+                          <a:ea typeface="Cambria Math" panose="02040503050406030204" pitchFamily="18" charset="0"/>
+                        </a:rPr>
+                        <m:t>∙</m:t>
+                      </m:r>
+                      <m:rad>
+                        <m:radPr>
+                          <m:ctrlPr>
+                            <a:rPr lang="en-US" b="0" i="1" smtClean="0">
+                              <a:latin typeface="Cambria Math" panose="02040503050406030204" pitchFamily="18" charset="0"/>
+                              <a:ea typeface="Cambria Math" panose="02040503050406030204" pitchFamily="18" charset="0"/>
+                            </a:rPr>
+                          </m:ctrlPr>
+                        </m:radPr>
+                        <m:deg>
+                          <m:r>
+                            <m:rPr>
+                              <m:brk m:alnAt="7"/>
+                            </m:rPr>
+                            <a:rPr lang="en-US" b="0" i="1" smtClean="0">
+                              <a:latin typeface="Cambria Math" panose="02040503050406030204" pitchFamily="18" charset="0"/>
+                              <a:ea typeface="Cambria Math" panose="02040503050406030204" pitchFamily="18" charset="0"/>
+                            </a:rPr>
+                            <m:t>3</m:t>
+                          </m:r>
+                        </m:deg>
+                        <m:e>
+                          <m:r>
+                            <a:rPr lang="en-US" b="0" i="1" smtClean="0">
+                              <a:latin typeface="Cambria Math" panose="02040503050406030204" pitchFamily="18" charset="0"/>
+                              <a:ea typeface="Cambria Math" panose="02040503050406030204" pitchFamily="18" charset="0"/>
+                            </a:rPr>
+                            <m:t>h</m:t>
+                          </m:r>
+                          <m:r>
+                            <a:rPr lang="en-US" b="0" i="1" smtClean="0">
+                              <a:latin typeface="Cambria Math" panose="02040503050406030204" pitchFamily="18" charset="0"/>
+                              <a:ea typeface="Cambria Math" panose="02040503050406030204" pitchFamily="18" charset="0"/>
+                            </a:rPr>
+                            <m:t>/</m:t>
+                          </m:r>
+                          <m:sSup>
+                            <m:sSupPr>
+                              <m:ctrlPr>
+                                <a:rPr lang="en-US" b="0" i="1" smtClean="0">
+                                  <a:latin typeface="Cambria Math" panose="02040503050406030204" pitchFamily="18" charset="0"/>
+                                  <a:ea typeface="Cambria Math" panose="02040503050406030204" pitchFamily="18" charset="0"/>
+                                </a:rPr>
+                              </m:ctrlPr>
+                            </m:sSupPr>
+                            <m:e>
+                              <m:d>
+                                <m:dPr>
+                                  <m:ctrlPr>
+                                    <a:rPr lang="en-US" b="0" i="1" smtClean="0">
+                                      <a:latin typeface="Cambria Math" panose="02040503050406030204" pitchFamily="18" charset="0"/>
+                                      <a:ea typeface="Cambria Math" panose="02040503050406030204" pitchFamily="18" charset="0"/>
+                                    </a:rPr>
+                                  </m:ctrlPr>
+                                </m:dPr>
+                                <m:e>
+                                  <m:r>
+                                    <a:rPr lang="en-US" b="0" i="1" smtClean="0">
+                                      <a:latin typeface="Cambria Math" panose="02040503050406030204" pitchFamily="18" charset="0"/>
+                                      <a:ea typeface="Cambria Math" panose="02040503050406030204" pitchFamily="18" charset="0"/>
+                                    </a:rPr>
+                                    <m:t>𝑑𝑤</m:t>
+                                  </m:r>
+                                </m:e>
+                              </m:d>
+                            </m:e>
+                            <m:sup>
+                              <m:r>
+                                <a:rPr lang="en-US" b="0" i="1" smtClean="0">
+                                  <a:latin typeface="Cambria Math" panose="02040503050406030204" pitchFamily="18" charset="0"/>
+                                  <a:ea typeface="Cambria Math" panose="02040503050406030204" pitchFamily="18" charset="0"/>
+                                </a:rPr>
+                                <m:t>2</m:t>
+                              </m:r>
+                            </m:sup>
+                          </m:sSup>
+                        </m:e>
+                      </m:rad>
+                    </m:oMath>
+                  </m:oMathPara>
+                </a14:m>
+                <a:endParaRPr lang="en-US" b="0" dirty="0"/>
+              </a:p>
+              <a:p>
+                <a:pPr/>
+                <a14:m>
+                  <m:oMathPara xmlns:m="http://schemas.openxmlformats.org/officeDocument/2006/math">
+                    <m:oMathParaPr>
+                      <m:jc m:val="left"/>
+                    </m:oMathParaPr>
+                    <m:oMath xmlns:m="http://schemas.openxmlformats.org/officeDocument/2006/math">
+                      <m:r>
+                        <a:rPr lang="en-US" b="0" i="1" smtClean="0">
+                          <a:latin typeface="Cambria Math" panose="02040503050406030204" pitchFamily="18" charset="0"/>
+                        </a:rPr>
+                        <m:t>𝑤𝑖𝑑𝑡h</m:t>
+                      </m:r>
+                      <m:r>
+                        <a:rPr lang="en-US" b="0" i="1" smtClean="0">
+                          <a:latin typeface="Cambria Math" panose="02040503050406030204" pitchFamily="18" charset="0"/>
+                        </a:rPr>
+                        <m:t>=</m:t>
+                      </m:r>
+                      <m:r>
+                        <a:rPr lang="en-US" b="0" i="1" smtClean="0">
+                          <a:latin typeface="Cambria Math" panose="02040503050406030204" pitchFamily="18" charset="0"/>
+                        </a:rPr>
+                        <m:t>𝑤</m:t>
+                      </m:r>
+                      <m:r>
+                        <a:rPr lang="en-US" i="1">
+                          <a:latin typeface="Cambria Math" panose="02040503050406030204" pitchFamily="18" charset="0"/>
+                          <a:ea typeface="Cambria Math" panose="02040503050406030204" pitchFamily="18" charset="0"/>
+                        </a:rPr>
+                        <m:t>∙</m:t>
+                      </m:r>
+                      <m:r>
+                        <a:rPr lang="en-US" b="0" i="1" smtClean="0">
+                          <a:latin typeface="Cambria Math" panose="02040503050406030204" pitchFamily="18" charset="0"/>
+                        </a:rPr>
+                        <m:t>𝑓</m:t>
+                      </m:r>
+                      <m:d>
+                        <m:dPr>
+                          <m:ctrlPr>
+                            <a:rPr lang="en-US" b="0" i="1" smtClean="0">
+                              <a:latin typeface="Cambria Math" panose="02040503050406030204" pitchFamily="18" charset="0"/>
+                            </a:rPr>
+                          </m:ctrlPr>
+                        </m:dPr>
+                        <m:e>
+                          <m:r>
+                            <a:rPr lang="en-US" b="0" i="1" smtClean="0">
+                              <a:latin typeface="Cambria Math" panose="02040503050406030204" pitchFamily="18" charset="0"/>
+                            </a:rPr>
+                            <m:t>𝑑h𝑤</m:t>
+                          </m:r>
+                        </m:e>
+                      </m:d>
+                      <m:r>
+                        <a:rPr lang="en-US" b="0" i="1" smtClean="0">
+                          <a:latin typeface="Cambria Math" panose="02040503050406030204" pitchFamily="18" charset="0"/>
+                        </a:rPr>
+                        <m:t>=</m:t>
+                      </m:r>
+                      <m:r>
+                        <a:rPr lang="en-US" b="0" i="1" smtClean="0">
+                          <a:latin typeface="Cambria Math" panose="02040503050406030204" pitchFamily="18" charset="0"/>
+                        </a:rPr>
+                        <m:t>𝑤</m:t>
+                      </m:r>
+                      <m:r>
+                        <a:rPr lang="en-US" i="1">
+                          <a:latin typeface="Cambria Math" panose="02040503050406030204" pitchFamily="18" charset="0"/>
+                          <a:ea typeface="Cambria Math" panose="02040503050406030204" pitchFamily="18" charset="0"/>
+                        </a:rPr>
+                        <m:t>∙</m:t>
+                      </m:r>
+                      <m:rad>
+                        <m:radPr>
+                          <m:ctrlPr>
+                            <a:rPr lang="en-US" i="1">
+                              <a:latin typeface="Cambria Math" panose="02040503050406030204" pitchFamily="18" charset="0"/>
+                              <a:ea typeface="Cambria Math" panose="02040503050406030204" pitchFamily="18" charset="0"/>
+                            </a:rPr>
+                          </m:ctrlPr>
+                        </m:radPr>
+                        <m:deg>
+                          <m:r>
+                            <m:rPr>
+                              <m:brk m:alnAt="7"/>
+                            </m:rPr>
+                            <a:rPr lang="en-US" i="1">
+                              <a:latin typeface="Cambria Math" panose="02040503050406030204" pitchFamily="18" charset="0"/>
+                              <a:ea typeface="Cambria Math" panose="02040503050406030204" pitchFamily="18" charset="0"/>
+                            </a:rPr>
+                            <m:t>3</m:t>
+                          </m:r>
+                        </m:deg>
+                        <m:e>
+                          <m:r>
+                            <a:rPr lang="en-US" i="1">
+                              <a:latin typeface="Cambria Math" panose="02040503050406030204" pitchFamily="18" charset="0"/>
+                              <a:ea typeface="Cambria Math" panose="02040503050406030204" pitchFamily="18" charset="0"/>
+                            </a:rPr>
+                            <m:t>𝑑h𝑤</m:t>
+                          </m:r>
+                        </m:e>
+                      </m:rad>
+                      <m:r>
+                        <a:rPr lang="en-US" i="1">
+                          <a:latin typeface="Cambria Math" panose="02040503050406030204" pitchFamily="18" charset="0"/>
+                          <a:ea typeface="Cambria Math" panose="02040503050406030204" pitchFamily="18" charset="0"/>
+                        </a:rPr>
+                        <m:t>=</m:t>
+                      </m:r>
+                      <m:r>
+                        <a:rPr lang="en-US" i="1">
+                          <a:latin typeface="Cambria Math" panose="02040503050406030204" pitchFamily="18" charset="0"/>
+                          <a:ea typeface="Cambria Math" panose="02040503050406030204" pitchFamily="18" charset="0"/>
+                        </a:rPr>
+                        <m:t>𝑑h𝑤</m:t>
+                      </m:r>
+                      <m:r>
+                        <a:rPr lang="en-US" i="1">
+                          <a:latin typeface="Cambria Math" panose="02040503050406030204" pitchFamily="18" charset="0"/>
+                          <a:ea typeface="Cambria Math" panose="02040503050406030204" pitchFamily="18" charset="0"/>
+                        </a:rPr>
+                        <m:t>∙</m:t>
+                      </m:r>
+                      <m:f>
+                        <m:fPr>
+                          <m:ctrlPr>
+                            <a:rPr lang="en-US" i="1">
+                              <a:latin typeface="Cambria Math" panose="02040503050406030204" pitchFamily="18" charset="0"/>
+                              <a:ea typeface="Cambria Math" panose="02040503050406030204" pitchFamily="18" charset="0"/>
+                            </a:rPr>
+                          </m:ctrlPr>
+                        </m:fPr>
+                        <m:num>
+                          <m:rad>
+                            <m:radPr>
+                              <m:ctrlPr>
+                                <a:rPr lang="en-US" i="1">
+                                  <a:latin typeface="Cambria Math" panose="02040503050406030204" pitchFamily="18" charset="0"/>
+                                  <a:ea typeface="Cambria Math" panose="02040503050406030204" pitchFamily="18" charset="0"/>
+                                </a:rPr>
+                              </m:ctrlPr>
+                            </m:radPr>
+                            <m:deg>
+                              <m:r>
+                                <m:rPr>
+                                  <m:brk m:alnAt="7"/>
+                                </m:rPr>
+                                <a:rPr lang="en-US" i="1">
+                                  <a:latin typeface="Cambria Math" panose="02040503050406030204" pitchFamily="18" charset="0"/>
+                                  <a:ea typeface="Cambria Math" panose="02040503050406030204" pitchFamily="18" charset="0"/>
+                                </a:rPr>
+                                <m:t>3</m:t>
+                              </m:r>
+                            </m:deg>
+                            <m:e>
+                              <m:r>
+                                <a:rPr lang="en-US" i="1">
+                                  <a:latin typeface="Cambria Math" panose="02040503050406030204" pitchFamily="18" charset="0"/>
+                                  <a:ea typeface="Cambria Math" panose="02040503050406030204" pitchFamily="18" charset="0"/>
+                                </a:rPr>
+                                <m:t>𝑑h𝑤</m:t>
+                              </m:r>
+                            </m:e>
+                          </m:rad>
+                        </m:num>
+                        <m:den>
+                          <m:r>
+                            <a:rPr lang="en-US" i="1">
+                              <a:latin typeface="Cambria Math" panose="02040503050406030204" pitchFamily="18" charset="0"/>
+                              <a:ea typeface="Cambria Math" panose="02040503050406030204" pitchFamily="18" charset="0"/>
+                            </a:rPr>
+                            <m:t>𝑑</m:t>
+                          </m:r>
+                          <m:r>
+                            <a:rPr lang="en-US" b="0" i="1" smtClean="0">
+                              <a:latin typeface="Cambria Math" panose="02040503050406030204" pitchFamily="18" charset="0"/>
+                              <a:ea typeface="Cambria Math" panose="02040503050406030204" pitchFamily="18" charset="0"/>
+                            </a:rPr>
+                            <m:t>h</m:t>
+                          </m:r>
+                        </m:den>
+                      </m:f>
+                      <m:r>
+                        <a:rPr lang="en-US" b="0" i="1" smtClean="0">
+                          <a:latin typeface="Cambria Math" panose="02040503050406030204" pitchFamily="18" charset="0"/>
+                          <a:ea typeface="Cambria Math" panose="02040503050406030204" pitchFamily="18" charset="0"/>
+                        </a:rPr>
+                        <m:t>=</m:t>
+                      </m:r>
+                      <m:r>
+                        <a:rPr lang="en-US" b="0" i="1" smtClean="0">
+                          <a:latin typeface="Cambria Math" panose="02040503050406030204" pitchFamily="18" charset="0"/>
+                          <a:ea typeface="Cambria Math" panose="02040503050406030204" pitchFamily="18" charset="0"/>
+                        </a:rPr>
+                        <m:t>𝑣</m:t>
+                      </m:r>
+                      <m:r>
+                        <a:rPr lang="en-US" b="0" i="1" smtClean="0">
+                          <a:latin typeface="Cambria Math" panose="02040503050406030204" pitchFamily="18" charset="0"/>
+                          <a:ea typeface="Cambria Math" panose="02040503050406030204" pitchFamily="18" charset="0"/>
+                        </a:rPr>
+                        <m:t>∙</m:t>
+                      </m:r>
+                      <m:rad>
+                        <m:radPr>
+                          <m:ctrlPr>
+                            <a:rPr lang="en-US" b="0" i="1" smtClean="0">
+                              <a:latin typeface="Cambria Math" panose="02040503050406030204" pitchFamily="18" charset="0"/>
+                              <a:ea typeface="Cambria Math" panose="02040503050406030204" pitchFamily="18" charset="0"/>
+                            </a:rPr>
+                          </m:ctrlPr>
+                        </m:radPr>
+                        <m:deg>
+                          <m:r>
+                            <m:rPr>
+                              <m:brk m:alnAt="7"/>
+                            </m:rPr>
+                            <a:rPr lang="en-US" b="0" i="1" smtClean="0">
+                              <a:latin typeface="Cambria Math" panose="02040503050406030204" pitchFamily="18" charset="0"/>
+                              <a:ea typeface="Cambria Math" panose="02040503050406030204" pitchFamily="18" charset="0"/>
+                            </a:rPr>
+                            <m:t>3</m:t>
+                          </m:r>
+                        </m:deg>
+                        <m:e>
+                          <m:r>
+                            <a:rPr lang="en-US" b="0" i="1" smtClean="0">
+                              <a:latin typeface="Cambria Math" panose="02040503050406030204" pitchFamily="18" charset="0"/>
+                              <a:ea typeface="Cambria Math" panose="02040503050406030204" pitchFamily="18" charset="0"/>
+                            </a:rPr>
+                            <m:t>𝑤</m:t>
+                          </m:r>
+                          <m:r>
+                            <a:rPr lang="en-US" b="0" i="1" smtClean="0">
+                              <a:latin typeface="Cambria Math" panose="02040503050406030204" pitchFamily="18" charset="0"/>
+                              <a:ea typeface="Cambria Math" panose="02040503050406030204" pitchFamily="18" charset="0"/>
+                            </a:rPr>
+                            <m:t>/</m:t>
+                          </m:r>
+                          <m:sSup>
+                            <m:sSupPr>
+                              <m:ctrlPr>
+                                <a:rPr lang="en-US" b="0" i="1" smtClean="0">
+                                  <a:latin typeface="Cambria Math" panose="02040503050406030204" pitchFamily="18" charset="0"/>
+                                  <a:ea typeface="Cambria Math" panose="02040503050406030204" pitchFamily="18" charset="0"/>
+                                </a:rPr>
+                              </m:ctrlPr>
+                            </m:sSupPr>
+                            <m:e>
+                              <m:d>
+                                <m:dPr>
+                                  <m:ctrlPr>
+                                    <a:rPr lang="en-US" b="0" i="1" smtClean="0">
+                                      <a:latin typeface="Cambria Math" panose="02040503050406030204" pitchFamily="18" charset="0"/>
+                                      <a:ea typeface="Cambria Math" panose="02040503050406030204" pitchFamily="18" charset="0"/>
+                                    </a:rPr>
+                                  </m:ctrlPr>
+                                </m:dPr>
+                                <m:e>
+                                  <m:r>
+                                    <a:rPr lang="en-US" b="0" i="1" smtClean="0">
+                                      <a:latin typeface="Cambria Math" panose="02040503050406030204" pitchFamily="18" charset="0"/>
+                                      <a:ea typeface="Cambria Math" panose="02040503050406030204" pitchFamily="18" charset="0"/>
+                                    </a:rPr>
+                                    <m:t>𝑑h</m:t>
+                                  </m:r>
+                                </m:e>
+                              </m:d>
+                            </m:e>
+                            <m:sup>
+                              <m:r>
+                                <a:rPr lang="en-US" b="0" i="1" smtClean="0">
+                                  <a:latin typeface="Cambria Math" panose="02040503050406030204" pitchFamily="18" charset="0"/>
+                                  <a:ea typeface="Cambria Math" panose="02040503050406030204" pitchFamily="18" charset="0"/>
+                                </a:rPr>
+                                <m:t>2</m:t>
+                              </m:r>
+                            </m:sup>
+                          </m:sSup>
+                        </m:e>
+                      </m:rad>
+                    </m:oMath>
+                  </m:oMathPara>
+                </a14:m>
+                <a:endParaRPr lang="en-US" b="0" dirty="0"/>
+              </a:p>
+              <a:p>
+                <a:pPr/>
+                <a14:m>
+                  <m:oMathPara xmlns:m="http://schemas.openxmlformats.org/officeDocument/2006/math">
+                    <m:oMathParaPr>
+                      <m:jc m:val="left"/>
+                    </m:oMathParaPr>
+                    <m:oMath xmlns:m="http://schemas.openxmlformats.org/officeDocument/2006/math">
+                      <m:r>
+                        <a:rPr lang="en-US" b="0" i="1" smtClean="0">
+                          <a:latin typeface="Cambria Math" panose="02040503050406030204" pitchFamily="18" charset="0"/>
+                        </a:rPr>
+                        <m:t>𝑑𝑒𝑝𝑡h</m:t>
+                      </m:r>
+                      <m:r>
+                        <a:rPr lang="en-US" b="0" i="1" smtClean="0">
+                          <a:latin typeface="Cambria Math" panose="02040503050406030204" pitchFamily="18" charset="0"/>
+                        </a:rPr>
+                        <m:t>=</m:t>
+                      </m:r>
+                      <m:r>
+                        <a:rPr lang="en-US" b="0" i="1" smtClean="0">
+                          <a:latin typeface="Cambria Math" panose="02040503050406030204" pitchFamily="18" charset="0"/>
+                        </a:rPr>
+                        <m:t>𝑑</m:t>
+                      </m:r>
+                      <m:r>
+                        <a:rPr lang="en-US" i="1">
+                          <a:latin typeface="Cambria Math" panose="02040503050406030204" pitchFamily="18" charset="0"/>
+                          <a:ea typeface="Cambria Math" panose="02040503050406030204" pitchFamily="18" charset="0"/>
+                        </a:rPr>
+                        <m:t>∙</m:t>
+                      </m:r>
+                      <m:r>
+                        <a:rPr lang="en-US" b="0" i="1" smtClean="0">
+                          <a:latin typeface="Cambria Math" panose="02040503050406030204" pitchFamily="18" charset="0"/>
+                        </a:rPr>
+                        <m:t>𝑓</m:t>
+                      </m:r>
+                      <m:d>
+                        <m:dPr>
+                          <m:ctrlPr>
+                            <a:rPr lang="en-US" b="0" i="1" smtClean="0">
+                              <a:latin typeface="Cambria Math" panose="02040503050406030204" pitchFamily="18" charset="0"/>
+                            </a:rPr>
+                          </m:ctrlPr>
+                        </m:dPr>
+                        <m:e>
+                          <m:r>
+                            <a:rPr lang="en-US" b="0" i="1" smtClean="0">
+                              <a:latin typeface="Cambria Math" panose="02040503050406030204" pitchFamily="18" charset="0"/>
+                            </a:rPr>
+                            <m:t>𝑑h𝑤</m:t>
+                          </m:r>
+                        </m:e>
+                      </m:d>
+                      <m:r>
+                        <a:rPr lang="en-US" b="0" i="1" smtClean="0">
+                          <a:latin typeface="Cambria Math" panose="02040503050406030204" pitchFamily="18" charset="0"/>
+                        </a:rPr>
+                        <m:t>=</m:t>
+                      </m:r>
+                      <m:r>
+                        <a:rPr lang="en-US" b="0" i="1" smtClean="0">
+                          <a:latin typeface="Cambria Math" panose="02040503050406030204" pitchFamily="18" charset="0"/>
+                        </a:rPr>
+                        <m:t>𝑑</m:t>
+                      </m:r>
+                      <m:r>
+                        <a:rPr lang="en-US" i="1">
+                          <a:latin typeface="Cambria Math" panose="02040503050406030204" pitchFamily="18" charset="0"/>
+                          <a:ea typeface="Cambria Math" panose="02040503050406030204" pitchFamily="18" charset="0"/>
+                        </a:rPr>
+                        <m:t>∙</m:t>
+                      </m:r>
+                      <m:rad>
+                        <m:radPr>
+                          <m:ctrlPr>
+                            <a:rPr lang="en-US" i="1">
+                              <a:latin typeface="Cambria Math" panose="02040503050406030204" pitchFamily="18" charset="0"/>
+                              <a:ea typeface="Cambria Math" panose="02040503050406030204" pitchFamily="18" charset="0"/>
+                            </a:rPr>
+                          </m:ctrlPr>
+                        </m:radPr>
+                        <m:deg>
+                          <m:r>
+                            <m:rPr>
+                              <m:brk m:alnAt="7"/>
+                            </m:rPr>
+                            <a:rPr lang="en-US" i="1">
+                              <a:latin typeface="Cambria Math" panose="02040503050406030204" pitchFamily="18" charset="0"/>
+                              <a:ea typeface="Cambria Math" panose="02040503050406030204" pitchFamily="18" charset="0"/>
+                            </a:rPr>
+                            <m:t>3</m:t>
+                          </m:r>
+                        </m:deg>
+                        <m:e>
+                          <m:r>
+                            <a:rPr lang="en-US" i="1">
+                              <a:latin typeface="Cambria Math" panose="02040503050406030204" pitchFamily="18" charset="0"/>
+                              <a:ea typeface="Cambria Math" panose="02040503050406030204" pitchFamily="18" charset="0"/>
+                            </a:rPr>
+                            <m:t>𝑑h𝑤</m:t>
+                          </m:r>
+                        </m:e>
+                      </m:rad>
+                      <m:r>
+                        <a:rPr lang="en-US" i="1">
+                          <a:latin typeface="Cambria Math" panose="02040503050406030204" pitchFamily="18" charset="0"/>
+                          <a:ea typeface="Cambria Math" panose="02040503050406030204" pitchFamily="18" charset="0"/>
+                        </a:rPr>
+                        <m:t>=</m:t>
+                      </m:r>
+                      <m:r>
+                        <a:rPr lang="en-US" i="1">
+                          <a:latin typeface="Cambria Math" panose="02040503050406030204" pitchFamily="18" charset="0"/>
+                          <a:ea typeface="Cambria Math" panose="02040503050406030204" pitchFamily="18" charset="0"/>
+                        </a:rPr>
+                        <m:t>𝑑h𝑤</m:t>
+                      </m:r>
+                      <m:r>
+                        <a:rPr lang="en-US" i="1">
+                          <a:latin typeface="Cambria Math" panose="02040503050406030204" pitchFamily="18" charset="0"/>
+                          <a:ea typeface="Cambria Math" panose="02040503050406030204" pitchFamily="18" charset="0"/>
+                        </a:rPr>
+                        <m:t>∙</m:t>
+                      </m:r>
+                      <m:f>
+                        <m:fPr>
+                          <m:ctrlPr>
+                            <a:rPr lang="en-US" i="1">
+                              <a:latin typeface="Cambria Math" panose="02040503050406030204" pitchFamily="18" charset="0"/>
+                              <a:ea typeface="Cambria Math" panose="02040503050406030204" pitchFamily="18" charset="0"/>
+                            </a:rPr>
+                          </m:ctrlPr>
+                        </m:fPr>
+                        <m:num>
+                          <m:rad>
+                            <m:radPr>
+                              <m:ctrlPr>
+                                <a:rPr lang="en-US" i="1">
+                                  <a:latin typeface="Cambria Math" panose="02040503050406030204" pitchFamily="18" charset="0"/>
+                                  <a:ea typeface="Cambria Math" panose="02040503050406030204" pitchFamily="18" charset="0"/>
+                                </a:rPr>
+                              </m:ctrlPr>
+                            </m:radPr>
+                            <m:deg>
+                              <m:r>
+                                <m:rPr>
+                                  <m:brk m:alnAt="7"/>
+                                </m:rPr>
+                                <a:rPr lang="en-US" i="1">
+                                  <a:latin typeface="Cambria Math" panose="02040503050406030204" pitchFamily="18" charset="0"/>
+                                  <a:ea typeface="Cambria Math" panose="02040503050406030204" pitchFamily="18" charset="0"/>
+                                </a:rPr>
+                                <m:t>3</m:t>
+                              </m:r>
+                            </m:deg>
+                            <m:e>
+                              <m:r>
+                                <a:rPr lang="en-US" i="1">
+                                  <a:latin typeface="Cambria Math" panose="02040503050406030204" pitchFamily="18" charset="0"/>
+                                  <a:ea typeface="Cambria Math" panose="02040503050406030204" pitchFamily="18" charset="0"/>
+                                </a:rPr>
+                                <m:t>𝑑h𝑤</m:t>
+                              </m:r>
+                            </m:e>
+                          </m:rad>
+                        </m:num>
+                        <m:den>
+                          <m:r>
+                            <a:rPr lang="en-US" b="0" i="1" smtClean="0">
+                              <a:latin typeface="Cambria Math" panose="02040503050406030204" pitchFamily="18" charset="0"/>
+                              <a:ea typeface="Cambria Math" panose="02040503050406030204" pitchFamily="18" charset="0"/>
+                            </a:rPr>
+                            <m:t>h</m:t>
+                          </m:r>
+                          <m:r>
+                            <a:rPr lang="en-US" i="1">
+                              <a:latin typeface="Cambria Math" panose="02040503050406030204" pitchFamily="18" charset="0"/>
+                              <a:ea typeface="Cambria Math" panose="02040503050406030204" pitchFamily="18" charset="0"/>
+                            </a:rPr>
+                            <m:t>𝑤</m:t>
+                          </m:r>
+                        </m:den>
+                      </m:f>
+                      <m:r>
+                        <a:rPr lang="en-US" b="0" i="1" smtClean="0">
+                          <a:latin typeface="Cambria Math" panose="02040503050406030204" pitchFamily="18" charset="0"/>
+                          <a:ea typeface="Cambria Math" panose="02040503050406030204" pitchFamily="18" charset="0"/>
+                        </a:rPr>
+                        <m:t>=</m:t>
+                      </m:r>
+                      <m:r>
+                        <a:rPr lang="en-US" b="0" i="1" smtClean="0">
+                          <a:latin typeface="Cambria Math" panose="02040503050406030204" pitchFamily="18" charset="0"/>
+                          <a:ea typeface="Cambria Math" panose="02040503050406030204" pitchFamily="18" charset="0"/>
+                        </a:rPr>
+                        <m:t>𝑣</m:t>
+                      </m:r>
+                      <m:r>
+                        <a:rPr lang="en-US" b="0" i="1" smtClean="0">
+                          <a:latin typeface="Cambria Math" panose="02040503050406030204" pitchFamily="18" charset="0"/>
+                          <a:ea typeface="Cambria Math" panose="02040503050406030204" pitchFamily="18" charset="0"/>
+                        </a:rPr>
+                        <m:t>∙</m:t>
+                      </m:r>
+                      <m:rad>
+                        <m:radPr>
+                          <m:ctrlPr>
+                            <a:rPr lang="en-US" b="0" i="1" smtClean="0">
+                              <a:latin typeface="Cambria Math" panose="02040503050406030204" pitchFamily="18" charset="0"/>
+                              <a:ea typeface="Cambria Math" panose="02040503050406030204" pitchFamily="18" charset="0"/>
+                            </a:rPr>
+                          </m:ctrlPr>
+                        </m:radPr>
+                        <m:deg>
+                          <m:r>
+                            <m:rPr>
+                              <m:brk m:alnAt="7"/>
+                            </m:rPr>
+                            <a:rPr lang="en-US" b="0" i="1" smtClean="0">
+                              <a:latin typeface="Cambria Math" panose="02040503050406030204" pitchFamily="18" charset="0"/>
+                              <a:ea typeface="Cambria Math" panose="02040503050406030204" pitchFamily="18" charset="0"/>
+                            </a:rPr>
+                            <m:t>3</m:t>
+                          </m:r>
+                        </m:deg>
+                        <m:e>
+                          <m:r>
+                            <a:rPr lang="en-US" b="0" i="1" smtClean="0">
+                              <a:latin typeface="Cambria Math" panose="02040503050406030204" pitchFamily="18" charset="0"/>
+                              <a:ea typeface="Cambria Math" panose="02040503050406030204" pitchFamily="18" charset="0"/>
+                            </a:rPr>
+                            <m:t>𝑑</m:t>
+                          </m:r>
+                          <m:r>
+                            <a:rPr lang="en-US" b="0" i="1" smtClean="0">
+                              <a:latin typeface="Cambria Math" panose="02040503050406030204" pitchFamily="18" charset="0"/>
+                              <a:ea typeface="Cambria Math" panose="02040503050406030204" pitchFamily="18" charset="0"/>
+                            </a:rPr>
+                            <m:t>/</m:t>
+                          </m:r>
+                          <m:sSup>
+                            <m:sSupPr>
+                              <m:ctrlPr>
+                                <a:rPr lang="en-US" b="0" i="1" smtClean="0">
+                                  <a:latin typeface="Cambria Math" panose="02040503050406030204" pitchFamily="18" charset="0"/>
+                                  <a:ea typeface="Cambria Math" panose="02040503050406030204" pitchFamily="18" charset="0"/>
+                                </a:rPr>
+                              </m:ctrlPr>
+                            </m:sSupPr>
+                            <m:e>
+                              <m:d>
+                                <m:dPr>
+                                  <m:ctrlPr>
+                                    <a:rPr lang="en-US" b="0" i="1" smtClean="0">
+                                      <a:latin typeface="Cambria Math" panose="02040503050406030204" pitchFamily="18" charset="0"/>
+                                      <a:ea typeface="Cambria Math" panose="02040503050406030204" pitchFamily="18" charset="0"/>
+                                    </a:rPr>
+                                  </m:ctrlPr>
+                                </m:dPr>
+                                <m:e>
+                                  <m:r>
+                                    <a:rPr lang="en-US" b="0" i="1" smtClean="0">
+                                      <a:latin typeface="Cambria Math" panose="02040503050406030204" pitchFamily="18" charset="0"/>
+                                      <a:ea typeface="Cambria Math" panose="02040503050406030204" pitchFamily="18" charset="0"/>
+                                    </a:rPr>
+                                    <m:t>h𝑤</m:t>
+                                  </m:r>
+                                </m:e>
+                              </m:d>
+                            </m:e>
+                            <m:sup>
+                              <m:r>
+                                <a:rPr lang="en-US" b="0" i="1" smtClean="0">
+                                  <a:latin typeface="Cambria Math" panose="02040503050406030204" pitchFamily="18" charset="0"/>
+                                  <a:ea typeface="Cambria Math" panose="02040503050406030204" pitchFamily="18" charset="0"/>
+                                </a:rPr>
+                                <m:t>2</m:t>
+                              </m:r>
+                            </m:sup>
+                          </m:sSup>
+                        </m:e>
+                      </m:rad>
+                    </m:oMath>
+                  </m:oMathPara>
+                </a14:m>
+                <a:endParaRPr lang="en-US" b="0" dirty="0"/>
+              </a:p>
+              <a:p>
+                <a:pPr/>
+                <a:endParaRPr lang="en-US" b="0" dirty="0"/>
+              </a:p>
+              <a:p>
+                <a:pPr/>
+                <a14:m>
+                  <m:oMathPara xmlns:m="http://schemas.openxmlformats.org/officeDocument/2006/math">
+                    <m:oMathParaPr>
+                      <m:jc m:val="left"/>
+                    </m:oMathParaPr>
+                    <m:oMath xmlns:m="http://schemas.openxmlformats.org/officeDocument/2006/math">
+                      <m:r>
+                        <a:rPr lang="en-US" b="0" i="1" smtClean="0">
+                          <a:latin typeface="Cambria Math" panose="02040503050406030204" pitchFamily="18" charset="0"/>
+                        </a:rPr>
+                        <m:t>𝑣𝑜𝑙𝑢𝑚𝑒</m:t>
+                      </m:r>
+                      <m:r>
+                        <a:rPr lang="en-US" b="0" i="1" smtClean="0">
+                          <a:latin typeface="Cambria Math" panose="02040503050406030204" pitchFamily="18" charset="0"/>
+                        </a:rPr>
+                        <m:t>=</m:t>
+                      </m:r>
+                      <m:r>
+                        <a:rPr lang="en-US" b="0" i="1" smtClean="0">
+                          <a:latin typeface="Cambria Math" panose="02040503050406030204" pitchFamily="18" charset="0"/>
+                        </a:rPr>
+                        <m:t>h𝑒𝑖𝑔h𝑡</m:t>
+                      </m:r>
+                      <m:r>
+                        <a:rPr lang="en-US" i="1">
+                          <a:latin typeface="Cambria Math" panose="02040503050406030204" pitchFamily="18" charset="0"/>
+                          <a:ea typeface="Cambria Math" panose="02040503050406030204" pitchFamily="18" charset="0"/>
+                        </a:rPr>
+                        <m:t>∙</m:t>
+                      </m:r>
+                      <m:r>
+                        <a:rPr lang="en-US" b="0" i="1" smtClean="0">
+                          <a:latin typeface="Cambria Math" panose="02040503050406030204" pitchFamily="18" charset="0"/>
+                          <a:ea typeface="Cambria Math" panose="02040503050406030204" pitchFamily="18" charset="0"/>
+                        </a:rPr>
+                        <m:t>𝑤𝑖𝑑𝑡h</m:t>
+                      </m:r>
+                      <m:r>
+                        <a:rPr lang="en-US" i="1">
+                          <a:latin typeface="Cambria Math" panose="02040503050406030204" pitchFamily="18" charset="0"/>
+                          <a:ea typeface="Cambria Math" panose="02040503050406030204" pitchFamily="18" charset="0"/>
+                        </a:rPr>
+                        <m:t>∙</m:t>
+                      </m:r>
+                      <m:r>
+                        <a:rPr lang="en-US" b="0" i="1" smtClean="0">
+                          <a:latin typeface="Cambria Math" panose="02040503050406030204" pitchFamily="18" charset="0"/>
+                          <a:ea typeface="Cambria Math" panose="02040503050406030204" pitchFamily="18" charset="0"/>
+                        </a:rPr>
+                        <m:t>𝑑𝑒𝑝𝑡h</m:t>
+                      </m:r>
+                      <m:r>
+                        <a:rPr lang="en-US" b="0" i="1" smtClean="0">
+                          <a:latin typeface="Cambria Math" panose="02040503050406030204" pitchFamily="18" charset="0"/>
+                          <a:ea typeface="Cambria Math" panose="02040503050406030204" pitchFamily="18" charset="0"/>
+                        </a:rPr>
+                        <m:t>=</m:t>
+                      </m:r>
+                      <m:r>
+                        <a:rPr lang="en-US" b="0" i="1" smtClean="0">
+                          <a:latin typeface="Cambria Math" panose="02040503050406030204" pitchFamily="18" charset="0"/>
+                          <a:ea typeface="Cambria Math" panose="02040503050406030204" pitchFamily="18" charset="0"/>
+                        </a:rPr>
+                        <m:t>𝑑h𝑤</m:t>
+                      </m:r>
+                      <m:r>
+                        <a:rPr lang="en-US" i="1">
+                          <a:latin typeface="Cambria Math" panose="02040503050406030204" pitchFamily="18" charset="0"/>
+                          <a:ea typeface="Cambria Math" panose="02040503050406030204" pitchFamily="18" charset="0"/>
+                        </a:rPr>
+                        <m:t>∙</m:t>
+                      </m:r>
+                      <m:sSup>
+                        <m:sSupPr>
+                          <m:ctrlPr>
+                            <a:rPr lang="en-US" b="0" i="1" smtClean="0">
+                              <a:latin typeface="Cambria Math" panose="02040503050406030204" pitchFamily="18" charset="0"/>
+                              <a:ea typeface="Cambria Math" panose="02040503050406030204" pitchFamily="18" charset="0"/>
+                            </a:rPr>
+                          </m:ctrlPr>
+                        </m:sSupPr>
+                        <m:e>
+                          <m:d>
+                            <m:dPr>
+                              <m:ctrlPr>
+                                <a:rPr lang="en-US" b="0" i="0" smtClean="0">
+                                  <a:latin typeface="Cambria Math" panose="02040503050406030204" pitchFamily="18" charset="0"/>
+                                  <a:ea typeface="Cambria Math" panose="02040503050406030204" pitchFamily="18" charset="0"/>
+                                </a:rPr>
+                              </m:ctrlPr>
+                            </m:dPr>
+                            <m:e>
+                              <m:r>
+                                <a:rPr lang="en-US" i="1">
+                                  <a:latin typeface="Cambria Math" panose="02040503050406030204" pitchFamily="18" charset="0"/>
+                                </a:rPr>
+                                <m:t>𝑓</m:t>
+                              </m:r>
+                              <m:d>
+                                <m:dPr>
+                                  <m:ctrlPr>
+                                    <a:rPr lang="en-US" i="1">
+                                      <a:latin typeface="Cambria Math" panose="02040503050406030204" pitchFamily="18" charset="0"/>
+                                    </a:rPr>
+                                  </m:ctrlPr>
+                                </m:dPr>
+                                <m:e>
+                                  <m:r>
+                                    <a:rPr lang="en-US" i="1">
+                                      <a:latin typeface="Cambria Math" panose="02040503050406030204" pitchFamily="18" charset="0"/>
+                                    </a:rPr>
+                                    <m:t>𝑑h𝑤</m:t>
+                                  </m:r>
+                                </m:e>
+                              </m:d>
+                            </m:e>
+                          </m:d>
+                        </m:e>
+                        <m:sup>
+                          <m:r>
+                            <a:rPr lang="en-US" b="0" i="1" smtClean="0">
+                              <a:latin typeface="Cambria Math" panose="02040503050406030204" pitchFamily="18" charset="0"/>
+                            </a:rPr>
+                            <m:t>3</m:t>
+                          </m:r>
+                        </m:sup>
+                      </m:sSup>
+                    </m:oMath>
+                  </m:oMathPara>
+                </a14:m>
+                <a:endParaRPr lang="en-US" dirty="0"/>
+              </a:p>
+              <a:p>
+                <a:pPr/>
+                <a:endParaRPr lang="en-US" b="0" dirty="0"/>
+              </a:p>
+              <a:p>
+                <a:endParaRPr lang="en-US" b="0" dirty="0"/>
+              </a:p>
+              <a:p>
+                <a:endParaRPr lang="en-US" dirty="0"/>
+              </a:p>
+            </p:txBody>
+          </p:sp>
+        </mc:Choice>
+        <mc:Fallback>
+          <p:sp>
+            <p:nvSpPr>
+              <p:cNvPr id="5" name="TextBox 4">
+                <a:extLst>
+                  <a:ext uri="{FF2B5EF4-FFF2-40B4-BE49-F238E27FC236}">
+                    <a16:creationId xmlns:a16="http://schemas.microsoft.com/office/drawing/2014/main" id="{E9259BDB-1724-BCCF-3CE3-B84E51A60337}"/>
+                  </a:ext>
+                </a:extLst>
+              </p:cNvPr>
+              <p:cNvSpPr txBox="1">
+                <a:spLocks noRot="1" noChangeAspect="1" noMove="1" noResize="1" noEditPoints="1" noAdjustHandles="1" noChangeArrowheads="1" noChangeShapeType="1" noTextEdit="1"/>
+              </p:cNvSpPr>
+              <p:nvPr/>
+            </p:nvSpPr>
+            <p:spPr>
+              <a:xfrm>
+                <a:off x="555170" y="1170215"/>
+                <a:ext cx="9391650" cy="4709238"/>
+              </a:xfrm>
+              <a:prstGeom prst="rect">
+                <a:avLst/>
+              </a:prstGeom>
+              <a:blipFill>
+                <a:blip r:embed="rId2"/>
+                <a:stretch>
+                  <a:fillRect l="-519" t="-648"/>
+                </a:stretch>
+              </a:blipFill>
+            </p:spPr>
+            <p:txBody>
+              <a:bodyPr/>
+              <a:lstStyle/>
+              <a:p>
+                <a:r>
+                  <a:rPr lang="en-US">
+                    <a:noFill/>
+                  </a:rPr>
+                  <a:t> </a:t>
+                </a:r>
+              </a:p>
+            </p:txBody>
+          </p:sp>
+        </mc:Fallback>
+      </mc:AlternateContent>
+    </p:spTree>
+    <p:extLst>
+      <p:ext uri="{BB962C8B-B14F-4D97-AF65-F5344CB8AC3E}">
+        <p14:creationId xmlns:p14="http://schemas.microsoft.com/office/powerpoint/2010/main" val="2027744772"/>
+      </p:ext>
+    </p:extLst>
+  </p:cSld>
+  <p:clrMapOvr>
+    <a:masterClrMapping/>
+  </p:clrMapOvr>
+</p:sld>
+</file>
+
+<file path=ppt/slides/slide4.xml><?xml version="1.0" encoding="utf-8"?>
 <p:sld xmlns:a="http://schemas.openxmlformats.org/drawingml/2006/main" xmlns:r="http://schemas.openxmlformats.org/officeDocument/2006/relationships" xmlns:p="http://schemas.openxmlformats.org/presentationml/2006/main">
   <p:cSld>
     <p:spTree>

</xml_diff>

<commit_message>
dev: mask_rcnn/notebook/BoxCoder.ipynb: understand decoding operation in box coder
</commit_message>
<xml_diff>
--- a/mask_rcnn/doc/networks.pptx
+++ b/mask_rcnn/doc/networks.pptx
@@ -5445,8 +5445,8 @@
           <a:chExt cx="0" cy="0"/>
         </a:xfrm>
       </p:grpSpPr>
-      <mc:AlternateContent xmlns:mc="http://schemas.openxmlformats.org/markup-compatibility/2006">
-        <mc:Choice xmlns:a14="http://schemas.microsoft.com/office/drawing/2010/main" Requires="a14">
+      <mc:AlternateContent xmlns:mc="http://schemas.openxmlformats.org/markup-compatibility/2006" xmlns:a14="http://schemas.microsoft.com/office/drawing/2010/main">
+        <mc:Choice Requires="a14">
           <p:sp>
             <p:nvSpPr>
               <p:cNvPr id="5" name="TextBox 4">
@@ -6567,7 +6567,7 @@
             </p:txBody>
           </p:sp>
         </mc:Choice>
-        <mc:Fallback>
+        <mc:Fallback xmlns="">
           <p:sp>
             <p:nvSpPr>
               <p:cNvPr id="5" name="TextBox 4">
@@ -6712,8 +6712,8 @@
           </a:p>
         </p:txBody>
       </p:sp>
-      <mc:AlternateContent xmlns:mc="http://schemas.openxmlformats.org/markup-compatibility/2006">
-        <mc:Choice xmlns:a14="http://schemas.microsoft.com/office/drawing/2010/main" Requires="a14">
+      <mc:AlternateContent xmlns:mc="http://schemas.openxmlformats.org/markup-compatibility/2006" xmlns:a14="http://schemas.microsoft.com/office/drawing/2010/main">
+        <mc:Choice Requires="a14">
           <p:sp>
             <p:nvSpPr>
               <p:cNvPr id="5" name="TextBox 4">
@@ -6729,7 +6729,7 @@
             <p:spPr>
               <a:xfrm>
                 <a:off x="555170" y="1170215"/>
-                <a:ext cx="9391650" cy="4709238"/>
+                <a:ext cx="9391650" cy="4758482"/>
               </a:xfrm>
               <a:prstGeom prst="rect">
                 <a:avLst/>
@@ -6934,7 +6934,6 @@
                 <a:endParaRPr lang="en-US" b="0" dirty="0"/>
               </a:p>
               <a:p>
-                <a:pPr/>
                 <a:r>
                   <a:rPr lang="en-US" dirty="0"/>
                   <a:t>Let </a:t>
@@ -6988,7 +6987,7 @@
                           <a:rPr lang="en-US" b="0" i="1" smtClean="0">
                             <a:latin typeface="Cambria Math" panose="02040503050406030204" pitchFamily="18" charset="0"/>
                           </a:rPr>
-                          <m:t>3</m:t>
+                          <m:t>2</m:t>
                         </m:r>
                       </m:sup>
                     </m:sSup>
@@ -7860,7 +7859,6 @@
                 <a:endParaRPr lang="en-US" b="0" dirty="0"/>
               </a:p>
               <a:p>
-                <a:pPr/>
                 <a:endParaRPr lang="en-US" b="0" dirty="0"/>
               </a:p>
               <a:p>
@@ -7951,7 +7949,7 @@
                           <m:d>
                             <m:dPr>
                               <m:ctrlPr>
-                                <a:rPr lang="en-US" b="0" i="0" smtClean="0">
+                                <a:rPr lang="en-US" b="0" i="1" smtClean="0">
                                   <a:latin typeface="Cambria Math" panose="02040503050406030204" pitchFamily="18" charset="0"/>
                                   <a:ea typeface="Cambria Math" panose="02040503050406030204" pitchFamily="18" charset="0"/>
                                 </a:rPr>
@@ -7993,13 +7991,142 @@
                           </m:r>
                         </m:sup>
                       </m:sSup>
+                      <m:r>
+                        <a:rPr lang="en-US" b="0" i="1" smtClean="0">
+                          <a:latin typeface="Cambria Math" panose="02040503050406030204" pitchFamily="18" charset="0"/>
+                        </a:rPr>
+                        <m:t>=</m:t>
+                      </m:r>
+                      <m:r>
+                        <a:rPr lang="en-US" b="0" i="1" smtClean="0">
+                          <a:latin typeface="Cambria Math" panose="02040503050406030204" pitchFamily="18" charset="0"/>
+                        </a:rPr>
+                        <m:t>𝑑h𝑤</m:t>
+                      </m:r>
+                      <m:r>
+                        <a:rPr lang="en-US" b="0" i="1" smtClean="0">
+                          <a:latin typeface="Cambria Math" panose="02040503050406030204" pitchFamily="18" charset="0"/>
+                          <a:ea typeface="Cambria Math" panose="02040503050406030204" pitchFamily="18" charset="0"/>
+                        </a:rPr>
+                        <m:t>∙</m:t>
+                      </m:r>
+                      <m:sSup>
+                        <m:sSupPr>
+                          <m:ctrlPr>
+                            <a:rPr lang="en-US" b="0" i="1" smtClean="0">
+                              <a:latin typeface="Cambria Math" panose="02040503050406030204" pitchFamily="18" charset="0"/>
+                              <a:ea typeface="Cambria Math" panose="02040503050406030204" pitchFamily="18" charset="0"/>
+                            </a:rPr>
+                          </m:ctrlPr>
+                        </m:sSupPr>
+                        <m:e>
+                          <m:d>
+                            <m:dPr>
+                              <m:ctrlPr>
+                                <a:rPr lang="en-US" b="0" i="1" smtClean="0">
+                                  <a:latin typeface="Cambria Math" panose="02040503050406030204" pitchFamily="18" charset="0"/>
+                                  <a:ea typeface="Cambria Math" panose="02040503050406030204" pitchFamily="18" charset="0"/>
+                                </a:rPr>
+                              </m:ctrlPr>
+                            </m:dPr>
+                            <m:e>
+                              <m:rad>
+                                <m:radPr>
+                                  <m:ctrlPr>
+                                    <a:rPr lang="en-US" b="0" i="1" smtClean="0">
+                                      <a:latin typeface="Cambria Math" panose="02040503050406030204" pitchFamily="18" charset="0"/>
+                                      <a:ea typeface="Cambria Math" panose="02040503050406030204" pitchFamily="18" charset="0"/>
+                                    </a:rPr>
+                                  </m:ctrlPr>
+                                </m:radPr>
+                                <m:deg>
+                                  <m:r>
+                                    <m:rPr>
+                                      <m:brk m:alnAt="7"/>
+                                    </m:rPr>
+                                    <a:rPr lang="en-US" b="0" i="1" smtClean="0">
+                                      <a:latin typeface="Cambria Math" panose="02040503050406030204" pitchFamily="18" charset="0"/>
+                                      <a:ea typeface="Cambria Math" panose="02040503050406030204" pitchFamily="18" charset="0"/>
+                                    </a:rPr>
+                                    <m:t>3</m:t>
+                                  </m:r>
+                                </m:deg>
+                                <m:e>
+                                  <m:r>
+                                    <a:rPr lang="en-US" b="0" i="1" smtClean="0">
+                                      <a:latin typeface="Cambria Math" panose="02040503050406030204" pitchFamily="18" charset="0"/>
+                                      <a:ea typeface="Cambria Math" panose="02040503050406030204" pitchFamily="18" charset="0"/>
+                                    </a:rPr>
+                                    <m:t>𝑑h𝑤</m:t>
+                                  </m:r>
+                                </m:e>
+                              </m:rad>
+                            </m:e>
+                          </m:d>
+                        </m:e>
+                        <m:sup>
+                          <m:r>
+                            <a:rPr lang="en-US" b="0" i="1" smtClean="0">
+                              <a:latin typeface="Cambria Math" panose="02040503050406030204" pitchFamily="18" charset="0"/>
+                              <a:ea typeface="Cambria Math" panose="02040503050406030204" pitchFamily="18" charset="0"/>
+                            </a:rPr>
+                            <m:t>3</m:t>
+                          </m:r>
+                        </m:sup>
+                      </m:sSup>
+                      <m:r>
+                        <a:rPr lang="en-US" b="0" i="1" smtClean="0">
+                          <a:latin typeface="Cambria Math" panose="02040503050406030204" pitchFamily="18" charset="0"/>
+                          <a:ea typeface="Cambria Math" panose="02040503050406030204" pitchFamily="18" charset="0"/>
+                        </a:rPr>
+                        <m:t>=</m:t>
+                      </m:r>
+                      <m:sSup>
+                        <m:sSupPr>
+                          <m:ctrlPr>
+                            <a:rPr lang="en-US" b="0" i="1" smtClean="0">
+                              <a:latin typeface="Cambria Math" panose="02040503050406030204" pitchFamily="18" charset="0"/>
+                              <a:ea typeface="Cambria Math" panose="02040503050406030204" pitchFamily="18" charset="0"/>
+                            </a:rPr>
+                          </m:ctrlPr>
+                        </m:sSupPr>
+                        <m:e>
+                          <m:d>
+                            <m:dPr>
+                              <m:ctrlPr>
+                                <a:rPr lang="en-US" b="0" i="1" smtClean="0">
+                                  <a:latin typeface="Cambria Math" panose="02040503050406030204" pitchFamily="18" charset="0"/>
+                                  <a:ea typeface="Cambria Math" panose="02040503050406030204" pitchFamily="18" charset="0"/>
+                                </a:rPr>
+                              </m:ctrlPr>
+                            </m:dPr>
+                            <m:e>
+                              <m:r>
+                                <a:rPr lang="en-US" b="0" i="1" smtClean="0">
+                                  <a:latin typeface="Cambria Math" panose="02040503050406030204" pitchFamily="18" charset="0"/>
+                                  <a:ea typeface="Cambria Math" panose="02040503050406030204" pitchFamily="18" charset="0"/>
+                                </a:rPr>
+                                <m:t>𝑑h𝑤</m:t>
+                              </m:r>
+                            </m:e>
+                          </m:d>
+                        </m:e>
+                        <m:sup>
+                          <m:r>
+                            <a:rPr lang="en-US" b="0" i="1" smtClean="0">
+                              <a:latin typeface="Cambria Math" panose="02040503050406030204" pitchFamily="18" charset="0"/>
+                              <a:ea typeface="Cambria Math" panose="02040503050406030204" pitchFamily="18" charset="0"/>
+                            </a:rPr>
+                            <m:t>2</m:t>
+                          </m:r>
+                        </m:sup>
+                      </m:sSup>
                     </m:oMath>
                   </m:oMathPara>
                 </a14:m>
                 <a:endParaRPr lang="en-US" dirty="0"/>
               </a:p>
               <a:p>
-                <a:pPr/>
                 <a:endParaRPr lang="en-US" b="0" dirty="0"/>
               </a:p>
               <a:p>
@@ -8011,7 +8138,7 @@
             </p:txBody>
           </p:sp>
         </mc:Choice>
-        <mc:Fallback>
+        <mc:Fallback xmlns="">
           <p:sp>
             <p:nvSpPr>
               <p:cNvPr id="5" name="TextBox 4">
@@ -8029,7 +8156,7 @@
             <p:spPr>
               <a:xfrm>
                 <a:off x="555170" y="1170215"/>
-                <a:ext cx="9391650" cy="4709238"/>
+                <a:ext cx="9391650" cy="4758482"/>
               </a:xfrm>
               <a:prstGeom prst="rect">
                 <a:avLst/>
@@ -8037,7 +8164,7 @@
               <a:blipFill>
                 <a:blip r:embed="rId2"/>
                 <a:stretch>
-                  <a:fillRect l="-519" t="-648"/>
+                  <a:fillRect l="-519" t="-640"/>
                 </a:stretch>
               </a:blipFill>
             </p:spPr>

</xml_diff>

<commit_message>
test: mask_rcnn/notebook: train mask rcnn
</commit_message>
<xml_diff>
--- a/mask_rcnn/doc/networks.pptx
+++ b/mask_rcnn/doc/networks.pptx
@@ -269,7 +269,7 @@
           <a:p>
             <a:fld id="{118988BA-6DA2-47E2-A1CD-CED21CFF5A8E}" type="datetimeFigureOut">
               <a:rPr lang="en-US" smtClean="0"/>
-              <a:t>9/5/2025</a:t>
+              <a:t>9/7/2025</a:t>
             </a:fld>
             <a:endParaRPr lang="en-US"/>
           </a:p>
@@ -467,7 +467,7 @@
           <a:p>
             <a:fld id="{118988BA-6DA2-47E2-A1CD-CED21CFF5A8E}" type="datetimeFigureOut">
               <a:rPr lang="en-US" smtClean="0"/>
-              <a:t>9/5/2025</a:t>
+              <a:t>9/7/2025</a:t>
             </a:fld>
             <a:endParaRPr lang="en-US"/>
           </a:p>
@@ -675,7 +675,7 @@
           <a:p>
             <a:fld id="{118988BA-6DA2-47E2-A1CD-CED21CFF5A8E}" type="datetimeFigureOut">
               <a:rPr lang="en-US" smtClean="0"/>
-              <a:t>9/5/2025</a:t>
+              <a:t>9/7/2025</a:t>
             </a:fld>
             <a:endParaRPr lang="en-US"/>
           </a:p>
@@ -873,7 +873,7 @@
           <a:p>
             <a:fld id="{118988BA-6DA2-47E2-A1CD-CED21CFF5A8E}" type="datetimeFigureOut">
               <a:rPr lang="en-US" smtClean="0"/>
-              <a:t>9/5/2025</a:t>
+              <a:t>9/7/2025</a:t>
             </a:fld>
             <a:endParaRPr lang="en-US"/>
           </a:p>
@@ -1148,7 +1148,7 @@
           <a:p>
             <a:fld id="{118988BA-6DA2-47E2-A1CD-CED21CFF5A8E}" type="datetimeFigureOut">
               <a:rPr lang="en-US" smtClean="0"/>
-              <a:t>9/5/2025</a:t>
+              <a:t>9/7/2025</a:t>
             </a:fld>
             <a:endParaRPr lang="en-US"/>
           </a:p>
@@ -1413,7 +1413,7 @@
           <a:p>
             <a:fld id="{118988BA-6DA2-47E2-A1CD-CED21CFF5A8E}" type="datetimeFigureOut">
               <a:rPr lang="en-US" smtClean="0"/>
-              <a:t>9/5/2025</a:t>
+              <a:t>9/7/2025</a:t>
             </a:fld>
             <a:endParaRPr lang="en-US"/>
           </a:p>
@@ -1825,7 +1825,7 @@
           <a:p>
             <a:fld id="{118988BA-6DA2-47E2-A1CD-CED21CFF5A8E}" type="datetimeFigureOut">
               <a:rPr lang="en-US" smtClean="0"/>
-              <a:t>9/5/2025</a:t>
+              <a:t>9/7/2025</a:t>
             </a:fld>
             <a:endParaRPr lang="en-US"/>
           </a:p>
@@ -1966,7 +1966,7 @@
           <a:p>
             <a:fld id="{118988BA-6DA2-47E2-A1CD-CED21CFF5A8E}" type="datetimeFigureOut">
               <a:rPr lang="en-US" smtClean="0"/>
-              <a:t>9/5/2025</a:t>
+              <a:t>9/7/2025</a:t>
             </a:fld>
             <a:endParaRPr lang="en-US"/>
           </a:p>
@@ -2079,7 +2079,7 @@
           <a:p>
             <a:fld id="{118988BA-6DA2-47E2-A1CD-CED21CFF5A8E}" type="datetimeFigureOut">
               <a:rPr lang="en-US" smtClean="0"/>
-              <a:t>9/5/2025</a:t>
+              <a:t>9/7/2025</a:t>
             </a:fld>
             <a:endParaRPr lang="en-US"/>
           </a:p>
@@ -2390,7 +2390,7 @@
           <a:p>
             <a:fld id="{118988BA-6DA2-47E2-A1CD-CED21CFF5A8E}" type="datetimeFigureOut">
               <a:rPr lang="en-US" smtClean="0"/>
-              <a:t>9/5/2025</a:t>
+              <a:t>9/7/2025</a:t>
             </a:fld>
             <a:endParaRPr lang="en-US"/>
           </a:p>
@@ -2678,7 +2678,7 @@
           <a:p>
             <a:fld id="{118988BA-6DA2-47E2-A1CD-CED21CFF5A8E}" type="datetimeFigureOut">
               <a:rPr lang="en-US" smtClean="0"/>
-              <a:t>9/5/2025</a:t>
+              <a:t>9/7/2025</a:t>
             </a:fld>
             <a:endParaRPr lang="en-US"/>
           </a:p>
@@ -2919,7 +2919,7 @@
           <a:p>
             <a:fld id="{118988BA-6DA2-47E2-A1CD-CED21CFF5A8E}" type="datetimeFigureOut">
               <a:rPr lang="en-US" smtClean="0"/>
-              <a:t>9/5/2025</a:t>
+              <a:t>9/7/2025</a:t>
             </a:fld>
             <a:endParaRPr lang="en-US"/>
           </a:p>
@@ -24641,8 +24641,8 @@
           </a:p>
         </p:txBody>
       </p:sp>
-      <mc:AlternateContent xmlns:mc="http://schemas.openxmlformats.org/markup-compatibility/2006">
-        <mc:Choice xmlns:a14="http://schemas.microsoft.com/office/drawing/2010/main" Requires="a14">
+      <mc:AlternateContent xmlns:mc="http://schemas.openxmlformats.org/markup-compatibility/2006" xmlns:a14="http://schemas.microsoft.com/office/drawing/2010/main">
+        <mc:Choice Requires="a14">
           <p:sp>
             <p:nvSpPr>
               <p:cNvPr id="5" name="TextBox 4">
@@ -24699,7 +24699,7 @@
                     <m:sSub>
                       <m:sSubPr>
                         <m:ctrlPr>
-                          <a:rPr lang="en-US" b="0" i="0" smtClean="0">
+                          <a:rPr lang="en-US" b="0" i="1" smtClean="0">
                             <a:latin typeface="Cambria Math" panose="02040503050406030204" pitchFamily="18" charset="0"/>
                           </a:rPr>
                         </m:ctrlPr>
@@ -24735,7 +24735,7 @@
                         <m:begChr m:val="["/>
                         <m:endChr m:val="]"/>
                         <m:ctrlPr>
-                          <a:rPr lang="en-US" b="0" i="0" smtClean="0">
+                          <a:rPr lang="en-US" b="0" i="1" smtClean="0">
                             <a:latin typeface="Cambria Math" panose="02040503050406030204" pitchFamily="18" charset="0"/>
                           </a:rPr>
                         </m:ctrlPr>
@@ -25069,7 +25069,7 @@
                     <m:sSub>
                       <m:sSubPr>
                         <m:ctrlPr>
-                          <a:rPr lang="en-US" b="0" i="0" smtClean="0">
+                          <a:rPr lang="en-US" b="0" i="1" smtClean="0">
                             <a:latin typeface="Cambria Math" panose="02040503050406030204" pitchFamily="18" charset="0"/>
                           </a:rPr>
                         </m:ctrlPr>
@@ -27889,7 +27889,7 @@
             </p:txBody>
           </p:sp>
         </mc:Choice>
-        <mc:Fallback>
+        <mc:Fallback xmlns="">
           <p:sp>
             <p:nvSpPr>
               <p:cNvPr id="5" name="TextBox 4">
@@ -27999,8 +27999,8 @@
           </a:p>
         </p:txBody>
       </p:sp>
-      <mc:AlternateContent xmlns:mc="http://schemas.openxmlformats.org/markup-compatibility/2006">
-        <mc:Choice xmlns:a14="http://schemas.microsoft.com/office/drawing/2010/main" Requires="a14">
+      <mc:AlternateContent xmlns:mc="http://schemas.openxmlformats.org/markup-compatibility/2006" xmlns:a14="http://schemas.microsoft.com/office/drawing/2010/main">
+        <mc:Choice Requires="a14">
           <p:sp>
             <p:nvSpPr>
               <p:cNvPr id="5" name="TextBox 4">
@@ -30864,7 +30864,7 @@
             </p:txBody>
           </p:sp>
         </mc:Choice>
-        <mc:Fallback>
+        <mc:Fallback xmlns="">
           <p:sp>
             <p:nvSpPr>
               <p:cNvPr id="5" name="TextBox 4">
@@ -31130,14 +31130,7 @@
                                       <a:latin typeface="Cambria Math" panose="02040503050406030204" pitchFamily="18" charset="0"/>
                                       <a:cs typeface="Arial" panose="020B0604020202020204" pitchFamily="34" charset="0"/>
                                     </a:rPr>
-                                    <m:t>𝑤</m:t>
-                                  </m:r>
-                                  <m:r>
-                                    <a:rPr lang="en-US" sz="1400" b="0" i="1" smtClean="0">
-                                      <a:latin typeface="Cambria Math" panose="02040503050406030204" pitchFamily="18" charset="0"/>
-                                      <a:cs typeface="Arial" panose="020B0604020202020204" pitchFamily="34" charset="0"/>
-                                    </a:rPr>
-                                    <m:t>h</m:t>
+                                    <m:t>𝑤h</m:t>
                                   </m:r>
                                 </m:e>
                               </m:rad>
@@ -31146,21 +31139,7 @@
                                   <a:latin typeface="Cambria Math" panose="02040503050406030204" pitchFamily="18" charset="0"/>
                                   <a:cs typeface="Arial" panose="020B0604020202020204" pitchFamily="34" charset="0"/>
                                 </a:rPr>
-                                <m:t>/</m:t>
-                              </m:r>
-                              <m:r>
-                                <a:rPr lang="en-US" sz="1400" b="0" i="1" smtClean="0">
-                                  <a:latin typeface="Cambria Math" panose="02040503050406030204" pitchFamily="18" charset="0"/>
-                                  <a:cs typeface="Arial" panose="020B0604020202020204" pitchFamily="34" charset="0"/>
-                                </a:rPr>
-                                <m:t>224</m:t>
-                              </m:r>
-                              <m:r>
-                                <a:rPr lang="en-US" sz="1400" b="0" i="1" smtClean="0">
-                                  <a:latin typeface="Cambria Math" panose="02040503050406030204" pitchFamily="18" charset="0"/>
-                                  <a:cs typeface="Arial" panose="020B0604020202020204" pitchFamily="34" charset="0"/>
-                                </a:rPr>
-                                <m:t>)</m:t>
+                                <m:t>/224)</m:t>
                               </m:r>
                             </m:e>
                           </m:func>
@@ -31373,21 +31352,7 @@
                         <a:latin typeface="Cambria Math" panose="02040503050406030204" pitchFamily="18" charset="0"/>
                         <a:cs typeface="Arial" panose="020B0604020202020204" pitchFamily="34" charset="0"/>
                       </a:rPr>
-                      <m:t>=</m:t>
-                    </m:r>
-                    <m:r>
-                      <a:rPr lang="en-US" sz="1400" b="0" i="1" smtClean="0">
-                        <a:latin typeface="Cambria Math" panose="02040503050406030204" pitchFamily="18" charset="0"/>
-                        <a:cs typeface="Arial" panose="020B0604020202020204" pitchFamily="34" charset="0"/>
-                      </a:rPr>
-                      <m:t>32</m:t>
-                    </m:r>
-                    <m:r>
-                      <a:rPr lang="en-US" sz="1400" b="0" i="1" smtClean="0">
-                        <a:latin typeface="Cambria Math" panose="02040503050406030204" pitchFamily="18" charset="0"/>
-                        <a:cs typeface="Arial" panose="020B0604020202020204" pitchFamily="34" charset="0"/>
-                      </a:rPr>
-                      <m:t>,</m:t>
+                      <m:t>=32,</m:t>
                     </m:r>
                     <m:r>
                       <a:rPr lang="en-US" sz="1400" b="0" i="1" smtClean="0">
@@ -31401,21 +31366,7 @@
                         <a:latin typeface="Cambria Math" panose="02040503050406030204" pitchFamily="18" charset="0"/>
                         <a:cs typeface="Arial" panose="020B0604020202020204" pitchFamily="34" charset="0"/>
                       </a:rPr>
-                      <m:t>=</m:t>
-                    </m:r>
-                    <m:r>
-                      <a:rPr lang="en-US" sz="1400" b="0" i="1" smtClean="0">
-                        <a:latin typeface="Cambria Math" panose="02040503050406030204" pitchFamily="18" charset="0"/>
-                        <a:cs typeface="Arial" panose="020B0604020202020204" pitchFamily="34" charset="0"/>
-                      </a:rPr>
-                      <m:t>32</m:t>
-                    </m:r>
-                    <m:r>
-                      <a:rPr lang="en-US" sz="1400" b="0" i="1" smtClean="0">
-                        <a:latin typeface="Cambria Math" panose="02040503050406030204" pitchFamily="18" charset="0"/>
-                        <a:cs typeface="Arial" panose="020B0604020202020204" pitchFamily="34" charset="0"/>
-                      </a:rPr>
-                      <m:t>→</m:t>
+                      <m:t>=32→</m:t>
                     </m:r>
                     <m:rad>
                       <m:radPr>
@@ -31443,14 +31394,7 @@
                         <a:latin typeface="Cambria Math" panose="02040503050406030204" pitchFamily="18" charset="0"/>
                         <a:cs typeface="Arial" panose="020B0604020202020204" pitchFamily="34" charset="0"/>
                       </a:rPr>
-                      <m:t>=</m:t>
-                    </m:r>
-                    <m:r>
-                      <a:rPr lang="en-US" sz="1400" b="0" i="1" smtClean="0">
-                        <a:latin typeface="Cambria Math" panose="02040503050406030204" pitchFamily="18" charset="0"/>
-                        <a:cs typeface="Arial" panose="020B0604020202020204" pitchFamily="34" charset="0"/>
-                      </a:rPr>
-                      <m:t>32</m:t>
+                      <m:t>=32</m:t>
                     </m:r>
                   </m:oMath>
                 </a14:m>
@@ -31475,21 +31419,7 @@
                         <a:latin typeface="Cambria Math" panose="02040503050406030204" pitchFamily="18" charset="0"/>
                         <a:cs typeface="Arial" panose="020B0604020202020204" pitchFamily="34" charset="0"/>
                       </a:rPr>
-                      <m:t>=</m:t>
-                    </m:r>
-                    <m:r>
-                      <a:rPr lang="en-US" sz="1400" b="0" i="1" smtClean="0">
-                        <a:latin typeface="Cambria Math" panose="02040503050406030204" pitchFamily="18" charset="0"/>
-                        <a:cs typeface="Arial" panose="020B0604020202020204" pitchFamily="34" charset="0"/>
-                      </a:rPr>
-                      <m:t>16</m:t>
-                    </m:r>
-                    <m:r>
-                      <a:rPr lang="en-US" sz="1400" b="0" i="1" smtClean="0">
-                        <a:latin typeface="Cambria Math" panose="02040503050406030204" pitchFamily="18" charset="0"/>
-                        <a:cs typeface="Arial" panose="020B0604020202020204" pitchFamily="34" charset="0"/>
-                      </a:rPr>
-                      <m:t>, </m:t>
+                      <m:t>=16, </m:t>
                     </m:r>
                     <m:r>
                       <a:rPr lang="en-US" sz="1400" b="0" i="1" smtClean="0">
@@ -31503,21 +31433,7 @@
                         <a:latin typeface="Cambria Math" panose="02040503050406030204" pitchFamily="18" charset="0"/>
                         <a:cs typeface="Arial" panose="020B0604020202020204" pitchFamily="34" charset="0"/>
                       </a:rPr>
-                      <m:t>=</m:t>
-                    </m:r>
-                    <m:r>
-                      <a:rPr lang="en-US" sz="1400" b="0" i="1" smtClean="0">
-                        <a:latin typeface="Cambria Math" panose="02040503050406030204" pitchFamily="18" charset="0"/>
-                        <a:cs typeface="Arial" panose="020B0604020202020204" pitchFamily="34" charset="0"/>
-                      </a:rPr>
-                      <m:t>64</m:t>
-                    </m:r>
-                    <m:r>
-                      <a:rPr lang="en-US" sz="1400" b="0" i="1" smtClean="0">
-                        <a:latin typeface="Cambria Math" panose="02040503050406030204" pitchFamily="18" charset="0"/>
-                        <a:cs typeface="Arial" panose="020B0604020202020204" pitchFamily="34" charset="0"/>
-                      </a:rPr>
-                      <m:t>→</m:t>
+                      <m:t>=64→</m:t>
                     </m:r>
                     <m:rad>
                       <m:radPr>
@@ -31543,21 +31459,7 @@
                             <a:latin typeface="Cambria Math" panose="02040503050406030204" pitchFamily="18" charset="0"/>
                             <a:cs typeface="Arial" panose="020B0604020202020204" pitchFamily="34" charset="0"/>
                           </a:rPr>
-                          <m:t>=</m:t>
-                        </m:r>
-                        <m:r>
-                          <a:rPr lang="en-US" sz="1400" b="0" i="1" smtClean="0">
-                            <a:latin typeface="Cambria Math" panose="02040503050406030204" pitchFamily="18" charset="0"/>
-                            <a:cs typeface="Arial" panose="020B0604020202020204" pitchFamily="34" charset="0"/>
-                          </a:rPr>
-                          <m:t>32</m:t>
-                        </m:r>
-                        <m:r>
-                          <a:rPr lang="en-US" sz="1400" b="0" i="1" smtClean="0">
-                            <a:latin typeface="Cambria Math" panose="02040503050406030204" pitchFamily="18" charset="0"/>
-                            <a:cs typeface="Arial" panose="020B0604020202020204" pitchFamily="34" charset="0"/>
-                          </a:rPr>
-                          <m:t>.</m:t>
+                          <m:t>=32.</m:t>
                         </m:r>
                       </m:e>
                     </m:rad>
@@ -31679,14 +31581,7 @@
                             <a:latin typeface="Cambria Math" panose="02040503050406030204" pitchFamily="18" charset="0"/>
                             <a:cs typeface="Arial" panose="020B0604020202020204" pitchFamily="34" charset="0"/>
                           </a:rPr>
-                          <m:t>𝑤</m:t>
-                        </m:r>
-                        <m:r>
-                          <a:rPr lang="en-US" sz="1400" b="0" i="1" smtClean="0">
-                            <a:latin typeface="Cambria Math" panose="02040503050406030204" pitchFamily="18" charset="0"/>
-                            <a:cs typeface="Arial" panose="020B0604020202020204" pitchFamily="34" charset="0"/>
-                          </a:rPr>
-                          <m:t>h</m:t>
+                          <m:t>𝑤h</m:t>
                         </m:r>
                       </m:e>
                     </m:rad>
@@ -31782,21 +31677,7 @@
                             <a:latin typeface="Cambria Math" panose="02040503050406030204" pitchFamily="18" charset="0"/>
                             <a:cs typeface="Arial" panose="020B0604020202020204" pitchFamily="34" charset="0"/>
                           </a:rPr>
-                          <m:t>=</m:t>
-                        </m:r>
-                        <m:r>
-                          <a:rPr lang="en-US" sz="1400" b="0" i="1" smtClean="0">
-                            <a:latin typeface="Cambria Math" panose="02040503050406030204" pitchFamily="18" charset="0"/>
-                            <a:cs typeface="Arial" panose="020B0604020202020204" pitchFamily="34" charset="0"/>
-                          </a:rPr>
-                          <m:t>50</m:t>
-                        </m:r>
-                        <m:r>
-                          <a:rPr lang="en-US" sz="1400" b="0" i="1" smtClean="0">
-                            <a:latin typeface="Cambria Math" panose="02040503050406030204" pitchFamily="18" charset="0"/>
-                            <a:cs typeface="Arial" panose="020B0604020202020204" pitchFamily="34" charset="0"/>
-                          </a:rPr>
-                          <m:t>, </m:t>
+                          <m:t>=50, </m:t>
                         </m:r>
                         <m:sSub>
                           <m:sSubPr>
@@ -31831,21 +31712,7 @@
                             <a:latin typeface="Cambria Math" panose="02040503050406030204" pitchFamily="18" charset="0"/>
                             <a:cs typeface="Arial" panose="020B0604020202020204" pitchFamily="34" charset="0"/>
                           </a:rPr>
-                          <m:t>=</m:t>
-                        </m:r>
-                        <m:r>
-                          <a:rPr lang="en-US" sz="1400" b="0" i="1" smtClean="0">
-                            <a:latin typeface="Cambria Math" panose="02040503050406030204" pitchFamily="18" charset="0"/>
-                            <a:cs typeface="Arial" panose="020B0604020202020204" pitchFamily="34" charset="0"/>
-                          </a:rPr>
-                          <m:t>100</m:t>
-                        </m:r>
-                        <m:r>
-                          <a:rPr lang="en-US" sz="1400" b="0" i="1" smtClean="0">
-                            <a:latin typeface="Cambria Math" panose="02040503050406030204" pitchFamily="18" charset="0"/>
-                            <a:cs typeface="Arial" panose="020B0604020202020204" pitchFamily="34" charset="0"/>
-                          </a:rPr>
-                          <m:t>, </m:t>
+                          <m:t>=100, </m:t>
                         </m:r>
                         <m:sSub>
                           <m:sSubPr>
@@ -31880,21 +31747,7 @@
                             <a:latin typeface="Cambria Math" panose="02040503050406030204" pitchFamily="18" charset="0"/>
                             <a:cs typeface="Arial" panose="020B0604020202020204" pitchFamily="34" charset="0"/>
                           </a:rPr>
-                          <m:t>=</m:t>
-                        </m:r>
-                        <m:r>
-                          <a:rPr lang="en-US" sz="1400" b="0" i="1" smtClean="0">
-                            <a:latin typeface="Cambria Math" panose="02040503050406030204" pitchFamily="18" charset="0"/>
-                            <a:cs typeface="Arial" panose="020B0604020202020204" pitchFamily="34" charset="0"/>
-                          </a:rPr>
-                          <m:t>125</m:t>
-                        </m:r>
-                        <m:r>
-                          <a:rPr lang="en-US" sz="1400" b="0" i="1" smtClean="0">
-                            <a:latin typeface="Cambria Math" panose="02040503050406030204" pitchFamily="18" charset="0"/>
-                            <a:cs typeface="Arial" panose="020B0604020202020204" pitchFamily="34" charset="0"/>
-                          </a:rPr>
-                          <m:t>, </m:t>
+                          <m:t>=125, </m:t>
                         </m:r>
                         <m:sSub>
                           <m:sSubPr>
@@ -31929,14 +31782,7 @@
                             <a:latin typeface="Cambria Math" panose="02040503050406030204" pitchFamily="18" charset="0"/>
                             <a:cs typeface="Arial" panose="020B0604020202020204" pitchFamily="34" charset="0"/>
                           </a:rPr>
-                          <m:t>=</m:t>
-                        </m:r>
-                        <m:r>
-                          <a:rPr lang="en-US" sz="1400" b="0" i="1" smtClean="0">
-                            <a:latin typeface="Cambria Math" panose="02040503050406030204" pitchFamily="18" charset="0"/>
-                            <a:cs typeface="Arial" panose="020B0604020202020204" pitchFamily="34" charset="0"/>
-                          </a:rPr>
-                          <m:t>200</m:t>
+                          <m:t>=200</m:t>
                         </m:r>
                       </m:e>
                     </m:d>
@@ -31970,42 +31816,7 @@
                         <a:latin typeface="Cambria Math" panose="02040503050406030204" pitchFamily="18" charset="0"/>
                         <a:cs typeface="Arial" panose="020B0604020202020204" pitchFamily="34" charset="0"/>
                       </a:rPr>
-                      <m:t>=</m:t>
-                    </m:r>
-                    <m:r>
-                      <a:rPr lang="en-US" sz="1400" b="0" i="1" smtClean="0">
-                        <a:latin typeface="Cambria Math" panose="02040503050406030204" pitchFamily="18" charset="0"/>
-                        <a:cs typeface="Arial" panose="020B0604020202020204" pitchFamily="34" charset="0"/>
-                      </a:rPr>
-                      <m:t>125</m:t>
-                    </m:r>
-                    <m:r>
-                      <a:rPr lang="en-US" sz="1400" b="0" i="1" smtClean="0">
-                        <a:latin typeface="Cambria Math" panose="02040503050406030204" pitchFamily="18" charset="0"/>
-                        <a:cs typeface="Arial" panose="020B0604020202020204" pitchFamily="34" charset="0"/>
-                      </a:rPr>
-                      <m:t>−</m:t>
-                    </m:r>
-                    <m:r>
-                      <a:rPr lang="en-US" sz="1400" b="0" i="1" smtClean="0">
-                        <a:latin typeface="Cambria Math" panose="02040503050406030204" pitchFamily="18" charset="0"/>
-                        <a:cs typeface="Arial" panose="020B0604020202020204" pitchFamily="34" charset="0"/>
-                      </a:rPr>
-                      <m:t>50</m:t>
-                    </m:r>
-                    <m:r>
-                      <a:rPr lang="en-US" sz="1400" b="0" i="1" smtClean="0">
-                        <a:latin typeface="Cambria Math" panose="02040503050406030204" pitchFamily="18" charset="0"/>
-                        <a:cs typeface="Arial" panose="020B0604020202020204" pitchFamily="34" charset="0"/>
-                      </a:rPr>
-                      <m:t>=</m:t>
-                    </m:r>
-                    <m:r>
-                      <a:rPr lang="en-US" sz="1400" b="0" i="1" smtClean="0">
-                        <a:latin typeface="Cambria Math" panose="02040503050406030204" pitchFamily="18" charset="0"/>
-                        <a:cs typeface="Arial" panose="020B0604020202020204" pitchFamily="34" charset="0"/>
-                      </a:rPr>
-                      <m:t>75</m:t>
+                      <m:t>=125−50=75</m:t>
                     </m:r>
                   </m:oMath>
                 </a14:m>
@@ -32030,49 +31841,7 @@
                         <a:latin typeface="Cambria Math" panose="02040503050406030204" pitchFamily="18" charset="0"/>
                         <a:cs typeface="Arial" panose="020B0604020202020204" pitchFamily="34" charset="0"/>
                       </a:rPr>
-                      <m:t>=</m:t>
-                    </m:r>
-                    <m:r>
-                      <a:rPr lang="en-US" sz="1400" b="0" i="1" smtClean="0">
-                        <a:latin typeface="Cambria Math" panose="02040503050406030204" pitchFamily="18" charset="0"/>
-                        <a:cs typeface="Arial" panose="020B0604020202020204" pitchFamily="34" charset="0"/>
-                      </a:rPr>
-                      <m:t>200</m:t>
-                    </m:r>
-                    <m:r>
-                      <a:rPr lang="en-US" sz="1400" b="0" i="1" smtClean="0">
-                        <a:latin typeface="Cambria Math" panose="02040503050406030204" pitchFamily="18" charset="0"/>
-                        <a:cs typeface="Arial" panose="020B0604020202020204" pitchFamily="34" charset="0"/>
-                      </a:rPr>
-                      <m:t>−</m:t>
-                    </m:r>
-                    <m:r>
-                      <a:rPr lang="en-US" sz="1400" b="0" i="1" smtClean="0">
-                        <a:latin typeface="Cambria Math" panose="02040503050406030204" pitchFamily="18" charset="0"/>
-                        <a:cs typeface="Arial" panose="020B0604020202020204" pitchFamily="34" charset="0"/>
-                      </a:rPr>
-                      <m:t>100</m:t>
-                    </m:r>
-                    <m:r>
-                      <a:rPr lang="en-US" sz="1400" b="0" i="1" smtClean="0">
-                        <a:latin typeface="Cambria Math" panose="02040503050406030204" pitchFamily="18" charset="0"/>
-                        <a:cs typeface="Arial" panose="020B0604020202020204" pitchFamily="34" charset="0"/>
-                      </a:rPr>
-                      <m:t>=</m:t>
-                    </m:r>
-                    <m:r>
-                      <a:rPr lang="en-US" sz="1400" b="0" i="1" smtClean="0">
-                        <a:latin typeface="Cambria Math" panose="02040503050406030204" pitchFamily="18" charset="0"/>
-                        <a:cs typeface="Arial" panose="020B0604020202020204" pitchFamily="34" charset="0"/>
-                      </a:rPr>
-                      <m:t>100</m:t>
-                    </m:r>
-                    <m:r>
-                      <a:rPr lang="en-US" sz="1400" b="0" i="1" smtClean="0">
-                        <a:latin typeface="Cambria Math" panose="02040503050406030204" pitchFamily="18" charset="0"/>
-                        <a:cs typeface="Arial" panose="020B0604020202020204" pitchFamily="34" charset="0"/>
-                      </a:rPr>
-                      <m:t>.</m:t>
+                      <m:t>=200−100=100.</m:t>
                     </m:r>
                   </m:oMath>
                 </a14:m>
@@ -32127,14 +31896,7 @@
                                 <a:latin typeface="Cambria Math" panose="02040503050406030204" pitchFamily="18" charset="0"/>
                                 <a:cs typeface="Arial" panose="020B0604020202020204" pitchFamily="34" charset="0"/>
                               </a:rPr>
-                              <m:t>𝑤</m:t>
-                            </m:r>
-                            <m:r>
-                              <a:rPr lang="en-US" sz="1400" b="0" i="1" smtClean="0">
-                                <a:latin typeface="Cambria Math" panose="02040503050406030204" pitchFamily="18" charset="0"/>
-                                <a:cs typeface="Arial" panose="020B0604020202020204" pitchFamily="34" charset="0"/>
-                              </a:rPr>
-                              <m:t>h</m:t>
+                              <m:t>𝑤h</m:t>
                             </m:r>
                           </m:e>
                         </m:rad>
@@ -32297,14 +32059,7 @@
                                 <a:latin typeface="Cambria Math" panose="02040503050406030204" pitchFamily="18" charset="0"/>
                                 <a:cs typeface="Arial" panose="020B0604020202020204" pitchFamily="34" charset="0"/>
                               </a:rPr>
-                              <m:t>𝑤</m:t>
-                            </m:r>
-                            <m:r>
-                              <a:rPr lang="en-US" sz="1400" b="0" i="1" smtClean="0">
-                                <a:latin typeface="Cambria Math" panose="02040503050406030204" pitchFamily="18" charset="0"/>
-                                <a:cs typeface="Arial" panose="020B0604020202020204" pitchFamily="34" charset="0"/>
-                              </a:rPr>
-                              <m:t>h</m:t>
+                              <m:t>𝑤h</m:t>
                             </m:r>
                           </m:e>
                         </m:rad>
@@ -32313,21 +32068,7 @@
                             <a:latin typeface="Cambria Math" panose="02040503050406030204" pitchFamily="18" charset="0"/>
                             <a:cs typeface="Arial" panose="020B0604020202020204" pitchFamily="34" charset="0"/>
                           </a:rPr>
-                          <m:t>/</m:t>
-                        </m:r>
-                        <m:r>
-                          <a:rPr lang="en-US" sz="1400" b="0" i="1" smtClean="0">
-                            <a:latin typeface="Cambria Math" panose="02040503050406030204" pitchFamily="18" charset="0"/>
-                            <a:cs typeface="Arial" panose="020B0604020202020204" pitchFamily="34" charset="0"/>
-                          </a:rPr>
-                          <m:t>224</m:t>
-                        </m:r>
-                        <m:r>
-                          <a:rPr lang="en-US" sz="1400" b="0" i="1" smtClean="0">
-                            <a:latin typeface="Cambria Math" panose="02040503050406030204" pitchFamily="18" charset="0"/>
-                            <a:cs typeface="Arial" panose="020B0604020202020204" pitchFamily="34" charset="0"/>
-                          </a:rPr>
-                          <m:t>)</m:t>
+                          <m:t>/224)</m:t>
                         </m:r>
                       </m:e>
                     </m:func>
@@ -32485,28 +32226,14 @@
                                     <a:latin typeface="Cambria Math" panose="02040503050406030204" pitchFamily="18" charset="0"/>
                                     <a:cs typeface="Arial" panose="020B0604020202020204" pitchFamily="34" charset="0"/>
                                   </a:rPr>
-                                  <m:t>𝑤</m:t>
-                                </m:r>
-                                <m:r>
-                                  <a:rPr lang="en-US" sz="1400" i="1">
-                                    <a:latin typeface="Cambria Math" panose="02040503050406030204" pitchFamily="18" charset="0"/>
-                                    <a:cs typeface="Arial" panose="020B0604020202020204" pitchFamily="34" charset="0"/>
-                                  </a:rPr>
-                                  <m:t>h</m:t>
+                                  <m:t>𝑤h</m:t>
                                 </m:r>
                                 <m:r>
                                   <a:rPr lang="en-US" sz="1400" b="0" i="1" smtClean="0">
                                     <a:latin typeface="Cambria Math" panose="02040503050406030204" pitchFamily="18" charset="0"/>
                                     <a:cs typeface="Arial" panose="020B0604020202020204" pitchFamily="34" charset="0"/>
                                   </a:rPr>
-                                  <m:t>/</m:t>
-                                </m:r>
-                                <m:r>
-                                  <a:rPr lang="en-US" sz="1400" b="0" i="1" smtClean="0">
-                                    <a:latin typeface="Cambria Math" panose="02040503050406030204" pitchFamily="18" charset="0"/>
-                                    <a:cs typeface="Arial" panose="020B0604020202020204" pitchFamily="34" charset="0"/>
-                                  </a:rPr>
-                                  <m:t>4</m:t>
+                                  <m:t>/4</m:t>
                                 </m:r>
                               </m:e>
                             </m:rad>
@@ -32515,21 +32242,7 @@
                                 <a:latin typeface="Cambria Math" panose="02040503050406030204" pitchFamily="18" charset="0"/>
                                 <a:cs typeface="Arial" panose="020B0604020202020204" pitchFamily="34" charset="0"/>
                               </a:rPr>
-                              <m:t>/</m:t>
-                            </m:r>
-                            <m:r>
-                              <a:rPr lang="en-US" sz="1400" i="1">
-                                <a:latin typeface="Cambria Math" panose="02040503050406030204" pitchFamily="18" charset="0"/>
-                                <a:cs typeface="Arial" panose="020B0604020202020204" pitchFamily="34" charset="0"/>
-                              </a:rPr>
-                              <m:t>224</m:t>
-                            </m:r>
-                            <m:r>
-                              <a:rPr lang="en-US" sz="1400" i="1">
-                                <a:latin typeface="Cambria Math" panose="02040503050406030204" pitchFamily="18" charset="0"/>
-                                <a:cs typeface="Arial" panose="020B0604020202020204" pitchFamily="34" charset="0"/>
-                              </a:rPr>
-                              <m:t>)</m:t>
+                              <m:t>/224)</m:t>
                             </m:r>
                           </m:e>
                         </m:func>
@@ -32559,14 +32272,7 @@
                             <a:latin typeface="Cambria Math" panose="02040503050406030204" pitchFamily="18" charset="0"/>
                             <a:cs typeface="Arial" panose="020B0604020202020204" pitchFamily="34" charset="0"/>
                           </a:rPr>
-                          <m:t>4</m:t>
-                        </m:r>
-                        <m:r>
-                          <a:rPr lang="en-US" sz="1400" b="0" i="1" smtClean="0">
-                            <a:latin typeface="Cambria Math" panose="02040503050406030204" pitchFamily="18" charset="0"/>
-                            <a:cs typeface="Arial" panose="020B0604020202020204" pitchFamily="34" charset="0"/>
-                          </a:rPr>
-                          <m:t>+</m:t>
+                          <m:t>4+</m:t>
                         </m:r>
                         <m:func>
                           <m:funcPr>
@@ -32616,35 +32322,7 @@
                                 <a:latin typeface="Cambria Math" panose="02040503050406030204" pitchFamily="18" charset="0"/>
                                 <a:cs typeface="Arial" panose="020B0604020202020204" pitchFamily="34" charset="0"/>
                               </a:rPr>
-                              <m:t>(</m:t>
-                            </m:r>
-                            <m:r>
-                              <a:rPr lang="en-US" sz="1400" b="0" i="1" smtClean="0">
-                                <a:latin typeface="Cambria Math" panose="02040503050406030204" pitchFamily="18" charset="0"/>
-                                <a:cs typeface="Arial" panose="020B0604020202020204" pitchFamily="34" charset="0"/>
-                              </a:rPr>
-                              <m:t>1</m:t>
-                            </m:r>
-                            <m:r>
-                              <a:rPr lang="en-US" sz="1400" b="0" i="1" smtClean="0">
-                                <a:latin typeface="Cambria Math" panose="02040503050406030204" pitchFamily="18" charset="0"/>
-                                <a:cs typeface="Arial" panose="020B0604020202020204" pitchFamily="34" charset="0"/>
-                              </a:rPr>
-                              <m:t>/</m:t>
-                            </m:r>
-                            <m:r>
-                              <a:rPr lang="en-US" sz="1400" b="0" i="1" smtClean="0">
-                                <a:latin typeface="Cambria Math" panose="02040503050406030204" pitchFamily="18" charset="0"/>
-                                <a:cs typeface="Arial" panose="020B0604020202020204" pitchFamily="34" charset="0"/>
-                              </a:rPr>
-                              <m:t>2</m:t>
-                            </m:r>
-                            <m:r>
-                              <a:rPr lang="en-US" sz="1400" b="0" i="1" smtClean="0">
-                                <a:latin typeface="Cambria Math" panose="02040503050406030204" pitchFamily="18" charset="0"/>
-                                <a:cs typeface="Arial" panose="020B0604020202020204" pitchFamily="34" charset="0"/>
-                              </a:rPr>
-                              <m:t>)</m:t>
+                              <m:t>(1/2)</m:t>
                             </m:r>
                           </m:e>
                         </m:func>
@@ -32674,21 +32352,7 @@
                             <a:latin typeface="Cambria Math" panose="02040503050406030204" pitchFamily="18" charset="0"/>
                             <a:cs typeface="Arial" panose="020B0604020202020204" pitchFamily="34" charset="0"/>
                           </a:rPr>
-                          <m:t>4</m:t>
-                        </m:r>
-                        <m:r>
-                          <a:rPr lang="en-US" sz="1400" b="0" i="1" smtClean="0">
-                            <a:latin typeface="Cambria Math" panose="02040503050406030204" pitchFamily="18" charset="0"/>
-                            <a:cs typeface="Arial" panose="020B0604020202020204" pitchFamily="34" charset="0"/>
-                          </a:rPr>
-                          <m:t>−</m:t>
-                        </m:r>
-                        <m:r>
-                          <a:rPr lang="en-US" sz="1400" b="0" i="1" smtClean="0">
-                            <a:latin typeface="Cambria Math" panose="02040503050406030204" pitchFamily="18" charset="0"/>
-                            <a:cs typeface="Arial" panose="020B0604020202020204" pitchFamily="34" charset="0"/>
-                          </a:rPr>
-                          <m:t>1</m:t>
+                          <m:t>4−1</m:t>
                         </m:r>
                       </m:e>
                     </m:d>
@@ -32697,14 +32361,7 @@
                         <a:latin typeface="Cambria Math" panose="02040503050406030204" pitchFamily="18" charset="0"/>
                         <a:cs typeface="Arial" panose="020B0604020202020204" pitchFamily="34" charset="0"/>
                       </a:rPr>
-                      <m:t>=</m:t>
-                    </m:r>
-                    <m:r>
-                      <a:rPr lang="en-US" sz="1400" b="0" i="1" smtClean="0">
-                        <a:latin typeface="Cambria Math" panose="02040503050406030204" pitchFamily="18" charset="0"/>
-                        <a:cs typeface="Arial" panose="020B0604020202020204" pitchFamily="34" charset="0"/>
-                      </a:rPr>
-                      <m:t>3</m:t>
+                      <m:t>=3</m:t>
                     </m:r>
                     <m:r>
                       <a:rPr lang="en-US" sz="1400" i="1">

</xml_diff>